<commit_message>
Updated poster to reflect Liz's intro material
</commit_message>
<xml_diff>
--- a/Poster Rough Draft.pptx
+++ b/Poster Rough Draft.pptx
@@ -286,14 +286,14 @@
           <a:effectLst/>
           <a:extLst>
             <a:ext uri="{909E8E84-426E-40dd-AFC4-6F175D3DCCD1}">
-              <a14:hiddenFill xmlns:a14="http://schemas.microsoft.com/office/drawing/2010/main" xmlns="">
+              <a14:hiddenFill xmlns="" xmlns:a14="http://schemas.microsoft.com/office/drawing/2010/main">
                 <a:solidFill>
                   <a:schemeClr val="accent1"/>
                 </a:solidFill>
               </a14:hiddenFill>
             </a:ext>
             <a:ext uri="{91240B29-F687-4f45-9708-019B960494DF}">
-              <a14:hiddenLine xmlns:a14="http://schemas.microsoft.com/office/drawing/2010/main" xmlns="" w="9525">
+              <a14:hiddenLine xmlns="" xmlns:a14="http://schemas.microsoft.com/office/drawing/2010/main" w="9525">
                 <a:solidFill>
                   <a:schemeClr val="tx1"/>
                 </a:solidFill>
@@ -303,7 +303,7 @@
               </a14:hiddenLine>
             </a:ext>
             <a:ext uri="{AF507438-7753-43e0-B8FC-AC1667EBCBE1}">
-              <a14:hiddenEffects xmlns:a14="http://schemas.microsoft.com/office/drawing/2010/main" xmlns="">
+              <a14:hiddenEffects xmlns="" xmlns:a14="http://schemas.microsoft.com/office/drawing/2010/main">
                 <a:effectLst>
                   <a:outerShdw dist="35921" dir="2700000" algn="ctr" rotWithShape="0">
                     <a:schemeClr val="bg2"/>
@@ -356,14 +356,14 @@
           <a:effectLst/>
           <a:extLst>
             <a:ext uri="{909E8E84-426E-40dd-AFC4-6F175D3DCCD1}">
-              <a14:hiddenFill xmlns:a14="http://schemas.microsoft.com/office/drawing/2010/main" xmlns="">
+              <a14:hiddenFill xmlns="" xmlns:a14="http://schemas.microsoft.com/office/drawing/2010/main">
                 <a:solidFill>
                   <a:schemeClr val="accent1"/>
                 </a:solidFill>
               </a14:hiddenFill>
             </a:ext>
             <a:ext uri="{91240B29-F687-4f45-9708-019B960494DF}">
-              <a14:hiddenLine xmlns:a14="http://schemas.microsoft.com/office/drawing/2010/main" xmlns="" w="9525">
+              <a14:hiddenLine xmlns="" xmlns:a14="http://schemas.microsoft.com/office/drawing/2010/main" w="9525">
                 <a:solidFill>
                   <a:schemeClr val="tx1"/>
                 </a:solidFill>
@@ -373,7 +373,7 @@
               </a14:hiddenLine>
             </a:ext>
             <a:ext uri="{AF507438-7753-43e0-B8FC-AC1667EBCBE1}">
-              <a14:hiddenEffects xmlns:a14="http://schemas.microsoft.com/office/drawing/2010/main" xmlns="">
+              <a14:hiddenEffects xmlns="" xmlns:a14="http://schemas.microsoft.com/office/drawing/2010/main">
                 <a:effectLst>
                   <a:outerShdw dist="35921" dir="2700000" algn="ctr" rotWithShape="0">
                     <a:schemeClr val="bg2"/>
@@ -426,14 +426,14 @@
           <a:effectLst/>
           <a:extLst>
             <a:ext uri="{909E8E84-426E-40dd-AFC4-6F175D3DCCD1}">
-              <a14:hiddenFill xmlns:a14="http://schemas.microsoft.com/office/drawing/2010/main" xmlns="">
+              <a14:hiddenFill xmlns="" xmlns:a14="http://schemas.microsoft.com/office/drawing/2010/main">
                 <a:solidFill>
                   <a:schemeClr val="accent1"/>
                 </a:solidFill>
               </a14:hiddenFill>
             </a:ext>
             <a:ext uri="{91240B29-F687-4f45-9708-019B960494DF}">
-              <a14:hiddenLine xmlns:a14="http://schemas.microsoft.com/office/drawing/2010/main" xmlns="" w="9525">
+              <a14:hiddenLine xmlns="" xmlns:a14="http://schemas.microsoft.com/office/drawing/2010/main" w="9525">
                 <a:solidFill>
                   <a:schemeClr val="tx1"/>
                 </a:solidFill>
@@ -443,7 +443,7 @@
               </a14:hiddenLine>
             </a:ext>
             <a:ext uri="{AF507438-7753-43e0-B8FC-AC1667EBCBE1}">
-              <a14:hiddenEffects xmlns:a14="http://schemas.microsoft.com/office/drawing/2010/main" xmlns="">
+              <a14:hiddenEffects xmlns="" xmlns:a14="http://schemas.microsoft.com/office/drawing/2010/main">
                 <a:effectLst>
                   <a:outerShdw dist="35921" dir="2700000" algn="ctr" rotWithShape="0">
                     <a:schemeClr val="bg2"/>
@@ -496,14 +496,14 @@
           <a:effectLst/>
           <a:extLst>
             <a:ext uri="{909E8E84-426E-40dd-AFC4-6F175D3DCCD1}">
-              <a14:hiddenFill xmlns:a14="http://schemas.microsoft.com/office/drawing/2010/main" xmlns="">
+              <a14:hiddenFill xmlns="" xmlns:a14="http://schemas.microsoft.com/office/drawing/2010/main">
                 <a:solidFill>
                   <a:schemeClr val="accent1"/>
                 </a:solidFill>
               </a14:hiddenFill>
             </a:ext>
             <a:ext uri="{91240B29-F687-4f45-9708-019B960494DF}">
-              <a14:hiddenLine xmlns:a14="http://schemas.microsoft.com/office/drawing/2010/main" xmlns="" w="9525">
+              <a14:hiddenLine xmlns="" xmlns:a14="http://schemas.microsoft.com/office/drawing/2010/main" w="9525">
                 <a:solidFill>
                   <a:schemeClr val="tx1"/>
                 </a:solidFill>
@@ -513,7 +513,7 @@
               </a14:hiddenLine>
             </a:ext>
             <a:ext uri="{AF507438-7753-43e0-B8FC-AC1667EBCBE1}">
-              <a14:hiddenEffects xmlns:a14="http://schemas.microsoft.com/office/drawing/2010/main" xmlns="">
+              <a14:hiddenEffects xmlns="" xmlns:a14="http://schemas.microsoft.com/office/drawing/2010/main">
                 <a:effectLst>
                   <a:outerShdw dist="35921" dir="2700000" algn="ctr" rotWithShape="0">
                     <a:schemeClr val="bg2"/>
@@ -607,14 +607,14 @@
           <a:effectLst/>
           <a:extLst>
             <a:ext uri="{909E8E84-426E-40dd-AFC4-6F175D3DCCD1}">
-              <a14:hiddenFill xmlns:a14="http://schemas.microsoft.com/office/drawing/2010/main" xmlns="">
+              <a14:hiddenFill xmlns="" xmlns:a14="http://schemas.microsoft.com/office/drawing/2010/main">
                 <a:solidFill>
                   <a:schemeClr val="accent1"/>
                 </a:solidFill>
               </a14:hiddenFill>
             </a:ext>
             <a:ext uri="{91240B29-F687-4f45-9708-019B960494DF}">
-              <a14:hiddenLine xmlns:a14="http://schemas.microsoft.com/office/drawing/2010/main" xmlns="" w="9525">
+              <a14:hiddenLine xmlns="" xmlns:a14="http://schemas.microsoft.com/office/drawing/2010/main" w="9525">
                 <a:solidFill>
                   <a:schemeClr val="tx1"/>
                 </a:solidFill>
@@ -624,7 +624,7 @@
               </a14:hiddenLine>
             </a:ext>
             <a:ext uri="{AF507438-7753-43e0-B8FC-AC1667EBCBE1}">
-              <a14:hiddenEffects xmlns:a14="http://schemas.microsoft.com/office/drawing/2010/main" xmlns="">
+              <a14:hiddenEffects xmlns="" xmlns:a14="http://schemas.microsoft.com/office/drawing/2010/main">
                 <a:effectLst>
                   <a:outerShdw dist="35921" dir="2700000" algn="ctr" rotWithShape="0">
                     <a:schemeClr val="bg2"/>
@@ -677,14 +677,14 @@
           <a:effectLst/>
           <a:extLst>
             <a:ext uri="{909E8E84-426E-40dd-AFC4-6F175D3DCCD1}">
-              <a14:hiddenFill xmlns:a14="http://schemas.microsoft.com/office/drawing/2010/main" xmlns="">
+              <a14:hiddenFill xmlns="" xmlns:a14="http://schemas.microsoft.com/office/drawing/2010/main">
                 <a:solidFill>
                   <a:schemeClr val="accent1"/>
                 </a:solidFill>
               </a14:hiddenFill>
             </a:ext>
             <a:ext uri="{91240B29-F687-4f45-9708-019B960494DF}">
-              <a14:hiddenLine xmlns:a14="http://schemas.microsoft.com/office/drawing/2010/main" xmlns="" w="9525">
+              <a14:hiddenLine xmlns="" xmlns:a14="http://schemas.microsoft.com/office/drawing/2010/main" w="9525">
                 <a:solidFill>
                   <a:schemeClr val="tx1"/>
                 </a:solidFill>
@@ -694,7 +694,7 @@
               </a14:hiddenLine>
             </a:ext>
             <a:ext uri="{AF507438-7753-43e0-B8FC-AC1667EBCBE1}">
-              <a14:hiddenEffects xmlns:a14="http://schemas.microsoft.com/office/drawing/2010/main" xmlns="">
+              <a14:hiddenEffects xmlns="" xmlns:a14="http://schemas.microsoft.com/office/drawing/2010/main">
                 <a:effectLst>
                   <a:outerShdw dist="35921" dir="2700000" algn="ctr" rotWithShape="0">
                     <a:schemeClr val="bg2"/>
@@ -752,14 +752,14 @@
           <a:effectLst/>
           <a:extLst>
             <a:ext uri="{909E8E84-426E-40dd-AFC4-6F175D3DCCD1}">
-              <a14:hiddenFill xmlns:a14="http://schemas.microsoft.com/office/drawing/2010/main" xmlns="">
+              <a14:hiddenFill xmlns="" xmlns:a14="http://schemas.microsoft.com/office/drawing/2010/main">
                 <a:solidFill>
                   <a:srgbClr val="FFFFFF"/>
                 </a:solidFill>
               </a14:hiddenFill>
             </a:ext>
             <a:ext uri="{AF507438-7753-43e0-B8FC-AC1667EBCBE1}">
-              <a14:hiddenEffects xmlns:a14="http://schemas.microsoft.com/office/drawing/2010/main" xmlns="">
+              <a14:hiddenEffects xmlns="" xmlns:a14="http://schemas.microsoft.com/office/drawing/2010/main">
                 <a:effectLst>
                   <a:outerShdw dist="35921" dir="2700000" algn="ctr" rotWithShape="0">
                     <a:srgbClr val="808080"/>
@@ -768,7 +768,7 @@
               </a14:hiddenEffects>
             </a:ext>
             <a:ext uri="{53640926-AAD7-44d8-BBD7-CCE9431645EC}">
-              <a14:shadowObscured xmlns:a14="http://schemas.microsoft.com/office/drawing/2010/main" xmlns="" val="1"/>
+              <a14:shadowObscured xmlns="" xmlns:a14="http://schemas.microsoft.com/office/drawing/2010/main" val="1"/>
             </a:ext>
           </a:extLst>
         </p:spPr>
@@ -798,14 +798,14 @@
           <a:effectLst/>
           <a:extLst>
             <a:ext uri="{909E8E84-426E-40dd-AFC4-6F175D3DCCD1}">
-              <a14:hiddenFill xmlns:a14="http://schemas.microsoft.com/office/drawing/2010/main" xmlns="">
+              <a14:hiddenFill xmlns="" xmlns:a14="http://schemas.microsoft.com/office/drawing/2010/main">
                 <a:solidFill>
                   <a:schemeClr val="accent1"/>
                 </a:solidFill>
               </a14:hiddenFill>
             </a:ext>
             <a:ext uri="{91240B29-F687-4f45-9708-019B960494DF}">
-              <a14:hiddenLine xmlns:a14="http://schemas.microsoft.com/office/drawing/2010/main" xmlns="" w="9525">
+              <a14:hiddenLine xmlns="" xmlns:a14="http://schemas.microsoft.com/office/drawing/2010/main" w="9525">
                 <a:solidFill>
                   <a:schemeClr val="tx1"/>
                 </a:solidFill>
@@ -815,7 +815,7 @@
               </a14:hiddenLine>
             </a:ext>
             <a:ext uri="{AF507438-7753-43e0-B8FC-AC1667EBCBE1}">
-              <a14:hiddenEffects xmlns:a14="http://schemas.microsoft.com/office/drawing/2010/main" xmlns="">
+              <a14:hiddenEffects xmlns="" xmlns:a14="http://schemas.microsoft.com/office/drawing/2010/main">
                 <a:effectLst>
                   <a:outerShdw dist="35921" dir="2700000" algn="ctr" rotWithShape="0">
                     <a:schemeClr val="bg2"/>
@@ -894,14 +894,14 @@
           <a:effectLst/>
           <a:extLst>
             <a:ext uri="{909E8E84-426E-40dd-AFC4-6F175D3DCCD1}">
-              <a14:hiddenFill xmlns:a14="http://schemas.microsoft.com/office/drawing/2010/main" xmlns="">
+              <a14:hiddenFill xmlns="" xmlns:a14="http://schemas.microsoft.com/office/drawing/2010/main">
                 <a:solidFill>
                   <a:schemeClr val="accent1"/>
                 </a:solidFill>
               </a14:hiddenFill>
             </a:ext>
             <a:ext uri="{91240B29-F687-4f45-9708-019B960494DF}">
-              <a14:hiddenLine xmlns:a14="http://schemas.microsoft.com/office/drawing/2010/main" xmlns="" w="9525">
+              <a14:hiddenLine xmlns="" xmlns:a14="http://schemas.microsoft.com/office/drawing/2010/main" w="9525">
                 <a:solidFill>
                   <a:schemeClr val="tx1"/>
                 </a:solidFill>
@@ -911,7 +911,7 @@
               </a14:hiddenLine>
             </a:ext>
             <a:ext uri="{AF507438-7753-43e0-B8FC-AC1667EBCBE1}">
-              <a14:hiddenEffects xmlns:a14="http://schemas.microsoft.com/office/drawing/2010/main" xmlns="">
+              <a14:hiddenEffects xmlns="" xmlns:a14="http://schemas.microsoft.com/office/drawing/2010/main">
                 <a:effectLst>
                   <a:outerShdw dist="35921" dir="2700000" algn="ctr" rotWithShape="0">
                     <a:schemeClr val="bg2"/>
@@ -964,14 +964,14 @@
           <a:effectLst/>
           <a:extLst>
             <a:ext uri="{909E8E84-426E-40dd-AFC4-6F175D3DCCD1}">
-              <a14:hiddenFill xmlns:a14="http://schemas.microsoft.com/office/drawing/2010/main" xmlns="">
+              <a14:hiddenFill xmlns="" xmlns:a14="http://schemas.microsoft.com/office/drawing/2010/main">
                 <a:solidFill>
                   <a:schemeClr val="accent1"/>
                 </a:solidFill>
               </a14:hiddenFill>
             </a:ext>
             <a:ext uri="{91240B29-F687-4f45-9708-019B960494DF}">
-              <a14:hiddenLine xmlns:a14="http://schemas.microsoft.com/office/drawing/2010/main" xmlns="" w="9525">
+              <a14:hiddenLine xmlns="" xmlns:a14="http://schemas.microsoft.com/office/drawing/2010/main" w="9525">
                 <a:solidFill>
                   <a:schemeClr val="tx1"/>
                 </a:solidFill>
@@ -981,7 +981,7 @@
               </a14:hiddenLine>
             </a:ext>
             <a:ext uri="{AF507438-7753-43e0-B8FC-AC1667EBCBE1}">
-              <a14:hiddenEffects xmlns:a14="http://schemas.microsoft.com/office/drawing/2010/main" xmlns="">
+              <a14:hiddenEffects xmlns="" xmlns:a14="http://schemas.microsoft.com/office/drawing/2010/main">
                 <a:effectLst>
                   <a:outerShdw dist="35921" dir="2700000" algn="ctr" rotWithShape="0">
                     <a:schemeClr val="bg2"/>
@@ -3497,9 +3497,18 @@
         <a:gradFill rotWithShape="0">
           <a:gsLst>
             <a:gs pos="0">
+              <a:srgbClr val="DADEE5"/>
+            </a:gs>
+            <a:gs pos="52000">
+              <a:srgbClr val="DADEE5"/>
+            </a:gs>
+            <a:gs pos="100000">
+              <a:srgbClr val="EDEFF2"/>
+            </a:gs>
+            <a:gs pos="71000">
               <a:schemeClr val="bg1"/>
             </a:gs>
-            <a:gs pos="100000">
+            <a:gs pos="25000">
               <a:schemeClr val="tx2">
                 <a:lumMod val="40000"/>
                 <a:lumOff val="60000"/>
@@ -3849,14 +3858,14 @@
           <a:effectLst/>
           <a:extLst>
             <a:ext uri="{909E8E84-426E-40dd-AFC4-6F175D3DCCD1}">
-              <a14:hiddenFill xmlns:a14="http://schemas.microsoft.com/office/drawing/2010/main" xmlns="">
+              <a14:hiddenFill xmlns="" xmlns:a14="http://schemas.microsoft.com/office/drawing/2010/main">
                 <a:solidFill>
                   <a:srgbClr val="000000"/>
                 </a:solidFill>
               </a14:hiddenFill>
             </a:ext>
             <a:ext uri="{91240B29-F687-4f45-9708-019B960494DF}">
-              <a14:hiddenLine xmlns:a14="http://schemas.microsoft.com/office/drawing/2010/main" xmlns="" w="9525">
+              <a14:hiddenLine xmlns="" xmlns:a14="http://schemas.microsoft.com/office/drawing/2010/main" w="9525">
                 <a:solidFill>
                   <a:schemeClr val="tx1"/>
                 </a:solidFill>
@@ -3866,7 +3875,7 @@
               </a14:hiddenLine>
             </a:ext>
             <a:ext uri="{AF507438-7753-43e0-B8FC-AC1667EBCBE1}">
-              <a14:hiddenEffects xmlns:a14="http://schemas.microsoft.com/office/drawing/2010/main" xmlns="">
+              <a14:hiddenEffects xmlns="" xmlns:a14="http://schemas.microsoft.com/office/drawing/2010/main">
                 <a:effectLst>
                   <a:outerShdw dist="35921" dir="2700000" algn="ctr" rotWithShape="0">
                     <a:srgbClr val="FFBF0B"/>
@@ -3979,7 +3988,7 @@
           <a:p>
             <a:pPr algn="ctr"/>
             <a:r>
-              <a:rPr lang="en-US" altLang="zh-CN" sz="7200" b="1" dirty="0">
+              <a:rPr lang="en-US" altLang="zh-CN" sz="7200" b="1" dirty="0" smtClean="0">
                 <a:solidFill>
                   <a:schemeClr val="bg1"/>
                 </a:solidFill>
@@ -3988,8 +3997,17 @@
                 <a:ea typeface="SimSun" pitchFamily="2" charset="-122"/>
                 <a:cs typeface="Lucida Sans" pitchFamily="34" charset="0"/>
               </a:rPr>
-              <a:t>INSERT YOUR POSTER TITLE ON THIS LINE HERE</a:t>
+              <a:t>Sonic Signatures: Do Shakespeare’s Characters Have Distinct Speech Qualities? </a:t>
             </a:r>
+            <a:endParaRPr lang="en-US" altLang="zh-CN" sz="7200" b="1" dirty="0">
+              <a:solidFill>
+                <a:schemeClr val="bg1"/>
+              </a:solidFill>
+              <a:effectLst/>
+              <a:latin typeface="Lucida Sans" pitchFamily="34" charset="0"/>
+              <a:ea typeface="SimSun" pitchFamily="2" charset="-122"/>
+              <a:cs typeface="Lucida Sans" pitchFamily="34" charset="0"/>
+            </a:endParaRPr>
           </a:p>
           <a:p>
             <a:pPr algn="ctr">
@@ -3998,7 +4016,7 @@
               </a:spcBef>
             </a:pPr>
             <a:r>
-              <a:rPr lang="en-US" altLang="zh-CN" sz="5600" b="1" dirty="0">
+              <a:rPr lang="en-US" altLang="zh-CN" sz="5600" b="1" smtClean="0">
                 <a:solidFill>
                   <a:schemeClr val="bg1"/>
                 </a:solidFill>
@@ -4007,13 +4025,10 @@
                 <a:ea typeface="SimSun" pitchFamily="2" charset="-122"/>
                 <a:cs typeface="Lucida Sans" pitchFamily="34" charset="0"/>
               </a:rPr>
-              <a:t>Name of Author</a:t>
+              <a:t>Eric Alexander, Estelle </a:t>
             </a:r>
-          </a:p>
-          <a:p>
-            <a:pPr algn="ctr"/>
             <a:r>
-              <a:rPr lang="en-US" altLang="zh-CN" sz="4200" b="1" dirty="0">
+              <a:rPr lang="en-US" altLang="zh-CN" sz="5600" b="1" dirty="0" smtClean="0">
                 <a:solidFill>
                   <a:schemeClr val="bg1"/>
                 </a:solidFill>
@@ -4022,230 +4037,40 @@
                 <a:ea typeface="SimSun" pitchFamily="2" charset="-122"/>
                 <a:cs typeface="Lucida Sans" pitchFamily="34" charset="0"/>
               </a:rPr>
-              <a:t>Department Name and Institution Name can go here</a:t>
+              <a:t>Bayer, Liz Nichols</a:t>
             </a:r>
-          </a:p>
-        </p:txBody>
-      </p:sp>
-      <p:sp>
-        <p:nvSpPr>
-          <p:cNvPr id="37" name="Text Box 242"/>
-          <p:cNvSpPr txBox="1">
-            <a:spLocks noChangeArrowheads="1"/>
-          </p:cNvSpPr>
-          <p:nvPr/>
-        </p:nvSpPr>
-        <p:spPr bwMode="auto">
-          <a:xfrm>
-            <a:off x="1218766" y="6820489"/>
-            <a:ext cx="18288433" cy="2862322"/>
-          </a:xfrm>
-          <a:prstGeom prst="rect">
-            <a:avLst/>
-          </a:prstGeom>
-          <a:solidFill>
-            <a:schemeClr val="bg1"/>
-          </a:solidFill>
-          <a:ln w="57150" cmpd="thinThick">
-            <a:noFill/>
-            <a:miter lim="800000"/>
-            <a:headEnd/>
-            <a:tailEnd/>
-          </a:ln>
-          <a:effectLst/>
-          <a:extLst>
-            <a:ext uri="{AF507438-7753-43e0-B8FC-AC1667EBCBE1}">
-              <a14:hiddenEffects xmlns:a14="http://schemas.microsoft.com/office/drawing/2010/main" xmlns="">
-                <a:effectLst>
-                  <a:outerShdw dist="35921" dir="2700000" algn="ctr" rotWithShape="0">
-                    <a:schemeClr val="bg2"/>
-                  </a:outerShdw>
-                </a:effectLst>
-              </a14:hiddenEffects>
-            </a:ext>
-          </a:extLst>
-        </p:spPr>
-        <p:txBody>
-          <a:bodyPr wrap="square" lIns="182880" tIns="91440" rIns="182880" bIns="182880">
-            <a:spAutoFit/>
-          </a:bodyPr>
-          <a:lstStyle>
-            <a:lvl1pPr marL="228600" indent="-228600" defTabSz="612775">
-              <a:defRPr sz="2400">
-                <a:solidFill>
-                  <a:schemeClr val="tx1"/>
-                </a:solidFill>
-                <a:latin typeface="Times New Roman" pitchFamily="18" charset="0"/>
-              </a:defRPr>
-            </a:lvl1pPr>
-            <a:lvl2pPr marL="742950" indent="-285750" defTabSz="612775">
-              <a:defRPr sz="2400">
-                <a:solidFill>
-                  <a:schemeClr val="tx1"/>
-                </a:solidFill>
-                <a:latin typeface="Times New Roman" pitchFamily="18" charset="0"/>
-              </a:defRPr>
-            </a:lvl2pPr>
-            <a:lvl3pPr marL="1143000" indent="-228600" defTabSz="612775">
-              <a:defRPr sz="2400">
-                <a:solidFill>
-                  <a:schemeClr val="tx1"/>
-                </a:solidFill>
-                <a:latin typeface="Times New Roman" pitchFamily="18" charset="0"/>
-              </a:defRPr>
-            </a:lvl3pPr>
-            <a:lvl4pPr marL="1600200" indent="-228600" defTabSz="612775">
-              <a:defRPr sz="2400">
-                <a:solidFill>
-                  <a:schemeClr val="tx1"/>
-                </a:solidFill>
-                <a:latin typeface="Times New Roman" pitchFamily="18" charset="0"/>
-              </a:defRPr>
-            </a:lvl4pPr>
-            <a:lvl5pPr marL="2057400" indent="-228600" defTabSz="612775">
-              <a:defRPr sz="2400">
-                <a:solidFill>
-                  <a:schemeClr val="tx1"/>
-                </a:solidFill>
-                <a:latin typeface="Times New Roman" pitchFamily="18" charset="0"/>
-              </a:defRPr>
-            </a:lvl5pPr>
-            <a:lvl6pPr marL="2514600" indent="-228600" defTabSz="612775" eaLnBrk="0" fontAlgn="base" hangingPunct="0">
-              <a:spcBef>
-                <a:spcPct val="0"/>
-              </a:spcBef>
-              <a:spcAft>
-                <a:spcPct val="0"/>
-              </a:spcAft>
-              <a:defRPr sz="2400">
-                <a:solidFill>
-                  <a:schemeClr val="tx1"/>
-                </a:solidFill>
-                <a:latin typeface="Times New Roman" pitchFamily="18" charset="0"/>
-              </a:defRPr>
-            </a:lvl6pPr>
-            <a:lvl7pPr marL="2971800" indent="-228600" defTabSz="612775" eaLnBrk="0" fontAlgn="base" hangingPunct="0">
-              <a:spcBef>
-                <a:spcPct val="0"/>
-              </a:spcBef>
-              <a:spcAft>
-                <a:spcPct val="0"/>
-              </a:spcAft>
-              <a:defRPr sz="2400">
-                <a:solidFill>
-                  <a:schemeClr val="tx1"/>
-                </a:solidFill>
-                <a:latin typeface="Times New Roman" pitchFamily="18" charset="0"/>
-              </a:defRPr>
-            </a:lvl7pPr>
-            <a:lvl8pPr marL="3429000" indent="-228600" defTabSz="612775" eaLnBrk="0" fontAlgn="base" hangingPunct="0">
-              <a:spcBef>
-                <a:spcPct val="0"/>
-              </a:spcBef>
-              <a:spcAft>
-                <a:spcPct val="0"/>
-              </a:spcAft>
-              <a:defRPr sz="2400">
-                <a:solidFill>
-                  <a:schemeClr val="tx1"/>
-                </a:solidFill>
-                <a:latin typeface="Times New Roman" pitchFamily="18" charset="0"/>
-              </a:defRPr>
-            </a:lvl8pPr>
-            <a:lvl9pPr marL="3886200" indent="-228600" defTabSz="612775" eaLnBrk="0" fontAlgn="base" hangingPunct="0">
-              <a:spcBef>
-                <a:spcPct val="0"/>
-              </a:spcBef>
-              <a:spcAft>
-                <a:spcPct val="0"/>
-              </a:spcAft>
-              <a:defRPr sz="2400">
-                <a:solidFill>
-                  <a:schemeClr val="tx1"/>
-                </a:solidFill>
-                <a:latin typeface="Times New Roman" pitchFamily="18" charset="0"/>
-              </a:defRPr>
-            </a:lvl9pPr>
-          </a:lstStyle>
-          <a:p>
-            <a:pPr algn="just">
-              <a:lnSpc>
-                <a:spcPct val="120000"/>
-              </a:lnSpc>
-              <a:buFontTx/>
-              <a:buChar char="•"/>
-            </a:pPr>
-            <a:r>
-              <a:rPr lang="en-US" altLang="ja-JP" sz="2800" dirty="0">
-                <a:solidFill>
-                  <a:schemeClr val="tx1">
-                    <a:lumMod val="75000"/>
-                    <a:lumOff val="25000"/>
-                  </a:schemeClr>
-                </a:solidFill>
-                <a:effectLst/>
-                <a:ea typeface="ＭＳ Ｐゴシック" charset="-128"/>
-              </a:rPr>
-              <a:t>Insert your text here.  You can change the font size to fit your text.  </a:t>
-            </a:r>
-          </a:p>
-          <a:p>
-            <a:pPr algn="just">
-              <a:lnSpc>
-                <a:spcPct val="120000"/>
-              </a:lnSpc>
-              <a:buFontTx/>
-              <a:buChar char="•"/>
-            </a:pPr>
-            <a:endParaRPr lang="en-US" altLang="ja-JP" sz="2800" dirty="0">
+            <a:endParaRPr lang="en-US" altLang="zh-CN" sz="5600" b="1" dirty="0">
               <a:solidFill>
-                <a:schemeClr val="tx1">
-                  <a:lumMod val="75000"/>
-                  <a:lumOff val="25000"/>
-                </a:schemeClr>
+                <a:schemeClr val="bg1"/>
               </a:solidFill>
               <a:effectLst/>
-              <a:ea typeface="ＭＳ Ｐゴシック" charset="-128"/>
+              <a:latin typeface="Lucida Sans" pitchFamily="34" charset="0"/>
+              <a:ea typeface="SimSun" pitchFamily="2" charset="-122"/>
+              <a:cs typeface="Lucida Sans" pitchFamily="34" charset="0"/>
             </a:endParaRPr>
           </a:p>
           <a:p>
-            <a:pPr algn="just">
-              <a:lnSpc>
-                <a:spcPct val="120000"/>
-              </a:lnSpc>
-              <a:buFontTx/>
-              <a:buChar char="•"/>
-            </a:pPr>
+            <a:pPr algn="ctr"/>
             <a:r>
-              <a:rPr lang="en-AU" sz="2800" dirty="0">
-                <a:solidFill>
-                  <a:schemeClr val="tx1">
-                    <a:lumMod val="75000"/>
-                    <a:lumOff val="25000"/>
-                  </a:schemeClr>
+              <a:rPr lang="en-US" altLang="zh-CN" sz="4200" b="1" dirty="0" smtClean="0">
+                <a:solidFill>
+                  <a:schemeClr val="bg1"/>
                 </a:solidFill>
                 <a:effectLst/>
+                <a:latin typeface="Lucida Sans" pitchFamily="34" charset="0"/>
+                <a:ea typeface="SimSun" pitchFamily="2" charset="-122"/>
+                <a:cs typeface="Lucida Sans" pitchFamily="34" charset="0"/>
               </a:rPr>
-              <a:t>You can also make this box shrink or grow with the amount of text.  Simply double click this text box, go to the “Text Box” tab, and check the option “Resize AutoShape to fit text”.</a:t>
+              <a:t>Computer Science, Carleton College</a:t>
             </a:r>
-          </a:p>
-          <a:p>
-            <a:pPr algn="just">
-              <a:lnSpc>
-                <a:spcPct val="120000"/>
-              </a:lnSpc>
-              <a:buFontTx/>
-              <a:buChar char="•"/>
-            </a:pPr>
-            <a:endParaRPr lang="en-US" altLang="ja-JP" sz="2800" dirty="0">
+            <a:endParaRPr lang="en-US" altLang="zh-CN" sz="4200" b="1" dirty="0">
               <a:solidFill>
-                <a:schemeClr val="tx1">
-                  <a:lumMod val="75000"/>
-                  <a:lumOff val="25000"/>
-                </a:schemeClr>
+                <a:schemeClr val="bg1"/>
               </a:solidFill>
               <a:effectLst/>
-              <a:ea typeface="ＭＳ Ｐゴシック" charset="-128"/>
+              <a:latin typeface="Lucida Sans" pitchFamily="34" charset="0"/>
+              <a:ea typeface="SimSun" pitchFamily="2" charset="-122"/>
+              <a:cs typeface="Lucida Sans" pitchFamily="34" charset="0"/>
             </a:endParaRPr>
           </a:p>
         </p:txBody>
@@ -4964,182 +4789,6 @@
       </p:grpSp>
       <p:sp>
         <p:nvSpPr>
-          <p:cNvPr id="56" name="Text Box 255"/>
-          <p:cNvSpPr txBox="1">
-            <a:spLocks noChangeArrowheads="1"/>
-          </p:cNvSpPr>
-          <p:nvPr/>
-        </p:nvSpPr>
-        <p:spPr bwMode="auto">
-          <a:xfrm>
-            <a:off x="30708600" y="32350146"/>
-            <a:ext cx="11963400" cy="519112"/>
-          </a:xfrm>
-          <a:prstGeom prst="rect">
-            <a:avLst/>
-          </a:prstGeom>
-          <a:noFill/>
-          <a:ln>
-            <a:noFill/>
-          </a:ln>
-          <a:effectLst/>
-          <a:extLst>
-            <a:ext uri="{909E8E84-426E-40dd-AFC4-6F175D3DCCD1}">
-              <a14:hiddenFill xmlns:a14="http://schemas.microsoft.com/office/drawing/2010/main" xmlns="">
-                <a:solidFill>
-                  <a:schemeClr val="accent1"/>
-                </a:solidFill>
-              </a14:hiddenFill>
-            </a:ext>
-            <a:ext uri="{91240B29-F687-4f45-9708-019B960494DF}">
-              <a14:hiddenLine xmlns:a14="http://schemas.microsoft.com/office/drawing/2010/main" xmlns="" w="9525">
-                <a:solidFill>
-                  <a:schemeClr val="tx1"/>
-                </a:solidFill>
-                <a:miter lim="800000"/>
-                <a:headEnd/>
-                <a:tailEnd/>
-              </a14:hiddenLine>
-            </a:ext>
-            <a:ext uri="{AF507438-7753-43e0-B8FC-AC1667EBCBE1}">
-              <a14:hiddenEffects xmlns:a14="http://schemas.microsoft.com/office/drawing/2010/main" xmlns="">
-                <a:effectLst>
-                  <a:outerShdw dist="35921" dir="2700000" algn="ctr" rotWithShape="0">
-                    <a:schemeClr val="bg2"/>
-                  </a:outerShdw>
-                </a:effectLst>
-              </a14:hiddenEffects>
-            </a:ext>
-          </a:extLst>
-        </p:spPr>
-        <p:txBody>
-          <a:bodyPr>
-            <a:spAutoFit/>
-          </a:bodyPr>
-          <a:lstStyle>
-            <a:lvl1pPr>
-              <a:defRPr sz="2400">
-                <a:solidFill>
-                  <a:schemeClr val="tx1"/>
-                </a:solidFill>
-                <a:latin typeface="Times New Roman" pitchFamily="18" charset="0"/>
-              </a:defRPr>
-            </a:lvl1pPr>
-            <a:lvl2pPr marL="742950" indent="-285750">
-              <a:defRPr sz="2400">
-                <a:solidFill>
-                  <a:schemeClr val="tx1"/>
-                </a:solidFill>
-                <a:latin typeface="Times New Roman" pitchFamily="18" charset="0"/>
-              </a:defRPr>
-            </a:lvl2pPr>
-            <a:lvl3pPr marL="1143000" indent="-228600">
-              <a:defRPr sz="2400">
-                <a:solidFill>
-                  <a:schemeClr val="tx1"/>
-                </a:solidFill>
-                <a:latin typeface="Times New Roman" pitchFamily="18" charset="0"/>
-              </a:defRPr>
-            </a:lvl3pPr>
-            <a:lvl4pPr marL="1600200" indent="-228600">
-              <a:defRPr sz="2400">
-                <a:solidFill>
-                  <a:schemeClr val="tx1"/>
-                </a:solidFill>
-                <a:latin typeface="Times New Roman" pitchFamily="18" charset="0"/>
-              </a:defRPr>
-            </a:lvl4pPr>
-            <a:lvl5pPr marL="2057400" indent="-228600">
-              <a:defRPr sz="2400">
-                <a:solidFill>
-                  <a:schemeClr val="tx1"/>
-                </a:solidFill>
-                <a:latin typeface="Times New Roman" pitchFamily="18" charset="0"/>
-              </a:defRPr>
-            </a:lvl5pPr>
-            <a:lvl6pPr marL="2514600" indent="-228600" eaLnBrk="0" fontAlgn="base" hangingPunct="0">
-              <a:spcBef>
-                <a:spcPct val="0"/>
-              </a:spcBef>
-              <a:spcAft>
-                <a:spcPct val="0"/>
-              </a:spcAft>
-              <a:defRPr sz="2400">
-                <a:solidFill>
-                  <a:schemeClr val="tx1"/>
-                </a:solidFill>
-                <a:latin typeface="Times New Roman" pitchFamily="18" charset="0"/>
-              </a:defRPr>
-            </a:lvl6pPr>
-            <a:lvl7pPr marL="2971800" indent="-228600" eaLnBrk="0" fontAlgn="base" hangingPunct="0">
-              <a:spcBef>
-                <a:spcPct val="0"/>
-              </a:spcBef>
-              <a:spcAft>
-                <a:spcPct val="0"/>
-              </a:spcAft>
-              <a:defRPr sz="2400">
-                <a:solidFill>
-                  <a:schemeClr val="tx1"/>
-                </a:solidFill>
-                <a:latin typeface="Times New Roman" pitchFamily="18" charset="0"/>
-              </a:defRPr>
-            </a:lvl7pPr>
-            <a:lvl8pPr marL="3429000" indent="-228600" eaLnBrk="0" fontAlgn="base" hangingPunct="0">
-              <a:spcBef>
-                <a:spcPct val="0"/>
-              </a:spcBef>
-              <a:spcAft>
-                <a:spcPct val="0"/>
-              </a:spcAft>
-              <a:defRPr sz="2400">
-                <a:solidFill>
-                  <a:schemeClr val="tx1"/>
-                </a:solidFill>
-                <a:latin typeface="Times New Roman" pitchFamily="18" charset="0"/>
-              </a:defRPr>
-            </a:lvl8pPr>
-            <a:lvl9pPr marL="3886200" indent="-228600" eaLnBrk="0" fontAlgn="base" hangingPunct="0">
-              <a:spcBef>
-                <a:spcPct val="0"/>
-              </a:spcBef>
-              <a:spcAft>
-                <a:spcPct val="0"/>
-              </a:spcAft>
-              <a:defRPr sz="2400">
-                <a:solidFill>
-                  <a:schemeClr val="tx1"/>
-                </a:solidFill>
-                <a:latin typeface="Times New Roman" pitchFamily="18" charset="0"/>
-              </a:defRPr>
-            </a:lvl9pPr>
-          </a:lstStyle>
-          <a:p>
-            <a:pPr algn="r"/>
-            <a:r>
-              <a:rPr lang="en-US" altLang="zh-CN" sz="2800" dirty="0">
-                <a:effectLst>
-                  <a:outerShdw blurRad="38100" dist="38100" dir="2700000" algn="tl">
-                    <a:srgbClr val="C0C0C0"/>
-                  </a:outerShdw>
-                </a:effectLst>
-                <a:ea typeface="SimSun" pitchFamily="2" charset="-122"/>
-              </a:rPr>
-              <a:t>Insert your acknowledgements  here.  This research supported by…</a:t>
-            </a:r>
-            <a:endParaRPr lang="zh-CN" altLang="en-US" sz="2800" dirty="0">
-              <a:effectLst>
-                <a:outerShdw blurRad="38100" dist="38100" dir="2700000" algn="tl">
-                  <a:srgbClr val="C0C0C0"/>
-                </a:outerShdw>
-              </a:effectLst>
-              <a:ea typeface="SimSun" pitchFamily="2" charset="-122"/>
-            </a:endParaRPr>
-          </a:p>
-        </p:txBody>
-      </p:sp>
-      <p:sp>
-        <p:nvSpPr>
           <p:cNvPr id="57" name="Text Box 263"/>
           <p:cNvSpPr txBox="1">
             <a:spLocks noChangeArrowheads="1"/>
@@ -5148,8 +4797,8 @@
         </p:nvSpPr>
         <p:spPr bwMode="auto">
           <a:xfrm>
-            <a:off x="20295747" y="6584995"/>
-            <a:ext cx="11098441" cy="6201698"/>
+            <a:off x="20242298" y="6584994"/>
+            <a:ext cx="11098441" cy="765081"/>
           </a:xfrm>
           <a:prstGeom prst="rect">
             <a:avLst/>
@@ -5277,86 +4926,6 @@
                 <a:spcPct val="125000"/>
               </a:lnSpc>
             </a:pPr>
-            <a:r>
-              <a:rPr lang="en-US" altLang="ja-JP" sz="2800" b="1" dirty="0">
-                <a:effectLst/>
-                <a:ea typeface="ＭＳ Ｐゴシック" charset="-128"/>
-              </a:rPr>
-              <a:t>Title Here</a:t>
-            </a:r>
-          </a:p>
-          <a:p>
-            <a:pPr>
-              <a:lnSpc>
-                <a:spcPct val="125000"/>
-              </a:lnSpc>
-            </a:pPr>
-            <a:r>
-              <a:rPr lang="en-US" altLang="ja-JP" sz="2800" dirty="0">
-                <a:effectLst/>
-                <a:ea typeface="ＭＳ Ｐゴシック" charset="-128"/>
-              </a:rPr>
-              <a:t>Insert your text here.  You can change the font size to fit your text.   </a:t>
-            </a:r>
-            <a:r>
-              <a:rPr lang="en-AU" sz="2800" dirty="0">
-                <a:effectLst/>
-              </a:rPr>
-              <a:t>You can also make this box shrink or grow with the amount of text.  Simply double click this text box, go to the “Text Box” tab, and check the option “Resize AutoShape to fit text”.  </a:t>
-            </a:r>
-          </a:p>
-          <a:p>
-            <a:pPr lvl="1">
-              <a:lnSpc>
-                <a:spcPct val="125000"/>
-              </a:lnSpc>
-              <a:buFontTx/>
-              <a:buChar char="•"/>
-            </a:pPr>
-            <a:r>
-              <a:rPr lang="en-US" altLang="ja-JP" sz="2800" dirty="0">
-                <a:effectLst/>
-                <a:ea typeface="ＭＳ Ｐゴシック" charset="-128"/>
-              </a:rPr>
-              <a:t>The background of this template may appear blue on your screen, but it does print lavender.  Insert your text here.  </a:t>
-            </a:r>
-          </a:p>
-          <a:p>
-            <a:pPr lvl="1">
-              <a:lnSpc>
-                <a:spcPct val="125000"/>
-              </a:lnSpc>
-              <a:buFontTx/>
-              <a:buChar char="•"/>
-            </a:pPr>
-            <a:r>
-              <a:rPr lang="en-US" altLang="ja-JP" sz="2800" dirty="0">
-                <a:effectLst/>
-                <a:ea typeface="ＭＳ Ｐゴシック" charset="-128"/>
-              </a:rPr>
-              <a:t>You can change the font size to fit your text.   </a:t>
-            </a:r>
-          </a:p>
-          <a:p>
-            <a:pPr lvl="1">
-              <a:lnSpc>
-                <a:spcPct val="125000"/>
-              </a:lnSpc>
-              <a:buFontTx/>
-              <a:buChar char="•"/>
-            </a:pPr>
-            <a:r>
-              <a:rPr lang="en-AU" sz="2800" dirty="0">
-                <a:effectLst/>
-              </a:rPr>
-              <a:t>You can also make this box shrink or grow with the amount of text.  Simply double click this text box, go to the “Text Box” tab, and check the option “Resize AutoShape to fit text</a:t>
-            </a:r>
-            <a:r>
-              <a:rPr lang="en-AU" sz="2800" dirty="0" smtClean="0">
-                <a:effectLst/>
-              </a:rPr>
-              <a:t>”</a:t>
-            </a:r>
             <a:endParaRPr lang="en-US" altLang="zh-CN" sz="2800" dirty="0">
               <a:effectLst/>
               <a:ea typeface="SimSun" pitchFamily="2" charset="-122"/>
@@ -6440,7 +6009,7 @@
         </p:nvGrpSpPr>
         <p:grpSpPr>
           <a:xfrm>
-            <a:off x="1066799" y="11931210"/>
+            <a:off x="1036496" y="11959598"/>
             <a:ext cx="18440401" cy="946293"/>
             <a:chOff x="1066799" y="5958162"/>
             <a:chExt cx="11007725" cy="946293"/>
@@ -6798,8 +6367,8 @@
         </p:nvSpPr>
         <p:spPr bwMode="auto">
           <a:xfrm>
-            <a:off x="1070810" y="12942788"/>
-            <a:ext cx="18436390" cy="2862322"/>
+            <a:off x="-19583400" y="-3539594"/>
+            <a:ext cx="18436390" cy="3905877"/>
           </a:xfrm>
           <a:prstGeom prst="rect">
             <a:avLst/>
@@ -6816,7 +6385,7 @@
           <a:effectLst/>
           <a:extLst>
             <a:ext uri="{AF507438-7753-43e0-B8FC-AC1667EBCBE1}">
-              <a14:hiddenEffects xmlns:a14="http://schemas.microsoft.com/office/drawing/2010/main" xmlns="">
+              <a14:hiddenEffects xmlns="" xmlns:a14="http://schemas.microsoft.com/office/drawing/2010/main">
                 <a:effectLst>
                   <a:outerShdw dist="35921" dir="2700000" algn="ctr" rotWithShape="0">
                     <a:schemeClr val="bg2"/>
@@ -6937,7 +6506,7 @@
               <a:buChar char="•"/>
             </a:pPr>
             <a:r>
-              <a:rPr lang="en-US" altLang="ja-JP" sz="2800" dirty="0">
+              <a:rPr lang="en-US" altLang="ja-JP" sz="4000" dirty="0" smtClean="0">
                 <a:solidFill>
                   <a:schemeClr val="tx1">
                     <a:lumMod val="75000"/>
@@ -6947,18 +6516,22 @@
                 <a:effectLst/>
                 <a:ea typeface="ＭＳ Ｐゴシック" charset="-128"/>
               </a:rPr>
-              <a:t>Insert your text here.  You can change the font size to fit your text.  </a:t>
+              <a:t>In any language, words break down into a set of fundamental elements called </a:t>
             </a:r>
-          </a:p>
-          <a:p>
-            <a:pPr algn="just">
-              <a:lnSpc>
-                <a:spcPct val="120000"/>
-              </a:lnSpc>
-              <a:buFontTx/>
-              <a:buChar char="•"/>
-            </a:pPr>
-            <a:endParaRPr lang="en-US" altLang="ja-JP" sz="2800" dirty="0">
+            <a:r>
+              <a:rPr lang="en-US" altLang="ja-JP" sz="4000" b="1" dirty="0" smtClean="0">
+                <a:solidFill>
+                  <a:schemeClr val="tx1">
+                    <a:lumMod val="75000"/>
+                    <a:lumOff val="25000"/>
+                  </a:schemeClr>
+                </a:solidFill>
+                <a:effectLst/>
+                <a:ea typeface="ＭＳ Ｐゴシック" charset="-128"/>
+              </a:rPr>
+              <a:t>phonemes</a:t>
+            </a:r>
+            <a:endParaRPr lang="en-US" altLang="ja-JP" sz="4000" dirty="0" smtClean="0">
               <a:solidFill>
                 <a:schemeClr val="tx1">
                   <a:lumMod val="75000"/>
@@ -6978,7 +6551,7 @@
               <a:buChar char="•"/>
             </a:pPr>
             <a:r>
-              <a:rPr lang="en-AU" sz="2800" dirty="0">
+              <a:rPr lang="en-US" altLang="ja-JP" sz="4000" dirty="0" smtClean="0">
                 <a:solidFill>
                   <a:schemeClr val="tx1">
                     <a:lumMod val="75000"/>
@@ -6986,8 +6559,9 @@
                   </a:schemeClr>
                 </a:solidFill>
                 <a:effectLst/>
+                <a:ea typeface="ＭＳ Ｐゴシック" charset="-128"/>
               </a:rPr>
-              <a:t>You can also make this box shrink or grow with the amount of text.  Simply double click this text box, go to the “Text Box” tab, and check the option “Resize AutoShape to fit text”.</a:t>
+              <a:t>Phonemes are defined by the physical processes necessary to produce them (e.g. air flow, tongue position)</a:t>
             </a:r>
           </a:p>
           <a:p>
@@ -6998,169 +6572,8 @@
               <a:buFontTx/>
               <a:buChar char="•"/>
             </a:pPr>
-            <a:endParaRPr lang="en-US" altLang="ja-JP" sz="2800" dirty="0">
-              <a:solidFill>
-                <a:schemeClr val="tx1">
-                  <a:lumMod val="75000"/>
-                  <a:lumOff val="25000"/>
-                </a:schemeClr>
-              </a:solidFill>
-              <a:effectLst/>
-              <a:ea typeface="ＭＳ Ｐゴシック" charset="-128"/>
-            </a:endParaRPr>
-          </a:p>
-        </p:txBody>
-      </p:sp>
-      <p:sp>
-        <p:nvSpPr>
-          <p:cNvPr id="79" name="Text Box 242"/>
-          <p:cNvSpPr txBox="1">
-            <a:spLocks noChangeArrowheads="1"/>
-          </p:cNvSpPr>
-          <p:nvPr/>
-        </p:nvSpPr>
-        <p:spPr bwMode="auto">
-          <a:xfrm>
-            <a:off x="1218767" y="6820489"/>
-            <a:ext cx="18102276" cy="2862322"/>
-          </a:xfrm>
-          <a:prstGeom prst="rect">
-            <a:avLst/>
-          </a:prstGeom>
-          <a:solidFill>
-            <a:schemeClr val="bg1"/>
-          </a:solidFill>
-          <a:ln w="57150" cmpd="thinThick">
-            <a:noFill/>
-            <a:miter lim="800000"/>
-            <a:headEnd/>
-            <a:tailEnd/>
-          </a:ln>
-          <a:effectLst/>
-          <a:extLst>
-            <a:ext uri="{AF507438-7753-43e0-B8FC-AC1667EBCBE1}">
-              <a14:hiddenEffects xmlns:a14="http://schemas.microsoft.com/office/drawing/2010/main" xmlns="">
-                <a:effectLst>
-                  <a:outerShdw dist="35921" dir="2700000" algn="ctr" rotWithShape="0">
-                    <a:schemeClr val="bg2"/>
-                  </a:outerShdw>
-                </a:effectLst>
-              </a14:hiddenEffects>
-            </a:ext>
-          </a:extLst>
-        </p:spPr>
-        <p:txBody>
-          <a:bodyPr wrap="square" lIns="182880" tIns="91440" rIns="182880" bIns="182880">
-            <a:spAutoFit/>
-          </a:bodyPr>
-          <a:lstStyle>
-            <a:lvl1pPr marL="228600" indent="-228600" defTabSz="612775">
-              <a:defRPr sz="2400">
-                <a:solidFill>
-                  <a:schemeClr val="tx1"/>
-                </a:solidFill>
-                <a:latin typeface="Times New Roman" pitchFamily="18" charset="0"/>
-              </a:defRPr>
-            </a:lvl1pPr>
-            <a:lvl2pPr marL="742950" indent="-285750" defTabSz="612775">
-              <a:defRPr sz="2400">
-                <a:solidFill>
-                  <a:schemeClr val="tx1"/>
-                </a:solidFill>
-                <a:latin typeface="Times New Roman" pitchFamily="18" charset="0"/>
-              </a:defRPr>
-            </a:lvl2pPr>
-            <a:lvl3pPr marL="1143000" indent="-228600" defTabSz="612775">
-              <a:defRPr sz="2400">
-                <a:solidFill>
-                  <a:schemeClr val="tx1"/>
-                </a:solidFill>
-                <a:latin typeface="Times New Roman" pitchFamily="18" charset="0"/>
-              </a:defRPr>
-            </a:lvl3pPr>
-            <a:lvl4pPr marL="1600200" indent="-228600" defTabSz="612775">
-              <a:defRPr sz="2400">
-                <a:solidFill>
-                  <a:schemeClr val="tx1"/>
-                </a:solidFill>
-                <a:latin typeface="Times New Roman" pitchFamily="18" charset="0"/>
-              </a:defRPr>
-            </a:lvl4pPr>
-            <a:lvl5pPr marL="2057400" indent="-228600" defTabSz="612775">
-              <a:defRPr sz="2400">
-                <a:solidFill>
-                  <a:schemeClr val="tx1"/>
-                </a:solidFill>
-                <a:latin typeface="Times New Roman" pitchFamily="18" charset="0"/>
-              </a:defRPr>
-            </a:lvl5pPr>
-            <a:lvl6pPr marL="2514600" indent="-228600" defTabSz="612775" eaLnBrk="0" fontAlgn="base" hangingPunct="0">
-              <a:spcBef>
-                <a:spcPct val="0"/>
-              </a:spcBef>
-              <a:spcAft>
-                <a:spcPct val="0"/>
-              </a:spcAft>
-              <a:defRPr sz="2400">
-                <a:solidFill>
-                  <a:schemeClr val="tx1"/>
-                </a:solidFill>
-                <a:latin typeface="Times New Roman" pitchFamily="18" charset="0"/>
-              </a:defRPr>
-            </a:lvl6pPr>
-            <a:lvl7pPr marL="2971800" indent="-228600" defTabSz="612775" eaLnBrk="0" fontAlgn="base" hangingPunct="0">
-              <a:spcBef>
-                <a:spcPct val="0"/>
-              </a:spcBef>
-              <a:spcAft>
-                <a:spcPct val="0"/>
-              </a:spcAft>
-              <a:defRPr sz="2400">
-                <a:solidFill>
-                  <a:schemeClr val="tx1"/>
-                </a:solidFill>
-                <a:latin typeface="Times New Roman" pitchFamily="18" charset="0"/>
-              </a:defRPr>
-            </a:lvl7pPr>
-            <a:lvl8pPr marL="3429000" indent="-228600" defTabSz="612775" eaLnBrk="0" fontAlgn="base" hangingPunct="0">
-              <a:spcBef>
-                <a:spcPct val="0"/>
-              </a:spcBef>
-              <a:spcAft>
-                <a:spcPct val="0"/>
-              </a:spcAft>
-              <a:defRPr sz="2400">
-                <a:solidFill>
-                  <a:schemeClr val="tx1"/>
-                </a:solidFill>
-                <a:latin typeface="Times New Roman" pitchFamily="18" charset="0"/>
-              </a:defRPr>
-            </a:lvl8pPr>
-            <a:lvl9pPr marL="3886200" indent="-228600" defTabSz="612775" eaLnBrk="0" fontAlgn="base" hangingPunct="0">
-              <a:spcBef>
-                <a:spcPct val="0"/>
-              </a:spcBef>
-              <a:spcAft>
-                <a:spcPct val="0"/>
-              </a:spcAft>
-              <a:defRPr sz="2400">
-                <a:solidFill>
-                  <a:schemeClr val="tx1"/>
-                </a:solidFill>
-                <a:latin typeface="Times New Roman" pitchFamily="18" charset="0"/>
-              </a:defRPr>
-            </a:lvl9pPr>
-          </a:lstStyle>
-          <a:p>
-            <a:pPr algn="just">
-              <a:lnSpc>
-                <a:spcPct val="120000"/>
-              </a:lnSpc>
-              <a:buFontTx/>
-              <a:buChar char="•"/>
-            </a:pPr>
             <a:r>
-              <a:rPr lang="en-US" altLang="ja-JP" sz="2800" dirty="0">
+              <a:rPr lang="en-US" altLang="ja-JP" sz="4000" dirty="0" smtClean="0">
                 <a:solidFill>
                   <a:schemeClr val="tx1">
                     <a:lumMod val="75000"/>
@@ -7170,58 +6583,9 @@
                 <a:effectLst/>
                 <a:ea typeface="ＭＳ Ｐゴシック" charset="-128"/>
               </a:rPr>
-              <a:t>Insert your text here.  You can change the font size to fit your text.  </a:t>
+              <a:t>Most English sounds can be qualified distinctly using only a handful of features</a:t>
             </a:r>
-          </a:p>
-          <a:p>
-            <a:pPr algn="just">
-              <a:lnSpc>
-                <a:spcPct val="120000"/>
-              </a:lnSpc>
-              <a:buFontTx/>
-              <a:buChar char="•"/>
-            </a:pPr>
-            <a:endParaRPr lang="en-US" altLang="ja-JP" sz="2800" dirty="0">
-              <a:solidFill>
-                <a:schemeClr val="tx1">
-                  <a:lumMod val="75000"/>
-                  <a:lumOff val="25000"/>
-                </a:schemeClr>
-              </a:solidFill>
-              <a:effectLst/>
-              <a:ea typeface="ＭＳ Ｐゴシック" charset="-128"/>
-            </a:endParaRPr>
-          </a:p>
-          <a:p>
-            <a:pPr algn="just">
-              <a:lnSpc>
-                <a:spcPct val="120000"/>
-              </a:lnSpc>
-              <a:buFontTx/>
-              <a:buChar char="•"/>
-            </a:pPr>
-            <a:r>
-              <a:rPr lang="en-AU" sz="2800" dirty="0">
-                <a:solidFill>
-                  <a:schemeClr val="tx1">
-                    <a:lumMod val="75000"/>
-                    <a:lumOff val="25000"/>
-                  </a:schemeClr>
-                </a:solidFill>
-                <a:effectLst/>
-              </a:rPr>
-              <a:t>You can also make this box shrink or grow with the amount of text.  Simply double click this text box, go to the “Text Box” tab, and check the option “Resize AutoShape to fit text”.</a:t>
-            </a:r>
-          </a:p>
-          <a:p>
-            <a:pPr algn="just">
-              <a:lnSpc>
-                <a:spcPct val="120000"/>
-              </a:lnSpc>
-              <a:buFontTx/>
-              <a:buChar char="•"/>
-            </a:pPr>
-            <a:endParaRPr lang="en-US" altLang="ja-JP" sz="2800" dirty="0">
+            <a:endParaRPr lang="en-US" altLang="ja-JP" sz="4000" dirty="0">
               <a:solidFill>
                 <a:schemeClr val="tx1">
                   <a:lumMod val="75000"/>
@@ -7244,8 +6608,8 @@
         </p:nvSpPr>
         <p:spPr bwMode="auto">
           <a:xfrm>
-            <a:off x="20242298" y="13837510"/>
-            <a:ext cx="11006953" cy="6201698"/>
+            <a:off x="20242298" y="14112985"/>
+            <a:ext cx="11006953" cy="765081"/>
           </a:xfrm>
           <a:prstGeom prst="rect">
             <a:avLst/>
@@ -7373,86 +6737,6 @@
                 <a:spcPct val="125000"/>
               </a:lnSpc>
             </a:pPr>
-            <a:r>
-              <a:rPr lang="en-US" altLang="ja-JP" sz="2800" b="1" dirty="0">
-                <a:effectLst/>
-                <a:ea typeface="ＭＳ Ｐゴシック" charset="-128"/>
-              </a:rPr>
-              <a:t>Title Here</a:t>
-            </a:r>
-          </a:p>
-          <a:p>
-            <a:pPr>
-              <a:lnSpc>
-                <a:spcPct val="125000"/>
-              </a:lnSpc>
-            </a:pPr>
-            <a:r>
-              <a:rPr lang="en-US" altLang="ja-JP" sz="2800" dirty="0">
-                <a:effectLst/>
-                <a:ea typeface="ＭＳ Ｐゴシック" charset="-128"/>
-              </a:rPr>
-              <a:t>Insert your text here.  You can change the font size to fit your text.   </a:t>
-            </a:r>
-            <a:r>
-              <a:rPr lang="en-AU" sz="2800" dirty="0">
-                <a:effectLst/>
-              </a:rPr>
-              <a:t>You can also make this box shrink or grow with the amount of text.  Simply double click this text box, go to the “Text Box” tab, and check the option “Resize AutoShape to fit text”.  </a:t>
-            </a:r>
-          </a:p>
-          <a:p>
-            <a:pPr lvl="1">
-              <a:lnSpc>
-                <a:spcPct val="125000"/>
-              </a:lnSpc>
-              <a:buFontTx/>
-              <a:buChar char="•"/>
-            </a:pPr>
-            <a:r>
-              <a:rPr lang="en-US" altLang="ja-JP" sz="2800" dirty="0">
-                <a:effectLst/>
-                <a:ea typeface="ＭＳ Ｐゴシック" charset="-128"/>
-              </a:rPr>
-              <a:t>The background of this template may appear blue on your screen, but it does print lavender.  Insert your text here.  </a:t>
-            </a:r>
-          </a:p>
-          <a:p>
-            <a:pPr lvl="1">
-              <a:lnSpc>
-                <a:spcPct val="125000"/>
-              </a:lnSpc>
-              <a:buFontTx/>
-              <a:buChar char="•"/>
-            </a:pPr>
-            <a:r>
-              <a:rPr lang="en-US" altLang="ja-JP" sz="2800" dirty="0">
-                <a:effectLst/>
-                <a:ea typeface="ＭＳ Ｐゴシック" charset="-128"/>
-              </a:rPr>
-              <a:t>You can change the font size to fit your text.   </a:t>
-            </a:r>
-          </a:p>
-          <a:p>
-            <a:pPr lvl="1">
-              <a:lnSpc>
-                <a:spcPct val="125000"/>
-              </a:lnSpc>
-              <a:buFontTx/>
-              <a:buChar char="•"/>
-            </a:pPr>
-            <a:r>
-              <a:rPr lang="en-AU" sz="2800" dirty="0">
-                <a:effectLst/>
-              </a:rPr>
-              <a:t>You can also make this box shrink or grow with the amount of text.  Simply double click this text box, go to the “Text Box” tab, and check the option “Resize AutoShape to fit text</a:t>
-            </a:r>
-            <a:r>
-              <a:rPr lang="en-AU" sz="2800" dirty="0" smtClean="0">
-                <a:effectLst/>
-              </a:rPr>
-              <a:t>”</a:t>
-            </a:r>
             <a:endParaRPr lang="en-AU" sz="2800" dirty="0">
               <a:effectLst/>
             </a:endParaRPr>
@@ -7469,8 +6753,8 @@
         </p:nvSpPr>
         <p:spPr bwMode="auto">
           <a:xfrm>
-            <a:off x="20242298" y="21049524"/>
-            <a:ext cx="10954629" cy="6201698"/>
+            <a:off x="20242298" y="21114158"/>
+            <a:ext cx="10954629" cy="765081"/>
           </a:xfrm>
           <a:prstGeom prst="rect">
             <a:avLst/>
@@ -7598,86 +6882,6 @@
                 <a:spcPct val="125000"/>
               </a:lnSpc>
             </a:pPr>
-            <a:r>
-              <a:rPr lang="en-US" altLang="ja-JP" sz="2800" b="1" dirty="0">
-                <a:effectLst/>
-                <a:ea typeface="ＭＳ Ｐゴシック" charset="-128"/>
-              </a:rPr>
-              <a:t>Title Here</a:t>
-            </a:r>
-          </a:p>
-          <a:p>
-            <a:pPr>
-              <a:lnSpc>
-                <a:spcPct val="125000"/>
-              </a:lnSpc>
-            </a:pPr>
-            <a:r>
-              <a:rPr lang="en-US" altLang="ja-JP" sz="2800" dirty="0">
-                <a:effectLst/>
-                <a:ea typeface="ＭＳ Ｐゴシック" charset="-128"/>
-              </a:rPr>
-              <a:t>Insert your text here.  You can change the font size to fit your text.   </a:t>
-            </a:r>
-            <a:r>
-              <a:rPr lang="en-AU" sz="2800" dirty="0">
-                <a:effectLst/>
-              </a:rPr>
-              <a:t>You can also make this box shrink or grow with the amount of text.  Simply double click this text box, go to the “Text Box” tab, and check the option “Resize AutoShape to fit text”.  </a:t>
-            </a:r>
-          </a:p>
-          <a:p>
-            <a:pPr lvl="1">
-              <a:lnSpc>
-                <a:spcPct val="125000"/>
-              </a:lnSpc>
-              <a:buFontTx/>
-              <a:buChar char="•"/>
-            </a:pPr>
-            <a:r>
-              <a:rPr lang="en-US" altLang="ja-JP" sz="2800" dirty="0">
-                <a:effectLst/>
-                <a:ea typeface="ＭＳ Ｐゴシック" charset="-128"/>
-              </a:rPr>
-              <a:t>The background of this template may appear blue on your screen, but it does print lavender.  Insert your text here.  </a:t>
-            </a:r>
-          </a:p>
-          <a:p>
-            <a:pPr lvl="1">
-              <a:lnSpc>
-                <a:spcPct val="125000"/>
-              </a:lnSpc>
-              <a:buFontTx/>
-              <a:buChar char="•"/>
-            </a:pPr>
-            <a:r>
-              <a:rPr lang="en-US" altLang="ja-JP" sz="2800" dirty="0">
-                <a:effectLst/>
-                <a:ea typeface="ＭＳ Ｐゴシック" charset="-128"/>
-              </a:rPr>
-              <a:t>You can change the font size to fit your text.   </a:t>
-            </a:r>
-          </a:p>
-          <a:p>
-            <a:pPr lvl="1">
-              <a:lnSpc>
-                <a:spcPct val="125000"/>
-              </a:lnSpc>
-              <a:buFontTx/>
-              <a:buChar char="•"/>
-            </a:pPr>
-            <a:r>
-              <a:rPr lang="en-AU" sz="2800" dirty="0">
-                <a:effectLst/>
-              </a:rPr>
-              <a:t>You can also make this box shrink or grow with the amount of text.  Simply double click this text box, go to the “Text Box” tab, and check the option “Resize AutoShape to fit text</a:t>
-            </a:r>
-            <a:r>
-              <a:rPr lang="en-AU" sz="2800" dirty="0" smtClean="0">
-                <a:effectLst/>
-              </a:rPr>
-              <a:t>”.</a:t>
-            </a:r>
             <a:endParaRPr lang="en-AU" sz="2800" dirty="0">
               <a:effectLst/>
             </a:endParaRPr>
@@ -8378,6 +7582,809 @@
           </p:txBody>
         </p:sp>
       </p:grpSp>
+      <p:sp>
+        <p:nvSpPr>
+          <p:cNvPr id="38" name="Text Box 242"/>
+          <p:cNvSpPr txBox="1">
+            <a:spLocks noChangeArrowheads="1"/>
+          </p:cNvSpPr>
+          <p:nvPr/>
+        </p:nvSpPr>
+        <p:spPr bwMode="auto">
+          <a:xfrm>
+            <a:off x="879424" y="18820692"/>
+            <a:ext cx="18436390" cy="748923"/>
+          </a:xfrm>
+          <a:prstGeom prst="rect">
+            <a:avLst/>
+          </a:prstGeom>
+          <a:solidFill>
+            <a:schemeClr val="bg1"/>
+          </a:solidFill>
+          <a:ln w="57150" cmpd="thinThick">
+            <a:noFill/>
+            <a:miter lim="800000"/>
+            <a:headEnd/>
+            <a:tailEnd/>
+          </a:ln>
+          <a:effectLst/>
+          <a:extLst>
+            <a:ext uri="{AF507438-7753-43e0-B8FC-AC1667EBCBE1}">
+              <a14:hiddenEffects xmlns="" xmlns:a14="http://schemas.microsoft.com/office/drawing/2010/main">
+                <a:effectLst>
+                  <a:outerShdw dist="35921" dir="2700000" algn="ctr" rotWithShape="0">
+                    <a:schemeClr val="bg2"/>
+                  </a:outerShdw>
+                </a:effectLst>
+              </a14:hiddenEffects>
+            </a:ext>
+          </a:extLst>
+        </p:spPr>
+        <p:txBody>
+          <a:bodyPr wrap="square" lIns="182880" tIns="91440" rIns="182880" bIns="182880">
+            <a:spAutoFit/>
+          </a:bodyPr>
+          <a:lstStyle>
+            <a:lvl1pPr marL="228600" indent="-228600" defTabSz="612775">
+              <a:defRPr sz="2400">
+                <a:solidFill>
+                  <a:schemeClr val="tx1"/>
+                </a:solidFill>
+                <a:latin typeface="Times New Roman" pitchFamily="18" charset="0"/>
+              </a:defRPr>
+            </a:lvl1pPr>
+            <a:lvl2pPr marL="742950" indent="-285750" defTabSz="612775">
+              <a:defRPr sz="2400">
+                <a:solidFill>
+                  <a:schemeClr val="tx1"/>
+                </a:solidFill>
+                <a:latin typeface="Times New Roman" pitchFamily="18" charset="0"/>
+              </a:defRPr>
+            </a:lvl2pPr>
+            <a:lvl3pPr marL="1143000" indent="-228600" defTabSz="612775">
+              <a:defRPr sz="2400">
+                <a:solidFill>
+                  <a:schemeClr val="tx1"/>
+                </a:solidFill>
+                <a:latin typeface="Times New Roman" pitchFamily="18" charset="0"/>
+              </a:defRPr>
+            </a:lvl3pPr>
+            <a:lvl4pPr marL="1600200" indent="-228600" defTabSz="612775">
+              <a:defRPr sz="2400">
+                <a:solidFill>
+                  <a:schemeClr val="tx1"/>
+                </a:solidFill>
+                <a:latin typeface="Times New Roman" pitchFamily="18" charset="0"/>
+              </a:defRPr>
+            </a:lvl4pPr>
+            <a:lvl5pPr marL="2057400" indent="-228600" defTabSz="612775">
+              <a:defRPr sz="2400">
+                <a:solidFill>
+                  <a:schemeClr val="tx1"/>
+                </a:solidFill>
+                <a:latin typeface="Times New Roman" pitchFamily="18" charset="0"/>
+              </a:defRPr>
+            </a:lvl5pPr>
+            <a:lvl6pPr marL="2514600" indent="-228600" defTabSz="612775" eaLnBrk="0" fontAlgn="base" hangingPunct="0">
+              <a:spcBef>
+                <a:spcPct val="0"/>
+              </a:spcBef>
+              <a:spcAft>
+                <a:spcPct val="0"/>
+              </a:spcAft>
+              <a:defRPr sz="2400">
+                <a:solidFill>
+                  <a:schemeClr val="tx1"/>
+                </a:solidFill>
+                <a:latin typeface="Times New Roman" pitchFamily="18" charset="0"/>
+              </a:defRPr>
+            </a:lvl6pPr>
+            <a:lvl7pPr marL="2971800" indent="-228600" defTabSz="612775" eaLnBrk="0" fontAlgn="base" hangingPunct="0">
+              <a:spcBef>
+                <a:spcPct val="0"/>
+              </a:spcBef>
+              <a:spcAft>
+                <a:spcPct val="0"/>
+              </a:spcAft>
+              <a:defRPr sz="2400">
+                <a:solidFill>
+                  <a:schemeClr val="tx1"/>
+                </a:solidFill>
+                <a:latin typeface="Times New Roman" pitchFamily="18" charset="0"/>
+              </a:defRPr>
+            </a:lvl7pPr>
+            <a:lvl8pPr marL="3429000" indent="-228600" defTabSz="612775" eaLnBrk="0" fontAlgn="base" hangingPunct="0">
+              <a:spcBef>
+                <a:spcPct val="0"/>
+              </a:spcBef>
+              <a:spcAft>
+                <a:spcPct val="0"/>
+              </a:spcAft>
+              <a:defRPr sz="2400">
+                <a:solidFill>
+                  <a:schemeClr val="tx1"/>
+                </a:solidFill>
+                <a:latin typeface="Times New Roman" pitchFamily="18" charset="0"/>
+              </a:defRPr>
+            </a:lvl8pPr>
+            <a:lvl9pPr marL="3886200" indent="-228600" defTabSz="612775" eaLnBrk="0" fontAlgn="base" hangingPunct="0">
+              <a:spcBef>
+                <a:spcPct val="0"/>
+              </a:spcBef>
+              <a:spcAft>
+                <a:spcPct val="0"/>
+              </a:spcAft>
+              <a:defRPr sz="2400">
+                <a:solidFill>
+                  <a:schemeClr val="tx1"/>
+                </a:solidFill>
+                <a:latin typeface="Times New Roman" pitchFamily="18" charset="0"/>
+              </a:defRPr>
+            </a:lvl9pPr>
+          </a:lstStyle>
+          <a:p>
+            <a:pPr algn="just">
+              <a:lnSpc>
+                <a:spcPct val="120000"/>
+              </a:lnSpc>
+              <a:buFontTx/>
+              <a:buChar char="•"/>
+            </a:pPr>
+            <a:endParaRPr lang="en-US" altLang="ja-JP" sz="2800" dirty="0">
+              <a:solidFill>
+                <a:schemeClr val="tx1">
+                  <a:lumMod val="75000"/>
+                  <a:lumOff val="25000"/>
+                </a:schemeClr>
+              </a:solidFill>
+              <a:effectLst/>
+              <a:ea typeface="ＭＳ Ｐゴシック" charset="-128"/>
+            </a:endParaRPr>
+          </a:p>
+        </p:txBody>
+      </p:sp>
+      <p:sp>
+        <p:nvSpPr>
+          <p:cNvPr id="45" name="Text Box 263"/>
+          <p:cNvSpPr txBox="1">
+            <a:spLocks noChangeArrowheads="1"/>
+          </p:cNvSpPr>
+          <p:nvPr/>
+        </p:nvSpPr>
+        <p:spPr bwMode="auto">
+          <a:xfrm>
+            <a:off x="20370635" y="28803598"/>
+            <a:ext cx="11025483" cy="838202"/>
+          </a:xfrm>
+          <a:prstGeom prst="rect">
+            <a:avLst/>
+          </a:prstGeom>
+          <a:solidFill>
+            <a:schemeClr val="accent3">
+              <a:lumMod val="40000"/>
+              <a:lumOff val="60000"/>
+            </a:schemeClr>
+          </a:solidFill>
+          <a:ln w="57150" cmpd="thinThick">
+            <a:noFill/>
+            <a:miter lim="800000"/>
+            <a:headEnd/>
+            <a:tailEnd/>
+          </a:ln>
+          <a:effectLst/>
+          <a:extLst/>
+        </p:spPr>
+        <p:txBody>
+          <a:bodyPr wrap="square" lIns="182880" tIns="91440" rIns="182880" bIns="182880">
+            <a:spAutoFit/>
+          </a:bodyPr>
+          <a:lstStyle>
+            <a:lvl1pPr>
+              <a:defRPr sz="2400">
+                <a:solidFill>
+                  <a:schemeClr val="tx1"/>
+                </a:solidFill>
+                <a:latin typeface="Times New Roman" pitchFamily="18" charset="0"/>
+              </a:defRPr>
+            </a:lvl1pPr>
+            <a:lvl2pPr marL="685800" indent="-228600">
+              <a:defRPr sz="2400">
+                <a:solidFill>
+                  <a:schemeClr val="tx1"/>
+                </a:solidFill>
+                <a:latin typeface="Times New Roman" pitchFamily="18" charset="0"/>
+              </a:defRPr>
+            </a:lvl2pPr>
+            <a:lvl3pPr marL="1143000" indent="-228600">
+              <a:defRPr sz="2400">
+                <a:solidFill>
+                  <a:schemeClr val="tx1"/>
+                </a:solidFill>
+                <a:latin typeface="Times New Roman" pitchFamily="18" charset="0"/>
+              </a:defRPr>
+            </a:lvl3pPr>
+            <a:lvl4pPr marL="1600200" indent="-228600">
+              <a:defRPr sz="2400">
+                <a:solidFill>
+                  <a:schemeClr val="tx1"/>
+                </a:solidFill>
+                <a:latin typeface="Times New Roman" pitchFamily="18" charset="0"/>
+              </a:defRPr>
+            </a:lvl4pPr>
+            <a:lvl5pPr marL="2057400" indent="-228600">
+              <a:defRPr sz="2400">
+                <a:solidFill>
+                  <a:schemeClr val="tx1"/>
+                </a:solidFill>
+                <a:latin typeface="Times New Roman" pitchFamily="18" charset="0"/>
+              </a:defRPr>
+            </a:lvl5pPr>
+            <a:lvl6pPr marL="2514600" indent="-228600" eaLnBrk="0" fontAlgn="base" hangingPunct="0">
+              <a:spcBef>
+                <a:spcPct val="0"/>
+              </a:spcBef>
+              <a:spcAft>
+                <a:spcPct val="0"/>
+              </a:spcAft>
+              <a:defRPr sz="2400">
+                <a:solidFill>
+                  <a:schemeClr val="tx1"/>
+                </a:solidFill>
+                <a:latin typeface="Times New Roman" pitchFamily="18" charset="0"/>
+              </a:defRPr>
+            </a:lvl6pPr>
+            <a:lvl7pPr marL="2971800" indent="-228600" eaLnBrk="0" fontAlgn="base" hangingPunct="0">
+              <a:spcBef>
+                <a:spcPct val="0"/>
+              </a:spcBef>
+              <a:spcAft>
+                <a:spcPct val="0"/>
+              </a:spcAft>
+              <a:defRPr sz="2400">
+                <a:solidFill>
+                  <a:schemeClr val="tx1"/>
+                </a:solidFill>
+                <a:latin typeface="Times New Roman" pitchFamily="18" charset="0"/>
+              </a:defRPr>
+            </a:lvl7pPr>
+            <a:lvl8pPr marL="3429000" indent="-228600" eaLnBrk="0" fontAlgn="base" hangingPunct="0">
+              <a:spcBef>
+                <a:spcPct val="0"/>
+              </a:spcBef>
+              <a:spcAft>
+                <a:spcPct val="0"/>
+              </a:spcAft>
+              <a:defRPr sz="2400">
+                <a:solidFill>
+                  <a:schemeClr val="tx1"/>
+                </a:solidFill>
+                <a:latin typeface="Times New Roman" pitchFamily="18" charset="0"/>
+              </a:defRPr>
+            </a:lvl8pPr>
+            <a:lvl9pPr marL="3886200" indent="-228600" eaLnBrk="0" fontAlgn="base" hangingPunct="0">
+              <a:spcBef>
+                <a:spcPct val="0"/>
+              </a:spcBef>
+              <a:spcAft>
+                <a:spcPct val="0"/>
+              </a:spcAft>
+              <a:defRPr sz="2400">
+                <a:solidFill>
+                  <a:schemeClr val="tx1"/>
+                </a:solidFill>
+                <a:latin typeface="Times New Roman" pitchFamily="18" charset="0"/>
+              </a:defRPr>
+            </a:lvl9pPr>
+          </a:lstStyle>
+          <a:p>
+            <a:pPr>
+              <a:lnSpc>
+                <a:spcPct val="125000"/>
+              </a:lnSpc>
+            </a:pPr>
+            <a:endParaRPr lang="en-AU" sz="2800" dirty="0">
+              <a:effectLst/>
+            </a:endParaRPr>
+          </a:p>
+        </p:txBody>
+      </p:sp>
+      <p:sp>
+        <p:nvSpPr>
+          <p:cNvPr id="46" name="Text Box 263"/>
+          <p:cNvSpPr txBox="1">
+            <a:spLocks noChangeArrowheads="1"/>
+          </p:cNvSpPr>
+          <p:nvPr/>
+        </p:nvSpPr>
+        <p:spPr bwMode="auto">
+          <a:xfrm>
+            <a:off x="32433161" y="28803598"/>
+            <a:ext cx="11025483" cy="838202"/>
+          </a:xfrm>
+          <a:prstGeom prst="rect">
+            <a:avLst/>
+          </a:prstGeom>
+          <a:solidFill>
+            <a:schemeClr val="accent3">
+              <a:lumMod val="40000"/>
+              <a:lumOff val="60000"/>
+            </a:schemeClr>
+          </a:solidFill>
+          <a:ln w="57150" cmpd="thinThick">
+            <a:noFill/>
+            <a:miter lim="800000"/>
+            <a:headEnd/>
+            <a:tailEnd/>
+          </a:ln>
+          <a:effectLst/>
+          <a:extLst/>
+        </p:spPr>
+        <p:txBody>
+          <a:bodyPr wrap="square" lIns="182880" tIns="91440" rIns="182880" bIns="182880">
+            <a:spAutoFit/>
+          </a:bodyPr>
+          <a:lstStyle>
+            <a:lvl1pPr>
+              <a:defRPr sz="2400">
+                <a:solidFill>
+                  <a:schemeClr val="tx1"/>
+                </a:solidFill>
+                <a:latin typeface="Times New Roman" pitchFamily="18" charset="0"/>
+              </a:defRPr>
+            </a:lvl1pPr>
+            <a:lvl2pPr marL="685800" indent="-228600">
+              <a:defRPr sz="2400">
+                <a:solidFill>
+                  <a:schemeClr val="tx1"/>
+                </a:solidFill>
+                <a:latin typeface="Times New Roman" pitchFamily="18" charset="0"/>
+              </a:defRPr>
+            </a:lvl2pPr>
+            <a:lvl3pPr marL="1143000" indent="-228600">
+              <a:defRPr sz="2400">
+                <a:solidFill>
+                  <a:schemeClr val="tx1"/>
+                </a:solidFill>
+                <a:latin typeface="Times New Roman" pitchFamily="18" charset="0"/>
+              </a:defRPr>
+            </a:lvl3pPr>
+            <a:lvl4pPr marL="1600200" indent="-228600">
+              <a:defRPr sz="2400">
+                <a:solidFill>
+                  <a:schemeClr val="tx1"/>
+                </a:solidFill>
+                <a:latin typeface="Times New Roman" pitchFamily="18" charset="0"/>
+              </a:defRPr>
+            </a:lvl4pPr>
+            <a:lvl5pPr marL="2057400" indent="-228600">
+              <a:defRPr sz="2400">
+                <a:solidFill>
+                  <a:schemeClr val="tx1"/>
+                </a:solidFill>
+                <a:latin typeface="Times New Roman" pitchFamily="18" charset="0"/>
+              </a:defRPr>
+            </a:lvl5pPr>
+            <a:lvl6pPr marL="2514600" indent="-228600" eaLnBrk="0" fontAlgn="base" hangingPunct="0">
+              <a:spcBef>
+                <a:spcPct val="0"/>
+              </a:spcBef>
+              <a:spcAft>
+                <a:spcPct val="0"/>
+              </a:spcAft>
+              <a:defRPr sz="2400">
+                <a:solidFill>
+                  <a:schemeClr val="tx1"/>
+                </a:solidFill>
+                <a:latin typeface="Times New Roman" pitchFamily="18" charset="0"/>
+              </a:defRPr>
+            </a:lvl6pPr>
+            <a:lvl7pPr marL="2971800" indent="-228600" eaLnBrk="0" fontAlgn="base" hangingPunct="0">
+              <a:spcBef>
+                <a:spcPct val="0"/>
+              </a:spcBef>
+              <a:spcAft>
+                <a:spcPct val="0"/>
+              </a:spcAft>
+              <a:defRPr sz="2400">
+                <a:solidFill>
+                  <a:schemeClr val="tx1"/>
+                </a:solidFill>
+                <a:latin typeface="Times New Roman" pitchFamily="18" charset="0"/>
+              </a:defRPr>
+            </a:lvl7pPr>
+            <a:lvl8pPr marL="3429000" indent="-228600" eaLnBrk="0" fontAlgn="base" hangingPunct="0">
+              <a:spcBef>
+                <a:spcPct val="0"/>
+              </a:spcBef>
+              <a:spcAft>
+                <a:spcPct val="0"/>
+              </a:spcAft>
+              <a:defRPr sz="2400">
+                <a:solidFill>
+                  <a:schemeClr val="tx1"/>
+                </a:solidFill>
+                <a:latin typeface="Times New Roman" pitchFamily="18" charset="0"/>
+              </a:defRPr>
+            </a:lvl8pPr>
+            <a:lvl9pPr marL="3886200" indent="-228600" eaLnBrk="0" fontAlgn="base" hangingPunct="0">
+              <a:spcBef>
+                <a:spcPct val="0"/>
+              </a:spcBef>
+              <a:spcAft>
+                <a:spcPct val="0"/>
+              </a:spcAft>
+              <a:defRPr sz="2400">
+                <a:solidFill>
+                  <a:schemeClr val="tx1"/>
+                </a:solidFill>
+                <a:latin typeface="Times New Roman" pitchFamily="18" charset="0"/>
+              </a:defRPr>
+            </a:lvl9pPr>
+          </a:lstStyle>
+          <a:p>
+            <a:pPr>
+              <a:lnSpc>
+                <a:spcPct val="125000"/>
+              </a:lnSpc>
+            </a:pPr>
+            <a:endParaRPr lang="en-AU" sz="2800" dirty="0">
+              <a:effectLst/>
+            </a:endParaRPr>
+          </a:p>
+        </p:txBody>
+      </p:sp>
+      <p:graphicFrame>
+        <p:nvGraphicFramePr>
+          <p:cNvPr id="3" name="Table 2"/>
+          <p:cNvGraphicFramePr>
+            <a:graphicFrameLocks noGrp="1"/>
+          </p:cNvGraphicFramePr>
+          <p:nvPr>
+            <p:extLst>
+              <p:ext uri="{D42A27DB-BD31-4B8C-83A1-F6EECF244321}">
+                <p14:modId xmlns:p14="http://schemas.microsoft.com/office/powerpoint/2010/main" val="656202401"/>
+              </p:ext>
+            </p:extLst>
+          </p:nvPr>
+        </p:nvGraphicFramePr>
+        <p:xfrm>
+          <a:off x="1066799" y="12934280"/>
+          <a:ext cx="18440400" cy="4226107"/>
+        </p:xfrm>
+        <a:graphic>
+          <a:graphicData uri="http://schemas.openxmlformats.org/drawingml/2006/table">
+            <a:tbl>
+              <a:tblPr firstRow="1" bandRow="1">
+                <a:tableStyleId>{306799F8-075E-4A3A-A7F6-7FBC6576F1A4}</a:tableStyleId>
+              </a:tblPr>
+              <a:tblGrid>
+                <a:gridCol w="4610100"/>
+                <a:gridCol w="4610100"/>
+                <a:gridCol w="4610100"/>
+                <a:gridCol w="4610100"/>
+              </a:tblGrid>
+              <a:tr h="4226107">
+                <a:tc>
+                  <a:txBody>
+                    <a:bodyPr/>
+                    <a:lstStyle/>
+                    <a:p>
+                      <a:pPr algn="l">
+                        <a:lnSpc>
+                          <a:spcPct val="120000"/>
+                        </a:lnSpc>
+                        <a:buFontTx/>
+                        <a:buNone/>
+                      </a:pPr>
+                      <a:r>
+                        <a:rPr lang="en-US" altLang="ja-JP" sz="3600" b="0" dirty="0" smtClean="0">
+                          <a:solidFill>
+                            <a:schemeClr val="bg1"/>
+                          </a:solidFill>
+                          <a:effectLst/>
+                          <a:ea typeface="ＭＳ Ｐゴシック" charset="-128"/>
+                        </a:rPr>
+                        <a:t>In any language, words break down into a set of fundamental elements called </a:t>
+                      </a:r>
+                      <a:r>
+                        <a:rPr lang="en-US" altLang="ja-JP" sz="3600" b="1" dirty="0" smtClean="0">
+                          <a:solidFill>
+                            <a:schemeClr val="accent2">
+                              <a:lumMod val="50000"/>
+                            </a:schemeClr>
+                          </a:solidFill>
+                          <a:effectLst/>
+                          <a:ea typeface="ＭＳ Ｐゴシック" charset="-128"/>
+                        </a:rPr>
+                        <a:t>phonemes</a:t>
+                      </a:r>
+                      <a:endParaRPr lang="en-US" altLang="ja-JP" sz="3600" dirty="0" smtClean="0">
+                        <a:solidFill>
+                          <a:schemeClr val="accent2">
+                            <a:lumMod val="50000"/>
+                          </a:schemeClr>
+                        </a:solidFill>
+                        <a:effectLst/>
+                        <a:ea typeface="ＭＳ Ｐゴシック" charset="-128"/>
+                      </a:endParaRPr>
+                    </a:p>
+                  </a:txBody>
+                  <a:tcPr/>
+                </a:tc>
+                <a:tc>
+                  <a:txBody>
+                    <a:bodyPr/>
+                    <a:lstStyle/>
+                    <a:p>
+                      <a:pPr marL="0" marR="0" indent="0" algn="l" defTabSz="914400" rtl="0" eaLnBrk="1" fontAlgn="auto" latinLnBrk="0" hangingPunct="1">
+                        <a:lnSpc>
+                          <a:spcPct val="100000"/>
+                        </a:lnSpc>
+                        <a:spcBef>
+                          <a:spcPts val="0"/>
+                        </a:spcBef>
+                        <a:spcAft>
+                          <a:spcPts val="0"/>
+                        </a:spcAft>
+                        <a:buClrTx/>
+                        <a:buSzTx/>
+                        <a:buFontTx/>
+                        <a:buNone/>
+                        <a:tabLst/>
+                        <a:defRPr/>
+                      </a:pPr>
+                      <a:r>
+                        <a:rPr lang="en-US" sz="3600" b="0" dirty="0" smtClean="0"/>
+                        <a:t>The</a:t>
+                      </a:r>
+                      <a:r>
+                        <a:rPr lang="en-US" sz="3600" b="0" baseline="0" dirty="0" smtClean="0"/>
+                        <a:t> </a:t>
+                      </a:r>
+                      <a:r>
+                        <a:rPr lang="en-US" sz="3600" b="1" baseline="0" dirty="0" smtClean="0">
+                          <a:solidFill>
+                            <a:schemeClr val="accent2">
+                              <a:lumMod val="40000"/>
+                              <a:lumOff val="60000"/>
+                            </a:schemeClr>
+                          </a:solidFill>
+                        </a:rPr>
+                        <a:t>features</a:t>
+                      </a:r>
+                      <a:r>
+                        <a:rPr lang="en-US" sz="3600" b="1" baseline="0" dirty="0" smtClean="0">
+                          <a:solidFill>
+                            <a:schemeClr val="accent2">
+                              <a:lumMod val="20000"/>
+                              <a:lumOff val="80000"/>
+                            </a:schemeClr>
+                          </a:solidFill>
+                        </a:rPr>
+                        <a:t> </a:t>
+                      </a:r>
+                      <a:r>
+                        <a:rPr lang="en-US" sz="3600" b="0" baseline="0" dirty="0" smtClean="0">
+                          <a:solidFill>
+                            <a:schemeClr val="bg1"/>
+                          </a:solidFill>
+                        </a:rPr>
+                        <a:t>of a phoneme describe the physical processes used to produce it</a:t>
+                      </a:r>
+                    </a:p>
+                    <a:p>
+                      <a:endParaRPr lang="en-US" dirty="0"/>
+                    </a:p>
+                  </a:txBody>
+                  <a:tcPr/>
+                </a:tc>
+                <a:tc>
+                  <a:txBody>
+                    <a:bodyPr/>
+                    <a:lstStyle/>
+                    <a:p>
+                      <a:r>
+                        <a:rPr lang="en-US" sz="3600" b="0" i="0" u="none" strike="noStrike" kern="1200" dirty="0" smtClean="0">
+                          <a:solidFill>
+                            <a:schemeClr val="lt1"/>
+                          </a:solidFill>
+                          <a:effectLst/>
+                          <a:latin typeface="+mn-lt"/>
+                          <a:ea typeface="+mn-ea"/>
+                          <a:cs typeface="+mn-cs"/>
+                        </a:rPr>
+                        <a:t>We analyzed characters for both the types of sounds they tended to make, and the specific sounds they made</a:t>
+                      </a:r>
+                      <a:endParaRPr lang="en-US" sz="3600" b="1" dirty="0">
+                        <a:solidFill>
+                          <a:schemeClr val="accent2">
+                            <a:lumMod val="50000"/>
+                          </a:schemeClr>
+                        </a:solidFill>
+                      </a:endParaRPr>
+                    </a:p>
+                  </a:txBody>
+                  <a:tcPr/>
+                </a:tc>
+                <a:tc>
+                  <a:txBody>
+                    <a:bodyPr/>
+                    <a:lstStyle/>
+                    <a:p>
+                      <a:endParaRPr lang="en-US" dirty="0"/>
+                    </a:p>
+                  </a:txBody>
+                  <a:tcPr/>
+                </a:tc>
+              </a:tr>
+            </a:tbl>
+          </a:graphicData>
+        </a:graphic>
+      </p:graphicFrame>
+      <p:graphicFrame>
+        <p:nvGraphicFramePr>
+          <p:cNvPr id="47" name="Table 46"/>
+          <p:cNvGraphicFramePr>
+            <a:graphicFrameLocks noGrp="1"/>
+          </p:cNvGraphicFramePr>
+          <p:nvPr>
+            <p:extLst>
+              <p:ext uri="{D42A27DB-BD31-4B8C-83A1-F6EECF244321}">
+                <p14:modId xmlns:p14="http://schemas.microsoft.com/office/powerpoint/2010/main" val="1801247129"/>
+              </p:ext>
+            </p:extLst>
+          </p:nvPr>
+        </p:nvGraphicFramePr>
+        <p:xfrm>
+          <a:off x="1066800" y="6896141"/>
+          <a:ext cx="18410096" cy="3848059"/>
+        </p:xfrm>
+        <a:graphic>
+          <a:graphicData uri="http://schemas.openxmlformats.org/drawingml/2006/table">
+            <a:tbl>
+              <a:tblPr firstRow="1" bandRow="1">
+                <a:tableStyleId>{306799F8-075E-4A3A-A7F6-7FBC6576F1A4}</a:tableStyleId>
+              </a:tblPr>
+              <a:tblGrid>
+                <a:gridCol w="4579796"/>
+                <a:gridCol w="4610100"/>
+                <a:gridCol w="4610100"/>
+                <a:gridCol w="4610100"/>
+              </a:tblGrid>
+              <a:tr h="3848059">
+                <a:tc>
+                  <a:txBody>
+                    <a:bodyPr/>
+                    <a:lstStyle/>
+                    <a:p>
+                      <a:pPr marL="0" indent="0" rtl="0">
+                        <a:buFont typeface="Arial" charset="0"/>
+                        <a:buNone/>
+                      </a:pPr>
+                      <a:r>
+                        <a:rPr lang="en-US" sz="1800" b="0" i="0" u="none" strike="noStrike" kern="1200" smtClean="0">
+                          <a:solidFill>
+                            <a:schemeClr val="lt1"/>
+                          </a:solidFill>
+                          <a:effectLst/>
+                          <a:latin typeface="+mn-lt"/>
+                          <a:ea typeface="+mn-ea"/>
+                          <a:cs typeface="+mn-cs"/>
+                        </a:rPr>
+                        <a:t>The sounds that make up a word are thought to have meaning. </a:t>
+                      </a:r>
+                      <a:endParaRPr lang="en-US" sz="3600" b="0" i="0" u="none" strike="noStrike" kern="1200" smtClean="0">
+                        <a:solidFill>
+                          <a:schemeClr val="lt1"/>
+                        </a:solidFill>
+                        <a:effectLst/>
+                        <a:latin typeface="+mn-lt"/>
+                        <a:ea typeface="+mn-ea"/>
+                        <a:cs typeface="+mn-cs"/>
+                      </a:endParaRPr>
+                    </a:p>
+                    <a:p>
+                      <a:pPr marL="0" indent="0" rtl="0">
+                        <a:buFont typeface="Arial" charset="0"/>
+                        <a:buNone/>
+                      </a:pPr>
+                      <a:r>
+                        <a:rPr lang="en-US" sz="3600" b="0" smtClean="0">
+                          <a:effectLst/>
+                        </a:rPr>
+                        <a:t/>
+                      </a:r>
+                      <a:br>
+                        <a:rPr lang="en-US" sz="3600" b="0" smtClean="0">
+                          <a:effectLst/>
+                        </a:rPr>
+                      </a:br>
+                      <a:r>
+                        <a:rPr lang="en-US" sz="1800" b="0" i="0" u="none" strike="noStrike" kern="1200" smtClean="0">
+                          <a:solidFill>
+                            <a:schemeClr val="lt1"/>
+                          </a:solidFill>
+                          <a:effectLst/>
+                          <a:latin typeface="+mn-lt"/>
+                          <a:ea typeface="+mn-ea"/>
+                          <a:cs typeface="+mn-cs"/>
+                        </a:rPr>
+                        <a:t>When researchers make up gibberish words for objects, people tend to agree on which gibberish words should refer to small and large objects. </a:t>
+                      </a:r>
+                      <a:endParaRPr lang="en-US" sz="3600" b="0" smtClean="0">
+                        <a:effectLst/>
+                      </a:endParaRPr>
+                    </a:p>
+                    <a:p>
+                      <a:pPr marL="0" indent="0" rtl="0">
+                        <a:buFont typeface="Arial" charset="0"/>
+                        <a:buNone/>
+                      </a:pPr>
+                      <a:r>
+                        <a:rPr lang="en-US" sz="3600" b="0" smtClean="0">
+                          <a:effectLst/>
+                        </a:rPr>
+                        <a:t/>
+                      </a:r>
+                      <a:br>
+                        <a:rPr lang="en-US" sz="3600" b="0" smtClean="0">
+                          <a:effectLst/>
+                        </a:rPr>
+                      </a:br>
+                      <a:r>
+                        <a:rPr lang="en-US" sz="1800" b="0" i="0" u="none" strike="noStrike" kern="1200" smtClean="0">
+                          <a:solidFill>
+                            <a:schemeClr val="lt1"/>
+                          </a:solidFill>
+                          <a:effectLst/>
+                          <a:latin typeface="+mn-lt"/>
+                          <a:ea typeface="+mn-ea"/>
+                          <a:cs typeface="+mn-cs"/>
+                        </a:rPr>
+                        <a:t>When close reading a poem, readers pay attention to assonance and consonance and draw meaning from the repetition of sounds.</a:t>
+                      </a:r>
+                      <a:endParaRPr lang="en-US" sz="3600" b="0" smtClean="0">
+                        <a:effectLst/>
+                      </a:endParaRPr>
+                    </a:p>
+                  </a:txBody>
+                  <a:tcPr/>
+                </a:tc>
+                <a:tc>
+                  <a:txBody>
+                    <a:bodyPr/>
+                    <a:lstStyle/>
+                    <a:p>
+                      <a:endParaRPr lang="en-US" dirty="0"/>
+                    </a:p>
+                  </a:txBody>
+                  <a:tcPr/>
+                </a:tc>
+                <a:tc>
+                  <a:txBody>
+                    <a:bodyPr/>
+                    <a:lstStyle/>
+                    <a:p>
+                      <a:endParaRPr lang="en-US" dirty="0"/>
+                    </a:p>
+                  </a:txBody>
+                  <a:tcPr/>
+                </a:tc>
+                <a:tc>
+                  <a:txBody>
+                    <a:bodyPr/>
+                    <a:lstStyle/>
+                    <a:p>
+                      <a:endParaRPr lang="en-US" dirty="0"/>
+                    </a:p>
+                  </a:txBody>
+                  <a:tcPr/>
+                </a:tc>
+              </a:tr>
+            </a:tbl>
+          </a:graphicData>
+        </a:graphic>
+      </p:graphicFrame>
     </p:spTree>
   </p:cSld>
   <p:clrMapOvr>
@@ -8636,7 +8643,7 @@
         <a:effectLst/>
         <a:extLst>
           <a:ext uri="{AF507438-7753-43e0-B8FC-AC1667EBCBE1}">
-            <a14:hiddenEffects xmlns:a14="http://schemas.microsoft.com/office/drawing/2010/main" xmlns="">
+            <a14:hiddenEffects xmlns="" xmlns:a14="http://schemas.microsoft.com/office/drawing/2010/main">
               <a:effectLst>
                 <a:outerShdw dist="35921" dir="2700000" algn="ctr" rotWithShape="0">
                   <a:schemeClr val="bg2"/>
@@ -8715,7 +8722,7 @@
         <a:effectLst/>
         <a:extLst>
           <a:ext uri="{AF507438-7753-43e0-B8FC-AC1667EBCBE1}">
-            <a14:hiddenEffects xmlns:a14="http://schemas.microsoft.com/office/drawing/2010/main" xmlns="">
+            <a14:hiddenEffects xmlns="" xmlns:a14="http://schemas.microsoft.com/office/drawing/2010/main">
               <a:effectLst>
                 <a:outerShdw dist="35921" dir="2700000" algn="ctr" rotWithShape="0">
                   <a:schemeClr val="bg2"/>

</xml_diff>

<commit_message>
Updated some style aspects of z-score, added icon
</commit_message>
<xml_diff>
--- a/Poster Rough Draft.pptx
+++ b/Poster Rough Draft.pptx
@@ -4071,8 +4071,8 @@
         </p:nvGrpSpPr>
         <p:grpSpPr>
           <a:xfrm>
-            <a:off x="1066799" y="5953110"/>
-            <a:ext cx="18440401" cy="946293"/>
+            <a:off x="1257832" y="5644079"/>
+            <a:ext cx="14501833" cy="946293"/>
             <a:chOff x="1066799" y="5958162"/>
             <a:chExt cx="11007725" cy="946293"/>
           </a:xfrm>
@@ -4427,8 +4427,8 @@
         </p:nvGrpSpPr>
         <p:grpSpPr>
           <a:xfrm>
-            <a:off x="884360" y="17909310"/>
-            <a:ext cx="18622840" cy="911382"/>
+            <a:off x="1227529" y="16733927"/>
+            <a:ext cx="14508304" cy="968400"/>
             <a:chOff x="1066799" y="5958162"/>
             <a:chExt cx="11007725" cy="946293"/>
           </a:xfrm>
@@ -4785,8 +4785,8 @@
         </p:nvSpPr>
         <p:spPr bwMode="auto">
           <a:xfrm>
-            <a:off x="20242298" y="6810977"/>
-            <a:ext cx="11098441" cy="5663089"/>
+            <a:off x="16116299" y="6728012"/>
+            <a:ext cx="10501571" cy="5650990"/>
           </a:xfrm>
           <a:prstGeom prst="rect">
             <a:avLst/>
@@ -5024,8 +5024,8 @@
         </p:nvGrpSpPr>
         <p:grpSpPr>
           <a:xfrm>
-            <a:off x="20242298" y="5932682"/>
-            <a:ext cx="23162896" cy="879457"/>
+            <a:off x="16116299" y="5639430"/>
+            <a:ext cx="26846618" cy="1089743"/>
             <a:chOff x="1066799" y="5958162"/>
             <a:chExt cx="11007725" cy="946293"/>
           </a:xfrm>
@@ -5380,8 +5380,8 @@
         </p:nvGrpSpPr>
         <p:grpSpPr>
           <a:xfrm>
-            <a:off x="20242298" y="12937761"/>
-            <a:ext cx="23104987" cy="931461"/>
+            <a:off x="16116299" y="12928883"/>
+            <a:ext cx="26846618" cy="931461"/>
             <a:chOff x="1066799" y="5958162"/>
             <a:chExt cx="11007725" cy="946293"/>
           </a:xfrm>
@@ -5736,8 +5736,8 @@
         </p:nvGrpSpPr>
         <p:grpSpPr>
           <a:xfrm>
-            <a:off x="20242298" y="20123284"/>
-            <a:ext cx="23104987" cy="954314"/>
+            <a:off x="16116300" y="20654242"/>
+            <a:ext cx="26858944" cy="954314"/>
             <a:chOff x="1066799" y="5958162"/>
             <a:chExt cx="11007725" cy="946293"/>
           </a:xfrm>
@@ -6092,8 +6092,8 @@
         </p:nvGrpSpPr>
         <p:grpSpPr>
           <a:xfrm>
-            <a:off x="1036496" y="11959598"/>
-            <a:ext cx="18440401" cy="946293"/>
+            <a:off x="1227529" y="11160103"/>
+            <a:ext cx="14501833" cy="946293"/>
             <a:chOff x="1066799" y="5958162"/>
             <a:chExt cx="11007725" cy="946293"/>
           </a:xfrm>
@@ -6691,8 +6691,8 @@
         </p:nvSpPr>
         <p:spPr bwMode="auto">
           <a:xfrm>
-            <a:off x="20242298" y="13850172"/>
-            <a:ext cx="11006953" cy="5663089"/>
+            <a:off x="16116299" y="13841294"/>
+            <a:ext cx="10501571" cy="6201698"/>
           </a:xfrm>
           <a:prstGeom prst="rect">
             <a:avLst/>
@@ -6963,8 +6963,8 @@
         </p:nvSpPr>
         <p:spPr bwMode="auto">
           <a:xfrm>
-            <a:off x="20242298" y="21075273"/>
-            <a:ext cx="10954629" cy="765081"/>
+            <a:off x="16116299" y="21606231"/>
+            <a:ext cx="11098441" cy="972158"/>
           </a:xfrm>
           <a:prstGeom prst="rect">
             <a:avLst/>
@@ -7106,7 +7106,7 @@
         </p:nvGrpSpPr>
         <p:grpSpPr>
           <a:xfrm>
-            <a:off x="32316269" y="27874169"/>
+            <a:off x="31931901" y="28402453"/>
             <a:ext cx="11031016" cy="929429"/>
             <a:chOff x="1066799" y="5958162"/>
             <a:chExt cx="11007725" cy="946293"/>
@@ -7453,8 +7453,8 @@
         </p:nvGrpSpPr>
         <p:grpSpPr>
           <a:xfrm>
-            <a:off x="20370635" y="27874170"/>
-            <a:ext cx="11031016" cy="929429"/>
+            <a:off x="16116299" y="28409421"/>
+            <a:ext cx="15560432" cy="929429"/>
             <a:chOff x="1066799" y="5958162"/>
             <a:chExt cx="11007725" cy="946293"/>
           </a:xfrm>
@@ -7802,8 +7802,8 @@
         </p:nvSpPr>
         <p:spPr bwMode="auto">
           <a:xfrm>
-            <a:off x="879423" y="18820692"/>
-            <a:ext cx="18627777" cy="748923"/>
+            <a:off x="1218766" y="17713471"/>
+            <a:ext cx="14510596" cy="723781"/>
           </a:xfrm>
           <a:prstGeom prst="rect">
             <a:avLst/>
@@ -7963,8 +7963,8 @@
         </p:nvSpPr>
         <p:spPr bwMode="auto">
           <a:xfrm>
-            <a:off x="20370635" y="28803598"/>
-            <a:ext cx="11025483" cy="1354217"/>
+            <a:off x="16116299" y="29331882"/>
+            <a:ext cx="15552627" cy="1354217"/>
           </a:xfrm>
           <a:prstGeom prst="rect">
             <a:avLst/>
@@ -8096,7 +8096,7 @@
               <a:rPr lang="en-AU" sz="2800" dirty="0" smtClean="0">
                 <a:effectLst/>
               </a:rPr>
-              <a:t>Expanding analysis beyond Shakespeare.</a:t>
+              <a:t>Expanding analysis beyond Shakespeare</a:t>
             </a:r>
           </a:p>
           <a:p>
@@ -8121,7 +8121,7 @@
         </p:nvSpPr>
         <p:spPr bwMode="auto">
           <a:xfrm>
-            <a:off x="32321802" y="28803598"/>
+            <a:off x="31937434" y="29251810"/>
             <a:ext cx="11025483" cy="765081"/>
           </a:xfrm>
           <a:prstGeom prst="rect">
@@ -8271,14 +8271,14 @@
           <p:nvPr>
             <p:extLst>
               <p:ext uri="{D42A27DB-BD31-4B8C-83A1-F6EECF244321}">
-                <p14:modId xmlns:p14="http://schemas.microsoft.com/office/powerpoint/2010/main" val="119705940"/>
+                <p14:modId xmlns:p14="http://schemas.microsoft.com/office/powerpoint/2010/main" val="51431164"/>
               </p:ext>
             </p:extLst>
           </p:nvPr>
         </p:nvGraphicFramePr>
         <p:xfrm>
-          <a:off x="1066799" y="12934280"/>
-          <a:ext cx="18410096" cy="4226107"/>
+          <a:off x="1257832" y="12134785"/>
+          <a:ext cx="14478001" cy="4226107"/>
         </p:xfrm>
         <a:graphic>
           <a:graphicData uri="http://schemas.openxmlformats.org/drawingml/2006/table">
@@ -8287,9 +8287,9 @@
                 <a:tableStyleId>{306799F8-075E-4A3A-A7F6-7FBC6576F1A4}</a:tableStyleId>
               </a:tblPr>
               <a:tblGrid>
-                <a:gridCol w="6019801"/>
-                <a:gridCol w="6172200"/>
-                <a:gridCol w="6218095"/>
+                <a:gridCol w="4734070"/>
+                <a:gridCol w="4853919"/>
+                <a:gridCol w="4890012"/>
               </a:tblGrid>
               <a:tr h="4226107">
                 <a:tc>
@@ -8517,14 +8517,14 @@
           <p:nvPr>
             <p:extLst>
               <p:ext uri="{D42A27DB-BD31-4B8C-83A1-F6EECF244321}">
-                <p14:modId xmlns:p14="http://schemas.microsoft.com/office/powerpoint/2010/main" val="1411816610"/>
+                <p14:modId xmlns:p14="http://schemas.microsoft.com/office/powerpoint/2010/main" val="414882539"/>
               </p:ext>
             </p:extLst>
           </p:nvPr>
         </p:nvGraphicFramePr>
         <p:xfrm>
-          <a:off x="1066800" y="6896141"/>
-          <a:ext cx="18410096" cy="3848059"/>
+          <a:off x="1257833" y="6587110"/>
+          <a:ext cx="14478001" cy="4206240"/>
         </p:xfrm>
         <a:graphic>
           <a:graphicData uri="http://schemas.openxmlformats.org/drawingml/2006/table">
@@ -8533,10 +8533,10 @@
                 <a:tableStyleId>{306799F8-075E-4A3A-A7F6-7FBC6576F1A4}</a:tableStyleId>
               </a:tblPr>
               <a:tblGrid>
-                <a:gridCol w="4579796"/>
-                <a:gridCol w="4610100"/>
-                <a:gridCol w="4610100"/>
-                <a:gridCol w="4610100"/>
+                <a:gridCol w="3601627"/>
+                <a:gridCol w="3625458"/>
+                <a:gridCol w="3625458"/>
+                <a:gridCol w="3625458"/>
               </a:tblGrid>
               <a:tr h="3848059">
                 <a:tc>
@@ -8856,7 +8856,7 @@
         </p:blipFill>
         <p:spPr>
           <a:xfrm>
-            <a:off x="31655169" y="8415441"/>
+            <a:off x="26770739" y="7836495"/>
             <a:ext cx="5638800" cy="4229100"/>
           </a:xfrm>
           <a:prstGeom prst="rect">
@@ -8886,7 +8886,7 @@
         </p:blipFill>
         <p:spPr>
           <a:xfrm>
-            <a:off x="37665550" y="6894320"/>
+            <a:off x="31668926" y="6659502"/>
             <a:ext cx="5739644" cy="4304733"/>
           </a:xfrm>
           <a:prstGeom prst="rect">
@@ -8902,7 +8902,7 @@
         </p:nvSpPr>
         <p:spPr>
           <a:xfrm>
-            <a:off x="32766000" y="7268338"/>
+            <a:off x="27881570" y="6689392"/>
             <a:ext cx="3787356" cy="1200329"/>
           </a:xfrm>
           <a:prstGeom prst="rect">
@@ -8918,11 +8918,7 @@
           <a:p>
             <a:r>
               <a:rPr lang="en-US" dirty="0" smtClean="0"/>
-              <a:t>Confusion matrix resulting from weighted naïve Bayes classification </a:t>
-            </a:r>
-            <a:r>
-              <a:rPr lang="en-US" smtClean="0"/>
-              <a:t>of gender</a:t>
+              <a:t>Confusion matrix resulting from weighted naïve Bayes classification of gender</a:t>
             </a:r>
             <a:endParaRPr lang="en-US" dirty="0" smtClean="0"/>
           </a:p>
@@ -8936,8 +8932,8 @@
         </p:nvSpPr>
         <p:spPr>
           <a:xfrm>
-            <a:off x="39243000" y="11780549"/>
-            <a:ext cx="3276600" cy="1569660"/>
+            <a:off x="33246376" y="10886514"/>
+            <a:ext cx="3505200" cy="1569660"/>
           </a:xfrm>
           <a:prstGeom prst="rect">
             <a:avLst/>
@@ -8952,7 +8948,7 @@
           <a:p>
             <a:r>
               <a:rPr lang="en-US" dirty="0" smtClean="0"/>
-              <a:t>Confusion matrix resulting from weighted iterative naïve Bayes classification</a:t>
+              <a:t>Confusion matrix resulting from weighted iterative naïve Bayes classification of role</a:t>
             </a:r>
             <a:endParaRPr lang="en-US" dirty="0" smtClean="0"/>
           </a:p>
@@ -8980,7 +8976,7 @@
         </p:blipFill>
         <p:spPr>
           <a:xfrm>
-            <a:off x="7048187" y="18918188"/>
+            <a:off x="1218766" y="17702327"/>
             <a:ext cx="12428708" cy="8955981"/>
           </a:xfrm>
           <a:prstGeom prst="rect">

</xml_diff>

<commit_message>
Save ur work Estelle
</commit_message>
<xml_diff>
--- a/Poster Rough Draft.pptx
+++ b/Poster Rough Draft.pptx
@@ -8856,7 +8856,7 @@
         </p:blipFill>
         <p:spPr>
           <a:xfrm>
-            <a:off x="26770739" y="7836495"/>
+            <a:off x="31085933" y="6775507"/>
             <a:ext cx="5638800" cy="4229100"/>
           </a:xfrm>
           <a:prstGeom prst="rect">
@@ -8886,7 +8886,7 @@
         </p:blipFill>
         <p:spPr>
           <a:xfrm>
-            <a:off x="31668926" y="6659502"/>
+            <a:off x="37275537" y="6892220"/>
             <a:ext cx="5739644" cy="4304733"/>
           </a:xfrm>
           <a:prstGeom prst="rect">
@@ -8902,7 +8902,7 @@
         </p:nvSpPr>
         <p:spPr>
           <a:xfrm>
-            <a:off x="27881570" y="6689392"/>
+            <a:off x="32411570" y="11387476"/>
             <a:ext cx="3787356" cy="1200329"/>
           </a:xfrm>
           <a:prstGeom prst="rect">
@@ -8918,7 +8918,15 @@
           <a:p>
             <a:r>
               <a:rPr lang="en-US" dirty="0" smtClean="0"/>
-              <a:t>Confusion matrix resulting from weighted naïve Bayes classification of gender</a:t>
+              <a:t>Confusion matrix resulting from </a:t>
+            </a:r>
+            <a:r>
+              <a:rPr lang="en-US" smtClean="0"/>
+              <a:t>weighted naïve </a:t>
+            </a:r>
+            <a:r>
+              <a:rPr lang="en-US" dirty="0" smtClean="0"/>
+              <a:t>Bayes classification of gender</a:t>
             </a:r>
             <a:endParaRPr lang="en-US" dirty="0" smtClean="0"/>
           </a:p>
@@ -8932,7 +8940,7 @@
         </p:nvSpPr>
         <p:spPr>
           <a:xfrm>
-            <a:off x="33246376" y="10886514"/>
+            <a:off x="38503079" y="11412268"/>
             <a:ext cx="3505200" cy="1569660"/>
           </a:xfrm>
           <a:prstGeom prst="rect">
@@ -8984,6 +8992,66 @@
           </a:prstGeom>
         </p:spPr>
       </p:pic>
+      <p:pic>
+        <p:nvPicPr>
+          <p:cNvPr id="12" name="Picture 11"/>
+          <p:cNvPicPr>
+            <a:picLocks noChangeAspect="1"/>
+          </p:cNvPicPr>
+          <p:nvPr/>
+        </p:nvPicPr>
+        <p:blipFill>
+          <a:blip r:embed="rId6">
+            <a:extLst>
+              <a:ext uri="{28A0092B-C50C-407E-A947-70E740481C1C}">
+                <a14:useLocalDpi xmlns:a14="http://schemas.microsoft.com/office/drawing/2010/main" val="0"/>
+              </a:ext>
+            </a:extLst>
+          </a:blip>
+          <a:stretch>
+            <a:fillRect/>
+          </a:stretch>
+        </p:blipFill>
+        <p:spPr>
+          <a:xfrm>
+            <a:off x="27115423" y="6923205"/>
+            <a:ext cx="3574895" cy="4465835"/>
+          </a:xfrm>
+          <a:prstGeom prst="rect">
+            <a:avLst/>
+          </a:prstGeom>
+        </p:spPr>
+      </p:pic>
+      <p:sp>
+        <p:nvSpPr>
+          <p:cNvPr id="49" name="TextBox 48"/>
+          <p:cNvSpPr txBox="1"/>
+          <p:nvPr/>
+        </p:nvSpPr>
+        <p:spPr>
+          <a:xfrm>
+            <a:off x="27621042" y="11378273"/>
+            <a:ext cx="3787356" cy="1569660"/>
+          </a:xfrm>
+          <a:prstGeom prst="rect">
+            <a:avLst/>
+          </a:prstGeom>
+          <a:noFill/>
+        </p:spPr>
+        <p:txBody>
+          <a:bodyPr wrap="square" rtlCol="0">
+            <a:spAutoFit/>
+          </a:bodyPr>
+          <a:lstStyle/>
+          <a:p>
+            <a:r>
+              <a:rPr lang="en-US" dirty="0" smtClean="0"/>
+              <a:t>The iterative naïve Bayes process yields more useful results in highly unbalanced data sets</a:t>
+            </a:r>
+            <a:endParaRPr lang="en-US" dirty="0" smtClean="0"/>
+          </a:p>
+        </p:txBody>
+      </p:sp>
     </p:spTree>
   </p:cSld>
   <p:clrMapOvr>

</xml_diff>

<commit_message>
Wow this rough draft is less rough
</commit_message>
<xml_diff>
--- a/Poster Rough Draft.pptx
+++ b/Poster Rough Draft.pptx
@@ -6885,7 +6885,66 @@
               <a:rPr lang="en-AU" sz="2800" dirty="0" smtClean="0">
                 <a:effectLst/>
               </a:rPr>
-              <a:t> features and phonemes by </a:t>
+              <a:t> </a:t>
+            </a:r>
+            <a:r>
+              <a:rPr lang="en-AU" sz="2800" dirty="0" smtClean="0">
+                <a:solidFill>
+                  <a:schemeClr val="accent2">
+                    <a:lumMod val="50000"/>
+                  </a:schemeClr>
+                </a:solidFill>
+                <a:effectLst/>
+              </a:rPr>
+              <a:t>features</a:t>
+            </a:r>
+            <a:r>
+              <a:rPr lang="en-AU" sz="2800" dirty="0" smtClean="0">
+                <a:solidFill>
+                  <a:schemeClr val="accent2">
+                    <a:lumMod val="40000"/>
+                    <a:lumOff val="60000"/>
+                  </a:schemeClr>
+                </a:solidFill>
+                <a:effectLst/>
+              </a:rPr>
+              <a:t> </a:t>
+            </a:r>
+            <a:r>
+              <a:rPr lang="en-AU" sz="2800" dirty="0" smtClean="0">
+                <a:effectLst/>
+              </a:rPr>
+              <a:t>and </a:t>
+            </a:r>
+            <a:r>
+              <a:rPr lang="en-AU" sz="2800" dirty="0" smtClean="0">
+                <a:solidFill>
+                  <a:schemeClr val="accent2">
+                    <a:lumMod val="60000"/>
+                    <a:lumOff val="40000"/>
+                  </a:schemeClr>
+                </a:solidFill>
+                <a:effectLst/>
+              </a:rPr>
+              <a:t>phonemes</a:t>
+            </a:r>
+            <a:r>
+              <a:rPr lang="en-AU" sz="2800" dirty="0" smtClean="0">
+                <a:solidFill>
+                  <a:schemeClr val="accent2">
+                    <a:lumMod val="40000"/>
+                    <a:lumOff val="60000"/>
+                  </a:schemeClr>
+                </a:solidFill>
+                <a:effectLst/>
+              </a:rPr>
+              <a:t> </a:t>
+            </a:r>
+            <a:r>
+              <a:rPr lang="en-AU" sz="2800" dirty="0" smtClean="0">
+                <a:effectLst/>
+              </a:rPr>
+              <a:t>by </a:t>
             </a:r>
             <a:r>
               <a:rPr lang="en-AU" sz="2800" b="1" dirty="0" smtClean="0">
@@ -6897,7 +6956,7 @@
               <a:rPr lang="en-AU" sz="2800" dirty="0" smtClean="0">
                 <a:effectLst/>
               </a:rPr>
-              <a:t>for a role, view </a:t>
+              <a:t>for a role; view </a:t>
             </a:r>
             <a:r>
               <a:rPr lang="en-AU" sz="2800" b="1" dirty="0" smtClean="0">
@@ -6909,13 +6968,25 @@
               <a:rPr lang="en-AU" sz="2800" dirty="0" smtClean="0">
                 <a:effectLst/>
               </a:rPr>
-              <a:t>, and view the </a:t>
+              <a:t>; and view the </a:t>
             </a:r>
             <a:r>
               <a:rPr lang="en-AU" sz="2800" b="1" dirty="0" smtClean="0">
                 <a:effectLst/>
               </a:rPr>
-              <a:t>distance </a:t>
+              <a:t>distance</a:t>
+            </a:r>
+            <a:r>
+              <a:rPr lang="en-AU" sz="2800" b="1" dirty="0" smtClean="0">
+                <a:solidFill>
+                  <a:schemeClr val="accent6">
+                    <a:lumMod val="60000"/>
+                    <a:lumOff val="40000"/>
+                  </a:schemeClr>
+                </a:solidFill>
+                <a:effectLst/>
+              </a:rPr>
+              <a:t> </a:t>
             </a:r>
             <a:r>
               <a:rPr lang="en-AU" sz="2800" dirty="0" smtClean="0">
@@ -7106,7 +7177,7 @@
         </p:nvGrpSpPr>
         <p:grpSpPr>
           <a:xfrm>
-            <a:off x="31931901" y="28402453"/>
+            <a:off x="31982328" y="27473025"/>
             <a:ext cx="11031016" cy="929429"/>
             <a:chOff x="1066799" y="5958162"/>
             <a:chExt cx="11007725" cy="946293"/>
@@ -7453,7 +7524,7 @@
         </p:nvGrpSpPr>
         <p:grpSpPr>
           <a:xfrm>
-            <a:off x="16116299" y="28409421"/>
+            <a:off x="16034959" y="27541627"/>
             <a:ext cx="15560432" cy="929429"/>
             <a:chOff x="1066799" y="5958162"/>
             <a:chExt cx="11007725" cy="946293"/>
@@ -7963,17 +8034,14 @@
         </p:nvSpPr>
         <p:spPr bwMode="auto">
           <a:xfrm>
-            <a:off x="16116299" y="29331882"/>
-            <a:ext cx="15552627" cy="1354217"/>
+            <a:off x="16034959" y="28464088"/>
+            <a:ext cx="15552627" cy="2970044"/>
           </a:xfrm>
           <a:prstGeom prst="rect">
             <a:avLst/>
           </a:prstGeom>
           <a:solidFill>
-            <a:schemeClr val="accent3">
-              <a:lumMod val="40000"/>
-              <a:lumOff val="60000"/>
-            </a:schemeClr>
+            <a:schemeClr val="bg1"/>
           </a:solidFill>
           <a:ln w="57150" cmpd="thinThick">
             <a:noFill/>
@@ -8097,6 +8165,45 @@
                 <a:effectLst/>
               </a:rPr>
               <a:t>Expanding analysis beyond Shakespeare</a:t>
+            </a:r>
+          </a:p>
+          <a:p>
+            <a:pPr>
+              <a:lnSpc>
+                <a:spcPct val="125000"/>
+              </a:lnSpc>
+            </a:pPr>
+            <a:r>
+              <a:rPr lang="en-AU" sz="2800" dirty="0" smtClean="0">
+                <a:effectLst/>
+              </a:rPr>
+              <a:t>Implementing in-place comparison of user-provided texts</a:t>
+            </a:r>
+          </a:p>
+          <a:p>
+            <a:pPr>
+              <a:lnSpc>
+                <a:spcPct val="125000"/>
+              </a:lnSpc>
+            </a:pPr>
+            <a:r>
+              <a:rPr lang="en-AU" sz="2800" dirty="0" smtClean="0">
+                <a:effectLst/>
+              </a:rPr>
+              <a:t>Creating visualizations for characters’ sonic signatures</a:t>
+            </a:r>
+          </a:p>
+          <a:p>
+            <a:pPr>
+              <a:lnSpc>
+                <a:spcPct val="125000"/>
+              </a:lnSpc>
+            </a:pPr>
+            <a:r>
+              <a:rPr lang="en-AU" sz="2800" dirty="0" smtClean="0">
+                <a:effectLst/>
+              </a:rPr>
+              <a:t>Assessing degree of uniqueness</a:t>
             </a:r>
           </a:p>
           <a:p>
@@ -8121,17 +8228,14 @@
         </p:nvSpPr>
         <p:spPr bwMode="auto">
           <a:xfrm>
-            <a:off x="31937434" y="29251810"/>
-            <a:ext cx="11025483" cy="765081"/>
+            <a:off x="31987861" y="28413154"/>
+            <a:ext cx="11025483" cy="1892826"/>
           </a:xfrm>
           <a:prstGeom prst="rect">
             <a:avLst/>
           </a:prstGeom>
           <a:solidFill>
-            <a:schemeClr val="accent3">
-              <a:lumMod val="40000"/>
-              <a:lumOff val="60000"/>
-            </a:schemeClr>
+            <a:schemeClr val="bg1"/>
           </a:solidFill>
           <a:ln w="57150" cmpd="thinThick">
             <a:noFill/>
@@ -8254,7 +8358,36 @@
               <a:rPr lang="en-AU" sz="2800" dirty="0" smtClean="0">
                 <a:effectLst/>
               </a:rPr>
-              <a:t>Eric Alexander, Carleton College</a:t>
+              <a:t>Eric Alexander</a:t>
+            </a:r>
+          </a:p>
+          <a:p>
+            <a:pPr>
+              <a:lnSpc>
+                <a:spcPct val="125000"/>
+              </a:lnSpc>
+            </a:pPr>
+            <a:r>
+              <a:rPr lang="en-AU" sz="2800" dirty="0" smtClean="0">
+                <a:effectLst/>
+              </a:rPr>
+              <a:t>Mike Tie et al</a:t>
+            </a:r>
+            <a:endParaRPr lang="en-AU" sz="2800" dirty="0" smtClean="0">
+              <a:effectLst/>
+            </a:endParaRPr>
+          </a:p>
+          <a:p>
+            <a:pPr>
+              <a:lnSpc>
+                <a:spcPct val="125000"/>
+              </a:lnSpc>
+            </a:pPr>
+            <a:r>
+              <a:rPr lang="en-AU" sz="2800" dirty="0" smtClean="0">
+                <a:effectLst/>
+              </a:rPr>
+              <a:t>Carleton College</a:t>
             </a:r>
             <a:endParaRPr lang="en-AU" sz="2800" dirty="0">
               <a:effectLst/>
@@ -8271,7 +8404,7 @@
           <p:nvPr>
             <p:extLst>
               <p:ext uri="{D42A27DB-BD31-4B8C-83A1-F6EECF244321}">
-                <p14:modId xmlns:p14="http://schemas.microsoft.com/office/powerpoint/2010/main" val="51431164"/>
+                <p14:modId xmlns:p14="http://schemas.microsoft.com/office/powerpoint/2010/main" val="1284245250"/>
               </p:ext>
             </p:extLst>
           </p:nvPr>
@@ -8318,7 +8451,8 @@
                         <a:rPr lang="en-US" altLang="ja-JP" sz="3600" b="1" dirty="0" smtClean="0">
                           <a:solidFill>
                             <a:schemeClr val="accent2">
-                              <a:lumMod val="50000"/>
+                              <a:lumMod val="60000"/>
+                              <a:lumOff val="40000"/>
                             </a:schemeClr>
                           </a:solidFill>
                           <a:effectLst/>
@@ -8329,7 +8463,8 @@
                       <a:endParaRPr lang="en-US" altLang="ja-JP" sz="3600" dirty="0" smtClean="0">
                         <a:solidFill>
                           <a:schemeClr val="accent2">
-                            <a:lumMod val="50000"/>
+                            <a:lumMod val="60000"/>
+                            <a:lumOff val="40000"/>
                           </a:schemeClr>
                         </a:solidFill>
                         <a:effectLst/>
@@ -8373,23 +8508,11 @@
                         <a:rPr lang="en-US" sz="3600" b="1" baseline="0" dirty="0" smtClean="0">
                           <a:solidFill>
                             <a:schemeClr val="accent2">
-                              <a:lumMod val="40000"/>
-                              <a:lumOff val="60000"/>
+                              <a:lumMod val="50000"/>
                             </a:schemeClr>
                           </a:solidFill>
                         </a:rPr>
-                        <a:t>features</a:t>
-                      </a:r>
-                      <a:r>
-                        <a:rPr lang="en-US" sz="3600" b="1" baseline="0" dirty="0" smtClean="0">
-                          <a:solidFill>
-                            <a:schemeClr val="accent2">
-                              <a:lumMod val="20000"/>
-                              <a:lumOff val="80000"/>
-                            </a:schemeClr>
-                          </a:solidFill>
-                        </a:rPr>
-                        <a:t> </a:t>
+                        <a:t>features </a:t>
                       </a:r>
                       <a:r>
                         <a:rPr lang="en-US" sz="3600" b="0" baseline="0" dirty="0" smtClean="0">
@@ -8426,11 +8549,10 @@
                         <a:t>We analyzed characters for both the </a:t>
                       </a:r>
                       <a:r>
-                        <a:rPr lang="en-US" sz="3600" b="0" i="0" u="none" strike="noStrike" kern="1200" dirty="0" smtClean="0">
+                        <a:rPr lang="en-US" sz="3600" b="1" i="0" u="none" strike="noStrike" kern="1200" dirty="0" smtClean="0">
                           <a:solidFill>
                             <a:schemeClr val="accent2">
-                              <a:lumMod val="40000"/>
-                              <a:lumOff val="60000"/>
+                              <a:lumMod val="50000"/>
                             </a:schemeClr>
                           </a:solidFill>
                           <a:effectLst/>
@@ -8438,7 +8560,7 @@
                           <a:ea typeface="+mn-ea"/>
                           <a:cs typeface="+mn-cs"/>
                         </a:rPr>
-                        <a:t>types of sounds</a:t>
+                        <a:t>types of sounds </a:t>
                       </a:r>
                       <a:r>
                         <a:rPr lang="en-US" sz="3600" b="0" i="0" u="none" strike="noStrike" kern="1200" dirty="0" smtClean="0">
@@ -8450,13 +8572,14 @@
                           <a:ea typeface="+mn-ea"/>
                           <a:cs typeface="+mn-cs"/>
                         </a:rPr>
-                        <a:t> they tended to make, and the </a:t>
+                        <a:t>they tended to make, and the </a:t>
                       </a:r>
                       <a:r>
                         <a:rPr lang="en-US" sz="3600" b="1" i="0" u="none" strike="noStrike" kern="1200" dirty="0" smtClean="0">
                           <a:solidFill>
                             <a:schemeClr val="accent2">
-                              <a:lumMod val="50000"/>
+                              <a:lumMod val="60000"/>
+                              <a:lumOff val="40000"/>
                             </a:schemeClr>
                           </a:solidFill>
                           <a:effectLst/>
@@ -8470,7 +8593,8 @@
                         <a:rPr lang="en-US" sz="3600" b="0" i="0" u="none" strike="noStrike" kern="1200" dirty="0" smtClean="0">
                           <a:solidFill>
                             <a:schemeClr val="accent2">
-                              <a:lumMod val="50000"/>
+                              <a:lumMod val="60000"/>
+                              <a:lumOff val="40000"/>
                             </a:schemeClr>
                           </a:solidFill>
                           <a:effectLst/>
@@ -8984,8 +9108,8 @@
         </p:blipFill>
         <p:spPr>
           <a:xfrm>
-            <a:off x="1218766" y="17702327"/>
-            <a:ext cx="12428708" cy="8955981"/>
+            <a:off x="1218765" y="17702327"/>
+            <a:ext cx="14517067" cy="10460828"/>
           </a:xfrm>
           <a:prstGeom prst="rect">
             <a:avLst/>
@@ -9049,6 +9173,822 @@
               <a:t>The iterative naïve Bayes process yields more useful results in highly unbalanced data sets</a:t>
             </a:r>
             <a:endParaRPr lang="en-US" dirty="0" smtClean="0"/>
+          </a:p>
+        </p:txBody>
+      </p:sp>
+      <p:pic>
+        <p:nvPicPr>
+          <p:cNvPr id="14" name="Picture 13"/>
+          <p:cNvPicPr>
+            <a:picLocks noChangeAspect="1"/>
+          </p:cNvPicPr>
+          <p:nvPr/>
+        </p:nvPicPr>
+        <p:blipFill>
+          <a:blip r:embed="rId7">
+            <a:extLst>
+              <a:ext uri="{28A0092B-C50C-407E-A947-70E740481C1C}">
+                <a14:useLocalDpi xmlns:a14="http://schemas.microsoft.com/office/drawing/2010/main" val="0"/>
+              </a:ext>
+            </a:extLst>
+          </a:blip>
+          <a:stretch>
+            <a:fillRect/>
+          </a:stretch>
+        </p:blipFill>
+        <p:spPr>
+          <a:xfrm>
+            <a:off x="30954590" y="13853377"/>
+            <a:ext cx="12004820" cy="6131595"/>
+          </a:xfrm>
+          <a:prstGeom prst="rect">
+            <a:avLst/>
+          </a:prstGeom>
+        </p:spPr>
+      </p:pic>
+      <p:sp>
+        <p:nvSpPr>
+          <p:cNvPr id="53" name="TextBox 52"/>
+          <p:cNvSpPr txBox="1"/>
+          <p:nvPr/>
+        </p:nvSpPr>
+        <p:spPr>
+          <a:xfrm>
+            <a:off x="30984755" y="20008223"/>
+            <a:ext cx="11979046" cy="461665"/>
+          </a:xfrm>
+          <a:prstGeom prst="rect">
+            <a:avLst/>
+          </a:prstGeom>
+          <a:noFill/>
+        </p:spPr>
+        <p:txBody>
+          <a:bodyPr wrap="square" rtlCol="0">
+            <a:spAutoFit/>
+          </a:bodyPr>
+          <a:lstStyle/>
+          <a:p>
+            <a:r>
+              <a:rPr lang="en-US" dirty="0" smtClean="0"/>
+              <a:t>A partial view of the comparison between </a:t>
+            </a:r>
+            <a:r>
+              <a:rPr lang="en-US" i="1" dirty="0" smtClean="0"/>
+              <a:t>Hamlet</a:t>
+            </a:r>
+            <a:r>
+              <a:rPr lang="en-US" dirty="0" smtClean="0"/>
+              <a:t>’s Hamlet and the standards for all archetypes </a:t>
+            </a:r>
+            <a:endParaRPr lang="en-US" dirty="0" smtClean="0"/>
+          </a:p>
+        </p:txBody>
+      </p:sp>
+      <p:pic>
+        <p:nvPicPr>
+          <p:cNvPr id="15" name="Picture 14"/>
+          <p:cNvPicPr>
+            <a:picLocks noChangeAspect="1"/>
+          </p:cNvPicPr>
+          <p:nvPr/>
+        </p:nvPicPr>
+        <p:blipFill>
+          <a:blip r:embed="rId8">
+            <a:extLst>
+              <a:ext uri="{28A0092B-C50C-407E-A947-70E740481C1C}">
+                <a14:useLocalDpi xmlns:a14="http://schemas.microsoft.com/office/drawing/2010/main" val="0"/>
+              </a:ext>
+            </a:extLst>
+          </a:blip>
+          <a:stretch>
+            <a:fillRect/>
+          </a:stretch>
+        </p:blipFill>
+        <p:spPr>
+          <a:xfrm>
+            <a:off x="26662195" y="13942241"/>
+            <a:ext cx="4288887" cy="2449157"/>
+          </a:xfrm>
+          <a:prstGeom prst="rect">
+            <a:avLst/>
+          </a:prstGeom>
+        </p:spPr>
+      </p:pic>
+      <p:sp>
+        <p:nvSpPr>
+          <p:cNvPr id="55" name="TextBox 54"/>
+          <p:cNvSpPr txBox="1"/>
+          <p:nvPr/>
+        </p:nvSpPr>
+        <p:spPr>
+          <a:xfrm>
+            <a:off x="26783134" y="16373891"/>
+            <a:ext cx="4006192" cy="1938992"/>
+          </a:xfrm>
+          <a:prstGeom prst="rect">
+            <a:avLst/>
+          </a:prstGeom>
+          <a:noFill/>
+        </p:spPr>
+        <p:txBody>
+          <a:bodyPr wrap="square" rtlCol="0">
+            <a:spAutoFit/>
+          </a:bodyPr>
+          <a:lstStyle/>
+          <a:p>
+            <a:r>
+              <a:rPr lang="en-US" dirty="0" smtClean="0"/>
+              <a:t>An incomplete view of the basic view of z-score data for </a:t>
+            </a:r>
+            <a:r>
+              <a:rPr lang="en-US" dirty="0" smtClean="0">
+                <a:solidFill>
+                  <a:schemeClr val="accent2">
+                    <a:lumMod val="60000"/>
+                    <a:lumOff val="40000"/>
+                  </a:schemeClr>
+                </a:solidFill>
+              </a:rPr>
+              <a:t>phoneme </a:t>
+            </a:r>
+            <a:r>
+              <a:rPr lang="en-US" dirty="0" smtClean="0"/>
+              <a:t>and </a:t>
+            </a:r>
+            <a:r>
+              <a:rPr lang="en-US" dirty="0" smtClean="0">
+                <a:solidFill>
+                  <a:schemeClr val="accent2">
+                    <a:lumMod val="50000"/>
+                  </a:schemeClr>
+                </a:solidFill>
+              </a:rPr>
+              <a:t>features </a:t>
+            </a:r>
+            <a:r>
+              <a:rPr lang="en-US" dirty="0" smtClean="0"/>
+              <a:t>of archetypical roles, without any comparisons</a:t>
+            </a:r>
+            <a:endParaRPr lang="en-US" dirty="0" smtClean="0"/>
+          </a:p>
+        </p:txBody>
+      </p:sp>
+      <p:grpSp>
+        <p:nvGrpSpPr>
+          <p:cNvPr id="56" name="Group 55"/>
+          <p:cNvGrpSpPr/>
+          <p:nvPr/>
+        </p:nvGrpSpPr>
+        <p:grpSpPr>
+          <a:xfrm>
+            <a:off x="1137426" y="27530927"/>
+            <a:ext cx="14510596" cy="929429"/>
+            <a:chOff x="1066799" y="5958162"/>
+            <a:chExt cx="11007725" cy="946293"/>
+          </a:xfrm>
+        </p:grpSpPr>
+        <p:sp>
+          <p:nvSpPr>
+            <p:cNvPr id="58" name="Text Box 248"/>
+            <p:cNvSpPr txBox="1">
+              <a:spLocks noChangeArrowheads="1"/>
+            </p:cNvSpPr>
+            <p:nvPr/>
+          </p:nvSpPr>
+          <p:spPr bwMode="auto">
+            <a:xfrm>
+              <a:off x="1066799" y="5958162"/>
+              <a:ext cx="11007725" cy="946293"/>
+            </a:xfrm>
+            <a:prstGeom prst="rect">
+              <a:avLst/>
+            </a:prstGeom>
+            <a:gradFill rotWithShape="0">
+              <a:gsLst>
+                <a:gs pos="0">
+                  <a:schemeClr val="accent2">
+                    <a:lumMod val="40000"/>
+                    <a:lumOff val="60000"/>
+                  </a:schemeClr>
+                </a:gs>
+                <a:gs pos="13000">
+                  <a:schemeClr val="accent3">
+                    <a:lumMod val="60000"/>
+                    <a:lumOff val="40000"/>
+                  </a:schemeClr>
+                </a:gs>
+                <a:gs pos="43000">
+                  <a:schemeClr val="accent2">
+                    <a:lumMod val="60000"/>
+                    <a:lumOff val="40000"/>
+                  </a:schemeClr>
+                </a:gs>
+                <a:gs pos="67000">
+                  <a:schemeClr val="accent2">
+                    <a:lumMod val="75000"/>
+                  </a:schemeClr>
+                </a:gs>
+                <a:gs pos="83000">
+                  <a:schemeClr val="accent2">
+                    <a:lumMod val="75000"/>
+                  </a:schemeClr>
+                </a:gs>
+                <a:gs pos="100000">
+                  <a:schemeClr val="accent3">
+                    <a:lumMod val="60000"/>
+                    <a:lumOff val="40000"/>
+                  </a:schemeClr>
+                </a:gs>
+              </a:gsLst>
+              <a:lin ang="10800000" scaled="0"/>
+            </a:gradFill>
+            <a:ln w="19050">
+              <a:noFill/>
+              <a:miter lim="800000"/>
+              <a:headEnd/>
+              <a:tailEnd/>
+            </a:ln>
+            <a:effectLst/>
+          </p:spPr>
+          <p:txBody>
+            <a:bodyPr>
+              <a:spAutoFit/>
+            </a:bodyPr>
+            <a:lstStyle>
+              <a:lvl1pPr>
+                <a:defRPr sz="2400">
+                  <a:solidFill>
+                    <a:schemeClr val="tx1"/>
+                  </a:solidFill>
+                  <a:latin typeface="Times New Roman" pitchFamily="18" charset="0"/>
+                </a:defRPr>
+              </a:lvl1pPr>
+              <a:lvl2pPr marL="742950" indent="-285750">
+                <a:defRPr sz="2400">
+                  <a:solidFill>
+                    <a:schemeClr val="tx1"/>
+                  </a:solidFill>
+                  <a:latin typeface="Times New Roman" pitchFamily="18" charset="0"/>
+                </a:defRPr>
+              </a:lvl2pPr>
+              <a:lvl3pPr marL="1143000" indent="-228600">
+                <a:defRPr sz="2400">
+                  <a:solidFill>
+                    <a:schemeClr val="tx1"/>
+                  </a:solidFill>
+                  <a:latin typeface="Times New Roman" pitchFamily="18" charset="0"/>
+                </a:defRPr>
+              </a:lvl3pPr>
+              <a:lvl4pPr marL="1600200" indent="-228600">
+                <a:defRPr sz="2400">
+                  <a:solidFill>
+                    <a:schemeClr val="tx1"/>
+                  </a:solidFill>
+                  <a:latin typeface="Times New Roman" pitchFamily="18" charset="0"/>
+                </a:defRPr>
+              </a:lvl4pPr>
+              <a:lvl5pPr marL="2057400" indent="-228600">
+                <a:defRPr sz="2400">
+                  <a:solidFill>
+                    <a:schemeClr val="tx1"/>
+                  </a:solidFill>
+                  <a:latin typeface="Times New Roman" pitchFamily="18" charset="0"/>
+                </a:defRPr>
+              </a:lvl5pPr>
+              <a:lvl6pPr marL="2514600" indent="-228600" eaLnBrk="0" fontAlgn="base" hangingPunct="0">
+                <a:spcBef>
+                  <a:spcPct val="0"/>
+                </a:spcBef>
+                <a:spcAft>
+                  <a:spcPct val="0"/>
+                </a:spcAft>
+                <a:defRPr sz="2400">
+                  <a:solidFill>
+                    <a:schemeClr val="tx1"/>
+                  </a:solidFill>
+                  <a:latin typeface="Times New Roman" pitchFamily="18" charset="0"/>
+                </a:defRPr>
+              </a:lvl6pPr>
+              <a:lvl7pPr marL="2971800" indent="-228600" eaLnBrk="0" fontAlgn="base" hangingPunct="0">
+                <a:spcBef>
+                  <a:spcPct val="0"/>
+                </a:spcBef>
+                <a:spcAft>
+                  <a:spcPct val="0"/>
+                </a:spcAft>
+                <a:defRPr sz="2400">
+                  <a:solidFill>
+                    <a:schemeClr val="tx1"/>
+                  </a:solidFill>
+                  <a:latin typeface="Times New Roman" pitchFamily="18" charset="0"/>
+                </a:defRPr>
+              </a:lvl7pPr>
+              <a:lvl8pPr marL="3429000" indent="-228600" eaLnBrk="0" fontAlgn="base" hangingPunct="0">
+                <a:spcBef>
+                  <a:spcPct val="0"/>
+                </a:spcBef>
+                <a:spcAft>
+                  <a:spcPct val="0"/>
+                </a:spcAft>
+                <a:defRPr sz="2400">
+                  <a:solidFill>
+                    <a:schemeClr val="tx1"/>
+                  </a:solidFill>
+                  <a:latin typeface="Times New Roman" pitchFamily="18" charset="0"/>
+                </a:defRPr>
+              </a:lvl8pPr>
+              <a:lvl9pPr marL="3886200" indent="-228600" eaLnBrk="0" fontAlgn="base" hangingPunct="0">
+                <a:spcBef>
+                  <a:spcPct val="0"/>
+                </a:spcBef>
+                <a:spcAft>
+                  <a:spcPct val="0"/>
+                </a:spcAft>
+                <a:defRPr sz="2400">
+                  <a:solidFill>
+                    <a:schemeClr val="tx1"/>
+                  </a:solidFill>
+                  <a:latin typeface="Times New Roman" pitchFamily="18" charset="0"/>
+                </a:defRPr>
+              </a:lvl9pPr>
+            </a:lstStyle>
+            <a:p>
+              <a:endParaRPr lang="en-US" altLang="zh-CN" sz="3600" b="1" dirty="0">
+                <a:effectLst/>
+                <a:latin typeface="Lucida Sans" pitchFamily="34" charset="0"/>
+                <a:ea typeface="SimSun" pitchFamily="2" charset="-122"/>
+                <a:cs typeface="Lucida Sans" pitchFamily="34" charset="0"/>
+              </a:endParaRPr>
+            </a:p>
+          </p:txBody>
+        </p:sp>
+        <p:sp>
+          <p:nvSpPr>
+            <p:cNvPr id="68" name="Text Box 248"/>
+            <p:cNvSpPr txBox="1">
+              <a:spLocks noChangeArrowheads="1"/>
+            </p:cNvSpPr>
+            <p:nvPr/>
+          </p:nvSpPr>
+          <p:spPr bwMode="auto">
+            <a:xfrm>
+              <a:off x="1157514" y="6046588"/>
+              <a:ext cx="10805886" cy="798915"/>
+            </a:xfrm>
+            <a:prstGeom prst="rect">
+              <a:avLst/>
+            </a:prstGeom>
+            <a:gradFill>
+              <a:gsLst>
+                <a:gs pos="56000">
+                  <a:schemeClr val="accent2">
+                    <a:lumMod val="50000"/>
+                  </a:schemeClr>
+                </a:gs>
+                <a:gs pos="100000">
+                  <a:schemeClr val="bg1">
+                    <a:alpha val="0"/>
+                  </a:schemeClr>
+                </a:gs>
+              </a:gsLst>
+              <a:lin ang="0" scaled="1"/>
+            </a:gradFill>
+            <a:ln w="19050">
+              <a:noFill/>
+              <a:miter lim="800000"/>
+              <a:headEnd/>
+              <a:tailEnd/>
+            </a:ln>
+            <a:effectLst/>
+          </p:spPr>
+          <p:txBody>
+            <a:bodyPr wrap="square">
+              <a:spAutoFit/>
+            </a:bodyPr>
+            <a:lstStyle>
+              <a:lvl1pPr>
+                <a:defRPr sz="2400">
+                  <a:solidFill>
+                    <a:schemeClr val="tx1"/>
+                  </a:solidFill>
+                  <a:latin typeface="Times New Roman" pitchFamily="18" charset="0"/>
+                </a:defRPr>
+              </a:lvl1pPr>
+              <a:lvl2pPr marL="742950" indent="-285750">
+                <a:defRPr sz="2400">
+                  <a:solidFill>
+                    <a:schemeClr val="tx1"/>
+                  </a:solidFill>
+                  <a:latin typeface="Times New Roman" pitchFamily="18" charset="0"/>
+                </a:defRPr>
+              </a:lvl2pPr>
+              <a:lvl3pPr marL="1143000" indent="-228600">
+                <a:defRPr sz="2400">
+                  <a:solidFill>
+                    <a:schemeClr val="tx1"/>
+                  </a:solidFill>
+                  <a:latin typeface="Times New Roman" pitchFamily="18" charset="0"/>
+                </a:defRPr>
+              </a:lvl3pPr>
+              <a:lvl4pPr marL="1600200" indent="-228600">
+                <a:defRPr sz="2400">
+                  <a:solidFill>
+                    <a:schemeClr val="tx1"/>
+                  </a:solidFill>
+                  <a:latin typeface="Times New Roman" pitchFamily="18" charset="0"/>
+                </a:defRPr>
+              </a:lvl4pPr>
+              <a:lvl5pPr marL="2057400" indent="-228600">
+                <a:defRPr sz="2400">
+                  <a:solidFill>
+                    <a:schemeClr val="tx1"/>
+                  </a:solidFill>
+                  <a:latin typeface="Times New Roman" pitchFamily="18" charset="0"/>
+                </a:defRPr>
+              </a:lvl5pPr>
+              <a:lvl6pPr marL="2514600" indent="-228600" eaLnBrk="0" fontAlgn="base" hangingPunct="0">
+                <a:spcBef>
+                  <a:spcPct val="0"/>
+                </a:spcBef>
+                <a:spcAft>
+                  <a:spcPct val="0"/>
+                </a:spcAft>
+                <a:defRPr sz="2400">
+                  <a:solidFill>
+                    <a:schemeClr val="tx1"/>
+                  </a:solidFill>
+                  <a:latin typeface="Times New Roman" pitchFamily="18" charset="0"/>
+                </a:defRPr>
+              </a:lvl6pPr>
+              <a:lvl7pPr marL="2971800" indent="-228600" eaLnBrk="0" fontAlgn="base" hangingPunct="0">
+                <a:spcBef>
+                  <a:spcPct val="0"/>
+                </a:spcBef>
+                <a:spcAft>
+                  <a:spcPct val="0"/>
+                </a:spcAft>
+                <a:defRPr sz="2400">
+                  <a:solidFill>
+                    <a:schemeClr val="tx1"/>
+                  </a:solidFill>
+                  <a:latin typeface="Times New Roman" pitchFamily="18" charset="0"/>
+                </a:defRPr>
+              </a:lvl7pPr>
+              <a:lvl8pPr marL="3429000" indent="-228600" eaLnBrk="0" fontAlgn="base" hangingPunct="0">
+                <a:spcBef>
+                  <a:spcPct val="0"/>
+                </a:spcBef>
+                <a:spcAft>
+                  <a:spcPct val="0"/>
+                </a:spcAft>
+                <a:defRPr sz="2400">
+                  <a:solidFill>
+                    <a:schemeClr val="tx1"/>
+                  </a:solidFill>
+                  <a:latin typeface="Times New Roman" pitchFamily="18" charset="0"/>
+                </a:defRPr>
+              </a:lvl8pPr>
+              <a:lvl9pPr marL="3886200" indent="-228600" eaLnBrk="0" fontAlgn="base" hangingPunct="0">
+                <a:spcBef>
+                  <a:spcPct val="0"/>
+                </a:spcBef>
+                <a:spcAft>
+                  <a:spcPct val="0"/>
+                </a:spcAft>
+                <a:defRPr sz="2400">
+                  <a:solidFill>
+                    <a:schemeClr val="tx1"/>
+                  </a:solidFill>
+                  <a:latin typeface="Times New Roman" pitchFamily="18" charset="0"/>
+                </a:defRPr>
+              </a:lvl9pPr>
+            </a:lstStyle>
+            <a:p>
+              <a:r>
+                <a:rPr lang="en-US" altLang="zh-CN" sz="4400" b="1" dirty="0" smtClean="0">
+                  <a:solidFill>
+                    <a:schemeClr val="bg1"/>
+                  </a:solidFill>
+                  <a:effectLst/>
+                  <a:latin typeface="Lucida Sans" pitchFamily="34" charset="0"/>
+                  <a:ea typeface="SimSun" pitchFamily="2" charset="-122"/>
+                  <a:cs typeface="Lucida Sans" pitchFamily="34" charset="0"/>
+                </a:rPr>
+                <a:t>References</a:t>
+              </a:r>
+              <a:endParaRPr lang="en-US" altLang="zh-CN" sz="4400" b="1" dirty="0" smtClean="0">
+                <a:solidFill>
+                  <a:schemeClr val="bg1"/>
+                </a:solidFill>
+                <a:effectLst/>
+                <a:latin typeface="Lucida Sans" pitchFamily="34" charset="0"/>
+                <a:ea typeface="SimSun" pitchFamily="2" charset="-122"/>
+                <a:cs typeface="Lucida Sans" pitchFamily="34" charset="0"/>
+              </a:endParaRPr>
+            </a:p>
+          </p:txBody>
+        </p:sp>
+      </p:grpSp>
+      <p:sp>
+        <p:nvSpPr>
+          <p:cNvPr id="72" name="Text Box 242"/>
+          <p:cNvSpPr txBox="1">
+            <a:spLocks noChangeArrowheads="1"/>
+          </p:cNvSpPr>
+          <p:nvPr/>
+        </p:nvSpPr>
+        <p:spPr bwMode="auto">
+          <a:xfrm>
+            <a:off x="1137426" y="28471056"/>
+            <a:ext cx="14517066" cy="3896451"/>
+          </a:xfrm>
+          <a:prstGeom prst="rect">
+            <a:avLst/>
+          </a:prstGeom>
+          <a:solidFill>
+            <a:schemeClr val="bg1"/>
+          </a:solidFill>
+          <a:ln w="57150" cmpd="thinThick">
+            <a:noFill/>
+            <a:miter lim="800000"/>
+            <a:headEnd/>
+            <a:tailEnd/>
+          </a:ln>
+          <a:effectLst/>
+          <a:extLst>
+            <a:ext uri="{AF507438-7753-43e0-B8FC-AC1667EBCBE1}">
+              <a14:hiddenEffects xmlns="" xmlns:a14="http://schemas.microsoft.com/office/drawing/2010/main">
+                <a:effectLst>
+                  <a:outerShdw dist="35921" dir="2700000" algn="ctr" rotWithShape="0">
+                    <a:schemeClr val="bg2"/>
+                  </a:outerShdw>
+                </a:effectLst>
+              </a14:hiddenEffects>
+            </a:ext>
+          </a:extLst>
+        </p:spPr>
+        <p:txBody>
+          <a:bodyPr wrap="square" lIns="182880" tIns="91440" rIns="182880" bIns="182880">
+            <a:spAutoFit/>
+          </a:bodyPr>
+          <a:lstStyle>
+            <a:lvl1pPr marL="228600" indent="-228600" defTabSz="612775">
+              <a:defRPr sz="2400">
+                <a:solidFill>
+                  <a:schemeClr val="tx1"/>
+                </a:solidFill>
+                <a:latin typeface="Times New Roman" pitchFamily="18" charset="0"/>
+              </a:defRPr>
+            </a:lvl1pPr>
+            <a:lvl2pPr marL="742950" indent="-285750" defTabSz="612775">
+              <a:defRPr sz="2400">
+                <a:solidFill>
+                  <a:schemeClr val="tx1"/>
+                </a:solidFill>
+                <a:latin typeface="Times New Roman" pitchFamily="18" charset="0"/>
+              </a:defRPr>
+            </a:lvl2pPr>
+            <a:lvl3pPr marL="1143000" indent="-228600" defTabSz="612775">
+              <a:defRPr sz="2400">
+                <a:solidFill>
+                  <a:schemeClr val="tx1"/>
+                </a:solidFill>
+                <a:latin typeface="Times New Roman" pitchFamily="18" charset="0"/>
+              </a:defRPr>
+            </a:lvl3pPr>
+            <a:lvl4pPr marL="1600200" indent="-228600" defTabSz="612775">
+              <a:defRPr sz="2400">
+                <a:solidFill>
+                  <a:schemeClr val="tx1"/>
+                </a:solidFill>
+                <a:latin typeface="Times New Roman" pitchFamily="18" charset="0"/>
+              </a:defRPr>
+            </a:lvl4pPr>
+            <a:lvl5pPr marL="2057400" indent="-228600" defTabSz="612775">
+              <a:defRPr sz="2400">
+                <a:solidFill>
+                  <a:schemeClr val="tx1"/>
+                </a:solidFill>
+                <a:latin typeface="Times New Roman" pitchFamily="18" charset="0"/>
+              </a:defRPr>
+            </a:lvl5pPr>
+            <a:lvl6pPr marL="2514600" indent="-228600" defTabSz="612775" eaLnBrk="0" fontAlgn="base" hangingPunct="0">
+              <a:spcBef>
+                <a:spcPct val="0"/>
+              </a:spcBef>
+              <a:spcAft>
+                <a:spcPct val="0"/>
+              </a:spcAft>
+              <a:defRPr sz="2400">
+                <a:solidFill>
+                  <a:schemeClr val="tx1"/>
+                </a:solidFill>
+                <a:latin typeface="Times New Roman" pitchFamily="18" charset="0"/>
+              </a:defRPr>
+            </a:lvl6pPr>
+            <a:lvl7pPr marL="2971800" indent="-228600" defTabSz="612775" eaLnBrk="0" fontAlgn="base" hangingPunct="0">
+              <a:spcBef>
+                <a:spcPct val="0"/>
+              </a:spcBef>
+              <a:spcAft>
+                <a:spcPct val="0"/>
+              </a:spcAft>
+              <a:defRPr sz="2400">
+                <a:solidFill>
+                  <a:schemeClr val="tx1"/>
+                </a:solidFill>
+                <a:latin typeface="Times New Roman" pitchFamily="18" charset="0"/>
+              </a:defRPr>
+            </a:lvl7pPr>
+            <a:lvl8pPr marL="3429000" indent="-228600" defTabSz="612775" eaLnBrk="0" fontAlgn="base" hangingPunct="0">
+              <a:spcBef>
+                <a:spcPct val="0"/>
+              </a:spcBef>
+              <a:spcAft>
+                <a:spcPct val="0"/>
+              </a:spcAft>
+              <a:defRPr sz="2400">
+                <a:solidFill>
+                  <a:schemeClr val="tx1"/>
+                </a:solidFill>
+                <a:latin typeface="Times New Roman" pitchFamily="18" charset="0"/>
+              </a:defRPr>
+            </a:lvl8pPr>
+            <a:lvl9pPr marL="3886200" indent="-228600" defTabSz="612775" eaLnBrk="0" fontAlgn="base" hangingPunct="0">
+              <a:spcBef>
+                <a:spcPct val="0"/>
+              </a:spcBef>
+              <a:spcAft>
+                <a:spcPct val="0"/>
+              </a:spcAft>
+              <a:defRPr sz="2400">
+                <a:solidFill>
+                  <a:schemeClr val="tx1"/>
+                </a:solidFill>
+                <a:latin typeface="Times New Roman" pitchFamily="18" charset="0"/>
+              </a:defRPr>
+            </a:lvl9pPr>
+          </a:lstStyle>
+          <a:p>
+            <a:pPr algn="just">
+              <a:lnSpc>
+                <a:spcPct val="120000"/>
+              </a:lnSpc>
+              <a:buFontTx/>
+              <a:buChar char="•"/>
+            </a:pPr>
+            <a:r>
+              <a:rPr lang="en-US" sz="2800" dirty="0">
+                <a:effectLst/>
+              </a:rPr>
+              <a:t>Scikit-learn: Machine Learning in Python, </a:t>
+            </a:r>
+            <a:r>
+              <a:rPr lang="en-US" sz="2800" dirty="0" err="1">
+                <a:effectLst/>
+              </a:rPr>
+              <a:t>Pedregosa</a:t>
+            </a:r>
+            <a:r>
+              <a:rPr lang="en-US" sz="2800" dirty="0">
+                <a:effectLst/>
+              </a:rPr>
+              <a:t> et al</a:t>
+            </a:r>
+            <a:r>
+              <a:rPr lang="en-US" sz="2800" i="1" dirty="0">
+                <a:effectLst/>
+              </a:rPr>
+              <a:t>.</a:t>
+            </a:r>
+            <a:r>
+              <a:rPr lang="en-US" sz="2800" dirty="0">
+                <a:effectLst/>
+              </a:rPr>
+              <a:t>, JMLR 12, pp. 2825-2830, </a:t>
+            </a:r>
+            <a:r>
+              <a:rPr lang="en-US" sz="2800" dirty="0" smtClean="0">
+                <a:effectLst/>
+              </a:rPr>
+              <a:t>2011.</a:t>
+            </a:r>
+          </a:p>
+          <a:p>
+            <a:pPr algn="just">
+              <a:lnSpc>
+                <a:spcPct val="120000"/>
+              </a:lnSpc>
+              <a:buFontTx/>
+              <a:buChar char="•"/>
+            </a:pPr>
+            <a:r>
+              <a:rPr lang="en-US" altLang="ja-JP" sz="2800" dirty="0" smtClean="0">
+                <a:effectLst/>
+                <a:ea typeface="ＭＳ Ｐゴシック" charset="-128"/>
+              </a:rPr>
+              <a:t>Olson M. Determining the gender of Shakespeare’s characters. Stanford University[Internet]. 2013. </a:t>
+            </a:r>
+          </a:p>
+          <a:p>
+            <a:pPr algn="just">
+              <a:lnSpc>
+                <a:spcPct val="120000"/>
+              </a:lnSpc>
+              <a:buFontTx/>
+              <a:buChar char="•"/>
+            </a:pPr>
+            <a:r>
+              <a:rPr lang="en-US" sz="2800" dirty="0" smtClean="0">
+                <a:effectLst/>
+              </a:rPr>
+              <a:t>Bird</a:t>
+            </a:r>
+            <a:r>
+              <a:rPr lang="en-US" sz="2800" dirty="0">
+                <a:effectLst/>
+              </a:rPr>
+              <a:t>, Steven, Edward </a:t>
+            </a:r>
+            <a:r>
+              <a:rPr lang="en-US" sz="2800" dirty="0" err="1">
+                <a:effectLst/>
+              </a:rPr>
+              <a:t>Loper</a:t>
+            </a:r>
+            <a:r>
+              <a:rPr lang="en-US" sz="2800" dirty="0">
+                <a:effectLst/>
+              </a:rPr>
+              <a:t> and Ewan Klein (2009), </a:t>
+            </a:r>
+            <a:r>
+              <a:rPr lang="en-US" sz="2800" i="1" dirty="0">
+                <a:effectLst/>
+              </a:rPr>
+              <a:t>Natural Language Processing with Python</a:t>
+            </a:r>
+            <a:r>
+              <a:rPr lang="en-US" sz="2800" dirty="0">
+                <a:effectLst/>
+              </a:rPr>
+              <a:t>. O’Reilly Media Inc</a:t>
+            </a:r>
+            <a:r>
+              <a:rPr lang="en-US" sz="2800" dirty="0" smtClean="0">
+                <a:effectLst/>
+              </a:rPr>
+              <a:t>.</a:t>
+            </a:r>
+          </a:p>
+          <a:p>
+            <a:pPr algn="just">
+              <a:lnSpc>
+                <a:spcPct val="120000"/>
+              </a:lnSpc>
+              <a:buFontTx/>
+              <a:buChar char="•"/>
+            </a:pPr>
+            <a:r>
+              <a:rPr lang="en-US" sz="2800" dirty="0">
+                <a:effectLst/>
+              </a:rPr>
+              <a:t>Folger Shakespeare Library. (</a:t>
+            </a:r>
+            <a:r>
+              <a:rPr lang="en-US" sz="2800" dirty="0" err="1">
+                <a:effectLst/>
+              </a:rPr>
+              <a:t>n.d.</a:t>
+            </a:r>
+            <a:r>
+              <a:rPr lang="en-US" sz="2800" dirty="0">
+                <a:effectLst/>
+              </a:rPr>
+              <a:t>) </a:t>
+            </a:r>
+            <a:r>
+              <a:rPr lang="en-US" sz="2800" i="1" dirty="0">
+                <a:effectLst/>
+              </a:rPr>
+              <a:t>Shakespeare's Plays, Sonnets and Poems</a:t>
+            </a:r>
+            <a:r>
+              <a:rPr lang="en-US" sz="2800" dirty="0">
+                <a:effectLst/>
+              </a:rPr>
+              <a:t> from Folger Digital Texts. Retrieved from </a:t>
+            </a:r>
+            <a:r>
+              <a:rPr lang="en-US" sz="2800" dirty="0" smtClean="0">
+                <a:effectLst/>
+                <a:hlinkClick r:id="rId9"/>
+              </a:rPr>
+              <a:t>www.folgerdigitaltexts.org</a:t>
+            </a:r>
+            <a:endParaRPr lang="en-US" sz="2800" dirty="0">
+              <a:effectLst/>
+            </a:endParaRPr>
           </a:p>
         </p:txBody>
       </p:sp>

</xml_diff>

<commit_message>
Whoops poster was in a different subdirectory
</commit_message>
<xml_diff>
--- a/Poster Rough Draft.pptx
+++ b/Poster Rough Draft.pptx
@@ -9037,15 +9037,7 @@
           <a:p>
             <a:r>
               <a:rPr lang="en-US" dirty="0"/>
-              <a:t>To the left are two distinctive </a:t>
-            </a:r>
-            <a:r>
-              <a:rPr lang="en-US"/>
-              <a:t>sonic signatures </a:t>
-            </a:r>
-            <a:r>
-              <a:rPr lang="en-US" dirty="0"/>
-              <a:t>that one might compare using the tool – Rosalind and Claudio. At a glance you can see quickly that one has dark bars above the line and one has dark bars below the line.</a:t>
+              <a:t>To the left are two distinctive sonic signatures that one might compare using the tool – Rosalind and Claudio. At a glance you can see quickly that one has dark bars above the line and one has dark bars below the line.</a:t>
             </a:r>
           </a:p>
           <a:p>

</xml_diff>

<commit_message>
Added some lines to the poster for clarity
</commit_message>
<xml_diff>
--- a/Poster Rough Draft.pptx
+++ b/Poster Rough Draft.pptx
@@ -290,14 +290,14 @@
           <a:effectLst/>
           <a:extLst>
             <a:ext uri="{909E8E84-426E-40dd-AFC4-6F175D3DCCD1}">
-              <a14:hiddenFill xmlns="" xmlns:a14="http://schemas.microsoft.com/office/drawing/2010/main">
+              <a14:hiddenFill xmlns:a14="http://schemas.microsoft.com/office/drawing/2010/main" xmlns="">
                 <a:solidFill>
                   <a:schemeClr val="accent1"/>
                 </a:solidFill>
               </a14:hiddenFill>
             </a:ext>
             <a:ext uri="{91240B29-F687-4f45-9708-019B960494DF}">
-              <a14:hiddenLine xmlns="" xmlns:a14="http://schemas.microsoft.com/office/drawing/2010/main" w="9525">
+              <a14:hiddenLine xmlns:a14="http://schemas.microsoft.com/office/drawing/2010/main" xmlns="" w="9525">
                 <a:solidFill>
                   <a:schemeClr val="tx1"/>
                 </a:solidFill>
@@ -307,7 +307,7 @@
               </a14:hiddenLine>
             </a:ext>
             <a:ext uri="{AF507438-7753-43e0-B8FC-AC1667EBCBE1}">
-              <a14:hiddenEffects xmlns="" xmlns:a14="http://schemas.microsoft.com/office/drawing/2010/main">
+              <a14:hiddenEffects xmlns:a14="http://schemas.microsoft.com/office/drawing/2010/main" xmlns="">
                 <a:effectLst>
                   <a:outerShdw dist="35921" dir="2700000" algn="ctr" rotWithShape="0">
                     <a:schemeClr val="bg2"/>
@@ -360,14 +360,14 @@
           <a:effectLst/>
           <a:extLst>
             <a:ext uri="{909E8E84-426E-40dd-AFC4-6F175D3DCCD1}">
-              <a14:hiddenFill xmlns="" xmlns:a14="http://schemas.microsoft.com/office/drawing/2010/main">
+              <a14:hiddenFill xmlns:a14="http://schemas.microsoft.com/office/drawing/2010/main" xmlns="">
                 <a:solidFill>
                   <a:schemeClr val="accent1"/>
                 </a:solidFill>
               </a14:hiddenFill>
             </a:ext>
             <a:ext uri="{91240B29-F687-4f45-9708-019B960494DF}">
-              <a14:hiddenLine xmlns="" xmlns:a14="http://schemas.microsoft.com/office/drawing/2010/main" w="9525">
+              <a14:hiddenLine xmlns:a14="http://schemas.microsoft.com/office/drawing/2010/main" xmlns="" w="9525">
                 <a:solidFill>
                   <a:schemeClr val="tx1"/>
                 </a:solidFill>
@@ -377,7 +377,7 @@
               </a14:hiddenLine>
             </a:ext>
             <a:ext uri="{AF507438-7753-43e0-B8FC-AC1667EBCBE1}">
-              <a14:hiddenEffects xmlns="" xmlns:a14="http://schemas.microsoft.com/office/drawing/2010/main">
+              <a14:hiddenEffects xmlns:a14="http://schemas.microsoft.com/office/drawing/2010/main" xmlns="">
                 <a:effectLst>
                   <a:outerShdw dist="35921" dir="2700000" algn="ctr" rotWithShape="0">
                     <a:schemeClr val="bg2"/>
@@ -430,14 +430,14 @@
           <a:effectLst/>
           <a:extLst>
             <a:ext uri="{909E8E84-426E-40dd-AFC4-6F175D3DCCD1}">
-              <a14:hiddenFill xmlns="" xmlns:a14="http://schemas.microsoft.com/office/drawing/2010/main">
+              <a14:hiddenFill xmlns:a14="http://schemas.microsoft.com/office/drawing/2010/main" xmlns="">
                 <a:solidFill>
                   <a:schemeClr val="accent1"/>
                 </a:solidFill>
               </a14:hiddenFill>
             </a:ext>
             <a:ext uri="{91240B29-F687-4f45-9708-019B960494DF}">
-              <a14:hiddenLine xmlns="" xmlns:a14="http://schemas.microsoft.com/office/drawing/2010/main" w="9525">
+              <a14:hiddenLine xmlns:a14="http://schemas.microsoft.com/office/drawing/2010/main" xmlns="" w="9525">
                 <a:solidFill>
                   <a:schemeClr val="tx1"/>
                 </a:solidFill>
@@ -447,7 +447,7 @@
               </a14:hiddenLine>
             </a:ext>
             <a:ext uri="{AF507438-7753-43e0-B8FC-AC1667EBCBE1}">
-              <a14:hiddenEffects xmlns="" xmlns:a14="http://schemas.microsoft.com/office/drawing/2010/main">
+              <a14:hiddenEffects xmlns:a14="http://schemas.microsoft.com/office/drawing/2010/main" xmlns="">
                 <a:effectLst>
                   <a:outerShdw dist="35921" dir="2700000" algn="ctr" rotWithShape="0">
                     <a:schemeClr val="bg2"/>
@@ -500,14 +500,14 @@
           <a:effectLst/>
           <a:extLst>
             <a:ext uri="{909E8E84-426E-40dd-AFC4-6F175D3DCCD1}">
-              <a14:hiddenFill xmlns="" xmlns:a14="http://schemas.microsoft.com/office/drawing/2010/main">
+              <a14:hiddenFill xmlns:a14="http://schemas.microsoft.com/office/drawing/2010/main" xmlns="">
                 <a:solidFill>
                   <a:schemeClr val="accent1"/>
                 </a:solidFill>
               </a14:hiddenFill>
             </a:ext>
             <a:ext uri="{91240B29-F687-4f45-9708-019B960494DF}">
-              <a14:hiddenLine xmlns="" xmlns:a14="http://schemas.microsoft.com/office/drawing/2010/main" w="9525">
+              <a14:hiddenLine xmlns:a14="http://schemas.microsoft.com/office/drawing/2010/main" xmlns="" w="9525">
                 <a:solidFill>
                   <a:schemeClr val="tx1"/>
                 </a:solidFill>
@@ -517,7 +517,7 @@
               </a14:hiddenLine>
             </a:ext>
             <a:ext uri="{AF507438-7753-43e0-B8FC-AC1667EBCBE1}">
-              <a14:hiddenEffects xmlns="" xmlns:a14="http://schemas.microsoft.com/office/drawing/2010/main">
+              <a14:hiddenEffects xmlns:a14="http://schemas.microsoft.com/office/drawing/2010/main" xmlns="">
                 <a:effectLst>
                   <a:outerShdw dist="35921" dir="2700000" algn="ctr" rotWithShape="0">
                     <a:schemeClr val="bg2"/>
@@ -611,14 +611,14 @@
           <a:effectLst/>
           <a:extLst>
             <a:ext uri="{909E8E84-426E-40dd-AFC4-6F175D3DCCD1}">
-              <a14:hiddenFill xmlns="" xmlns:a14="http://schemas.microsoft.com/office/drawing/2010/main">
+              <a14:hiddenFill xmlns:a14="http://schemas.microsoft.com/office/drawing/2010/main" xmlns="">
                 <a:solidFill>
                   <a:schemeClr val="accent1"/>
                 </a:solidFill>
               </a14:hiddenFill>
             </a:ext>
             <a:ext uri="{91240B29-F687-4f45-9708-019B960494DF}">
-              <a14:hiddenLine xmlns="" xmlns:a14="http://schemas.microsoft.com/office/drawing/2010/main" w="9525">
+              <a14:hiddenLine xmlns:a14="http://schemas.microsoft.com/office/drawing/2010/main" xmlns="" w="9525">
                 <a:solidFill>
                   <a:schemeClr val="tx1"/>
                 </a:solidFill>
@@ -628,7 +628,7 @@
               </a14:hiddenLine>
             </a:ext>
             <a:ext uri="{AF507438-7753-43e0-B8FC-AC1667EBCBE1}">
-              <a14:hiddenEffects xmlns="" xmlns:a14="http://schemas.microsoft.com/office/drawing/2010/main">
+              <a14:hiddenEffects xmlns:a14="http://schemas.microsoft.com/office/drawing/2010/main" xmlns="">
                 <a:effectLst>
                   <a:outerShdw dist="35921" dir="2700000" algn="ctr" rotWithShape="0">
                     <a:schemeClr val="bg2"/>
@@ -681,14 +681,14 @@
           <a:effectLst/>
           <a:extLst>
             <a:ext uri="{909E8E84-426E-40dd-AFC4-6F175D3DCCD1}">
-              <a14:hiddenFill xmlns="" xmlns:a14="http://schemas.microsoft.com/office/drawing/2010/main">
+              <a14:hiddenFill xmlns:a14="http://schemas.microsoft.com/office/drawing/2010/main" xmlns="">
                 <a:solidFill>
                   <a:schemeClr val="accent1"/>
                 </a:solidFill>
               </a14:hiddenFill>
             </a:ext>
             <a:ext uri="{91240B29-F687-4f45-9708-019B960494DF}">
-              <a14:hiddenLine xmlns="" xmlns:a14="http://schemas.microsoft.com/office/drawing/2010/main" w="9525">
+              <a14:hiddenLine xmlns:a14="http://schemas.microsoft.com/office/drawing/2010/main" xmlns="" w="9525">
                 <a:solidFill>
                   <a:schemeClr val="tx1"/>
                 </a:solidFill>
@@ -698,7 +698,7 @@
               </a14:hiddenLine>
             </a:ext>
             <a:ext uri="{AF507438-7753-43e0-B8FC-AC1667EBCBE1}">
-              <a14:hiddenEffects xmlns="" xmlns:a14="http://schemas.microsoft.com/office/drawing/2010/main">
+              <a14:hiddenEffects xmlns:a14="http://schemas.microsoft.com/office/drawing/2010/main" xmlns="">
                 <a:effectLst>
                   <a:outerShdw dist="35921" dir="2700000" algn="ctr" rotWithShape="0">
                     <a:schemeClr val="bg2"/>
@@ -756,14 +756,14 @@
           <a:effectLst/>
           <a:extLst>
             <a:ext uri="{909E8E84-426E-40dd-AFC4-6F175D3DCCD1}">
-              <a14:hiddenFill xmlns="" xmlns:a14="http://schemas.microsoft.com/office/drawing/2010/main">
+              <a14:hiddenFill xmlns:a14="http://schemas.microsoft.com/office/drawing/2010/main" xmlns="">
                 <a:solidFill>
                   <a:srgbClr val="FFFFFF"/>
                 </a:solidFill>
               </a14:hiddenFill>
             </a:ext>
             <a:ext uri="{AF507438-7753-43e0-B8FC-AC1667EBCBE1}">
-              <a14:hiddenEffects xmlns="" xmlns:a14="http://schemas.microsoft.com/office/drawing/2010/main">
+              <a14:hiddenEffects xmlns:a14="http://schemas.microsoft.com/office/drawing/2010/main" xmlns="">
                 <a:effectLst>
                   <a:outerShdw dist="35921" dir="2700000" algn="ctr" rotWithShape="0">
                     <a:srgbClr val="808080"/>
@@ -772,7 +772,7 @@
               </a14:hiddenEffects>
             </a:ext>
             <a:ext uri="{53640926-AAD7-44d8-BBD7-CCE9431645EC}">
-              <a14:shadowObscured xmlns="" xmlns:a14="http://schemas.microsoft.com/office/drawing/2010/main" val="1"/>
+              <a14:shadowObscured xmlns:a14="http://schemas.microsoft.com/office/drawing/2010/main" xmlns="" val="1"/>
             </a:ext>
           </a:extLst>
         </p:spPr>
@@ -802,14 +802,14 @@
           <a:effectLst/>
           <a:extLst>
             <a:ext uri="{909E8E84-426E-40dd-AFC4-6F175D3DCCD1}">
-              <a14:hiddenFill xmlns="" xmlns:a14="http://schemas.microsoft.com/office/drawing/2010/main">
+              <a14:hiddenFill xmlns:a14="http://schemas.microsoft.com/office/drawing/2010/main" xmlns="">
                 <a:solidFill>
                   <a:schemeClr val="accent1"/>
                 </a:solidFill>
               </a14:hiddenFill>
             </a:ext>
             <a:ext uri="{91240B29-F687-4f45-9708-019B960494DF}">
-              <a14:hiddenLine xmlns="" xmlns:a14="http://schemas.microsoft.com/office/drawing/2010/main" w="9525">
+              <a14:hiddenLine xmlns:a14="http://schemas.microsoft.com/office/drawing/2010/main" xmlns="" w="9525">
                 <a:solidFill>
                   <a:schemeClr val="tx1"/>
                 </a:solidFill>
@@ -819,7 +819,7 @@
               </a14:hiddenLine>
             </a:ext>
             <a:ext uri="{AF507438-7753-43e0-B8FC-AC1667EBCBE1}">
-              <a14:hiddenEffects xmlns="" xmlns:a14="http://schemas.microsoft.com/office/drawing/2010/main">
+              <a14:hiddenEffects xmlns:a14="http://schemas.microsoft.com/office/drawing/2010/main" xmlns="">
                 <a:effectLst>
                   <a:outerShdw dist="35921" dir="2700000" algn="ctr" rotWithShape="0">
                     <a:schemeClr val="bg2"/>
@@ -898,14 +898,14 @@
           <a:effectLst/>
           <a:extLst>
             <a:ext uri="{909E8E84-426E-40dd-AFC4-6F175D3DCCD1}">
-              <a14:hiddenFill xmlns="" xmlns:a14="http://schemas.microsoft.com/office/drawing/2010/main">
+              <a14:hiddenFill xmlns:a14="http://schemas.microsoft.com/office/drawing/2010/main" xmlns="">
                 <a:solidFill>
                   <a:schemeClr val="accent1"/>
                 </a:solidFill>
               </a14:hiddenFill>
             </a:ext>
             <a:ext uri="{91240B29-F687-4f45-9708-019B960494DF}">
-              <a14:hiddenLine xmlns="" xmlns:a14="http://schemas.microsoft.com/office/drawing/2010/main" w="9525">
+              <a14:hiddenLine xmlns:a14="http://schemas.microsoft.com/office/drawing/2010/main" xmlns="" w="9525">
                 <a:solidFill>
                   <a:schemeClr val="tx1"/>
                 </a:solidFill>
@@ -915,7 +915,7 @@
               </a14:hiddenLine>
             </a:ext>
             <a:ext uri="{AF507438-7753-43e0-B8FC-AC1667EBCBE1}">
-              <a14:hiddenEffects xmlns="" xmlns:a14="http://schemas.microsoft.com/office/drawing/2010/main">
+              <a14:hiddenEffects xmlns:a14="http://schemas.microsoft.com/office/drawing/2010/main" xmlns="">
                 <a:effectLst>
                   <a:outerShdw dist="35921" dir="2700000" algn="ctr" rotWithShape="0">
                     <a:schemeClr val="bg2"/>
@@ -968,14 +968,14 @@
           <a:effectLst/>
           <a:extLst>
             <a:ext uri="{909E8E84-426E-40dd-AFC4-6F175D3DCCD1}">
-              <a14:hiddenFill xmlns="" xmlns:a14="http://schemas.microsoft.com/office/drawing/2010/main">
+              <a14:hiddenFill xmlns:a14="http://schemas.microsoft.com/office/drawing/2010/main" xmlns="">
                 <a:solidFill>
                   <a:schemeClr val="accent1"/>
                 </a:solidFill>
               </a14:hiddenFill>
             </a:ext>
             <a:ext uri="{91240B29-F687-4f45-9708-019B960494DF}">
-              <a14:hiddenLine xmlns="" xmlns:a14="http://schemas.microsoft.com/office/drawing/2010/main" w="9525">
+              <a14:hiddenLine xmlns:a14="http://schemas.microsoft.com/office/drawing/2010/main" xmlns="" w="9525">
                 <a:solidFill>
                   <a:schemeClr val="tx1"/>
                 </a:solidFill>
@@ -985,7 +985,7 @@
               </a14:hiddenLine>
             </a:ext>
             <a:ext uri="{AF507438-7753-43e0-B8FC-AC1667EBCBE1}">
-              <a14:hiddenEffects xmlns="" xmlns:a14="http://schemas.microsoft.com/office/drawing/2010/main">
+              <a14:hiddenEffects xmlns:a14="http://schemas.microsoft.com/office/drawing/2010/main" xmlns="">
                 <a:effectLst>
                   <a:outerShdw dist="35921" dir="2700000" algn="ctr" rotWithShape="0">
                     <a:schemeClr val="bg2"/>
@@ -3507,7 +3507,7 @@
           <p:cNvPr id="82" name="Text Box 263">
             <a:extLst>
               <a:ext uri="{FF2B5EF4-FFF2-40B4-BE49-F238E27FC236}">
-                <a16:creationId xmlns:a16="http://schemas.microsoft.com/office/drawing/2014/main" id="{90F87DD5-6D3C-41E1-B458-BCC75CE85A1E}"/>
+                <a16:creationId xmlns:a16="http://schemas.microsoft.com/office/drawing/2014/main" xmlns="" id="{90F87DD5-6D3C-41E1-B458-BCC75CE85A1E}"/>
               </a:ext>
             </a:extLst>
           </p:cNvPr>
@@ -3706,7 +3706,7 @@
           <p:cNvPr id="63" name="Isosceles Triangle 62">
             <a:extLst>
               <a:ext uri="{FF2B5EF4-FFF2-40B4-BE49-F238E27FC236}">
-                <a16:creationId xmlns:a16="http://schemas.microsoft.com/office/drawing/2014/main" id="{3F9C176A-6E97-4DAC-88C4-191DB65B1BBD}"/>
+                <a16:creationId xmlns:a16="http://schemas.microsoft.com/office/drawing/2014/main" xmlns="" id="{3F9C176A-6E97-4DAC-88C4-191DB65B1BBD}"/>
               </a:ext>
             </a:extLst>
           </p:cNvPr>
@@ -3715,8 +3715,8 @@
         </p:nvSpPr>
         <p:spPr bwMode="auto">
           <a:xfrm>
-            <a:off x="9112769" y="5419121"/>
-            <a:ext cx="6954848" cy="16389039"/>
+            <a:off x="9140265" y="5419121"/>
+            <a:ext cx="6927351" cy="16371823"/>
           </a:xfrm>
           <a:prstGeom prst="triangle">
             <a:avLst>
@@ -3739,7 +3739,7 @@
           <a:effectLst/>
           <a:extLst>
             <a:ext uri="{AF507438-7753-43e0-B8FC-AC1667EBCBE1}">
-              <a14:hiddenEffects xmlns="" xmlns:a14="http://schemas.microsoft.com/office/drawing/2010/main">
+              <a14:hiddenEffects xmlns:a14="http://schemas.microsoft.com/office/drawing/2010/main" xmlns="">
                 <a:effectLst>
                   <a:outerShdw dist="35921" dir="2700000" algn="ctr" rotWithShape="0">
                     <a:schemeClr val="bg2"/>
@@ -3797,7 +3797,7 @@
           <p:cNvPr id="65" name="Isosceles Triangle 64">
             <a:extLst>
               <a:ext uri="{FF2B5EF4-FFF2-40B4-BE49-F238E27FC236}">
-                <a16:creationId xmlns:a16="http://schemas.microsoft.com/office/drawing/2014/main" id="{2F961EF3-413C-4E75-B740-62DC15A766C8}"/>
+                <a16:creationId xmlns:a16="http://schemas.microsoft.com/office/drawing/2014/main" xmlns="" id="{2F961EF3-413C-4E75-B740-62DC15A766C8}"/>
               </a:ext>
             </a:extLst>
           </p:cNvPr>
@@ -3806,8 +3806,8 @@
         </p:nvSpPr>
         <p:spPr bwMode="auto">
           <a:xfrm rot="10800000">
-            <a:off x="9142231" y="21869528"/>
-            <a:ext cx="6925386" cy="10439272"/>
+            <a:off x="9155577" y="21808160"/>
+            <a:ext cx="6912040" cy="10500640"/>
           </a:xfrm>
           <a:prstGeom prst="triangle">
             <a:avLst>
@@ -3830,7 +3830,7 @@
           <a:effectLst/>
           <a:extLst>
             <a:ext uri="{AF507438-7753-43e0-B8FC-AC1667EBCBE1}">
-              <a14:hiddenEffects xmlns="" xmlns:a14="http://schemas.microsoft.com/office/drawing/2010/main">
+              <a14:hiddenEffects xmlns:a14="http://schemas.microsoft.com/office/drawing/2010/main" xmlns="">
                 <a:effectLst>
                   <a:outerShdw dist="35921" dir="2700000" algn="ctr" rotWithShape="0">
                     <a:schemeClr val="bg2"/>
@@ -3888,7 +3888,7 @@
           <p:cNvPr id="79" name="Text Box 263">
             <a:extLst>
               <a:ext uri="{FF2B5EF4-FFF2-40B4-BE49-F238E27FC236}">
-                <a16:creationId xmlns:a16="http://schemas.microsoft.com/office/drawing/2014/main" id="{DEEF7061-7B22-4636-B9EF-91C755EEA5D3}"/>
+                <a16:creationId xmlns:a16="http://schemas.microsoft.com/office/drawing/2014/main" xmlns="" id="{DEEF7061-7B22-4636-B9EF-91C755EEA5D3}"/>
               </a:ext>
             </a:extLst>
           </p:cNvPr>
@@ -4039,7 +4039,7 @@
           <p:cNvPr id="78" name="Text Box 263">
             <a:extLst>
               <a:ext uri="{FF2B5EF4-FFF2-40B4-BE49-F238E27FC236}">
-                <a16:creationId xmlns:a16="http://schemas.microsoft.com/office/drawing/2014/main" id="{F8CB70EF-F166-4A7D-B609-3B331F37F8E1}"/>
+                <a16:creationId xmlns:a16="http://schemas.microsoft.com/office/drawing/2014/main" xmlns="" id="{F8CB70EF-F166-4A7D-B609-3B331F37F8E1}"/>
               </a:ext>
             </a:extLst>
           </p:cNvPr>
@@ -4504,14 +4504,14 @@
           <a:effectLst/>
           <a:extLst>
             <a:ext uri="{909E8E84-426E-40dd-AFC4-6F175D3DCCD1}">
-              <a14:hiddenFill xmlns="" xmlns:a14="http://schemas.microsoft.com/office/drawing/2010/main">
+              <a14:hiddenFill xmlns:a14="http://schemas.microsoft.com/office/drawing/2010/main" xmlns="">
                 <a:solidFill>
                   <a:srgbClr val="000000"/>
                 </a:solidFill>
               </a14:hiddenFill>
             </a:ext>
             <a:ext uri="{91240B29-F687-4f45-9708-019B960494DF}">
-              <a14:hiddenLine xmlns="" xmlns:a14="http://schemas.microsoft.com/office/drawing/2010/main" w="9525">
+              <a14:hiddenLine xmlns:a14="http://schemas.microsoft.com/office/drawing/2010/main" xmlns="" w="9525">
                 <a:solidFill>
                   <a:schemeClr val="tx1"/>
                 </a:solidFill>
@@ -4521,7 +4521,7 @@
               </a14:hiddenLine>
             </a:ext>
             <a:ext uri="{AF507438-7753-43e0-B8FC-AC1667EBCBE1}">
-              <a14:hiddenEffects xmlns="" xmlns:a14="http://schemas.microsoft.com/office/drawing/2010/main">
+              <a14:hiddenEffects xmlns:a14="http://schemas.microsoft.com/office/drawing/2010/main" xmlns="">
                 <a:effectLst>
                   <a:outerShdw dist="35921" dir="2700000" algn="ctr" rotWithShape="0">
                     <a:srgbClr val="FFBF0B"/>
@@ -6219,6 +6219,50 @@
           </a:p>
         </p:txBody>
       </p:sp>
+      <p:cxnSp>
+        <p:nvCxnSpPr>
+          <p:cNvPr id="11" name="Straight Connector 10"/>
+          <p:cNvCxnSpPr>
+            <a:stCxn id="65" idx="4"/>
+          </p:cNvCxnSpPr>
+          <p:nvPr/>
+        </p:nvCxnSpPr>
+        <p:spPr bwMode="auto">
+          <a:xfrm>
+            <a:off x="9155577" y="21808160"/>
+            <a:ext cx="6923494" cy="10500640"/>
+          </a:xfrm>
+          <a:prstGeom prst="line">
+            <a:avLst/>
+          </a:prstGeom>
+          <a:solidFill>
+            <a:schemeClr val="accent1"/>
+          </a:solidFill>
+          <a:ln w="9525" cap="flat" cmpd="sng" algn="ctr">
+            <a:solidFill>
+              <a:schemeClr val="accent2">
+                <a:lumMod val="50000"/>
+              </a:schemeClr>
+            </a:solidFill>
+            <a:prstDash val="solid"/>
+            <a:round/>
+            <a:headEnd type="none" w="med" len="med"/>
+            <a:tailEnd type="none" w="med" len="med"/>
+          </a:ln>
+          <a:effectLst/>
+          <a:extLst>
+            <a:ext uri="{AF507438-7753-43e0-B8FC-AC1667EBCBE1}">
+              <a14:hiddenEffects xmlns:a14="http://schemas.microsoft.com/office/drawing/2010/main" xmlns="">
+                <a:effectLst>
+                  <a:outerShdw dist="35921" dir="2700000" algn="ctr" rotWithShape="0">
+                    <a:schemeClr val="bg2"/>
+                  </a:outerShdw>
+                </a:effectLst>
+              </a14:hiddenEffects>
+            </a:ext>
+          </a:extLst>
+        </p:spPr>
+      </p:cxnSp>
       <p:sp>
         <p:nvSpPr>
           <p:cNvPr id="81" name="Text Box 263"/>
@@ -6373,6 +6417,12 @@
             </a:r>
           </a:p>
           <a:p>
+            <a:r>
+              <a:rPr lang="en-US" sz="2800" dirty="0">
+                <a:effectLst/>
+              </a:rPr>
+              <a:t/>
+            </a:r>
             <a:br>
               <a:rPr lang="en-US" sz="2800" dirty="0">
                 <a:effectLst/>
@@ -6437,6 +6487,10 @@
                 <a:effectLst/>
               </a:rPr>
               <a:t>This tool allows us to see at a glance that certain characters do, indeed, have “brighter” or “darker” overall characterization to their speech.</a:t>
+            </a:r>
+            <a:r>
+              <a:rPr lang="en-US" sz="2800" dirty="0"/>
+              <a:t/>
             </a:r>
             <a:br>
               <a:rPr lang="en-US" sz="2800" dirty="0"/>
@@ -6458,7 +6512,7 @@
         <p:spPr bwMode="auto">
           <a:xfrm>
             <a:off x="1227557" y="25843212"/>
-            <a:ext cx="14568844" cy="769014"/>
+            <a:ext cx="14606202" cy="769014"/>
           </a:xfrm>
           <a:prstGeom prst="rect">
             <a:avLst/>
@@ -6605,7 +6659,7 @@
         <p:spPr bwMode="auto">
           <a:xfrm>
             <a:off x="1226969" y="26612227"/>
-            <a:ext cx="14578652" cy="2766483"/>
+            <a:ext cx="14606790" cy="2766483"/>
           </a:xfrm>
           <a:prstGeom prst="rect">
             <a:avLst/>
@@ -7309,7 +7363,7 @@
         <p:spPr bwMode="auto">
           <a:xfrm>
             <a:off x="1216733" y="30127938"/>
-            <a:ext cx="14588888" cy="2180862"/>
+            <a:ext cx="14617026" cy="2180862"/>
           </a:xfrm>
           <a:prstGeom prst="rect">
             <a:avLst/>
@@ -7326,7 +7380,7 @@
           <a:effectLst/>
           <a:extLst>
             <a:ext uri="{AF507438-7753-43e0-B8FC-AC1667EBCBE1}">
-              <a14:hiddenEffects xmlns="" xmlns:a14="http://schemas.microsoft.com/office/drawing/2010/main">
+              <a14:hiddenEffects xmlns:a14="http://schemas.microsoft.com/office/drawing/2010/main" xmlns="">
                 <a:effectLst>
                   <a:outerShdw dist="35921" dir="2700000" algn="ctr" rotWithShape="0">
                     <a:schemeClr val="bg2"/>
@@ -7578,7 +7632,7 @@
           <p:cNvPr id="20" name="Group 19">
             <a:extLst>
               <a:ext uri="{FF2B5EF4-FFF2-40B4-BE49-F238E27FC236}">
-                <a16:creationId xmlns:a16="http://schemas.microsoft.com/office/drawing/2014/main" id="{753607CC-CD60-49E7-A323-72FC13B79B7D}"/>
+                <a16:creationId xmlns:a16="http://schemas.microsoft.com/office/drawing/2014/main" xmlns="" id="{753607CC-CD60-49E7-A323-72FC13B79B7D}"/>
               </a:ext>
             </a:extLst>
           </p:cNvPr>
@@ -7621,7 +7675,7 @@
             <a:effectLst/>
             <a:extLst>
               <a:ext uri="{AF507438-7753-43e0-B8FC-AC1667EBCBE1}">
-                <a14:hiddenEffects xmlns="" xmlns:a14="http://schemas.microsoft.com/office/drawing/2010/main">
+                <a14:hiddenEffects xmlns:a14="http://schemas.microsoft.com/office/drawing/2010/main" xmlns="">
                   <a:effectLst>
                     <a:outerShdw dist="35921" dir="2700000" algn="ctr" rotWithShape="0">
                       <a:schemeClr val="bg2"/>
@@ -7910,12 +7964,56 @@
           </p:txBody>
         </p:sp>
       </p:grpSp>
+      <p:cxnSp>
+        <p:nvCxnSpPr>
+          <p:cNvPr id="86" name="Straight Connector 85"/>
+          <p:cNvCxnSpPr>
+            <a:stCxn id="63" idx="2"/>
+          </p:cNvCxnSpPr>
+          <p:nvPr/>
+        </p:nvCxnSpPr>
+        <p:spPr bwMode="auto">
+          <a:xfrm flipV="1">
+            <a:off x="9140265" y="5414043"/>
+            <a:ext cx="6901360" cy="16376901"/>
+          </a:xfrm>
+          <a:prstGeom prst="line">
+            <a:avLst/>
+          </a:prstGeom>
+          <a:solidFill>
+            <a:schemeClr val="accent1"/>
+          </a:solidFill>
+          <a:ln w="9525" cap="flat" cmpd="sng" algn="ctr">
+            <a:solidFill>
+              <a:schemeClr val="accent2">
+                <a:lumMod val="50000"/>
+              </a:schemeClr>
+            </a:solidFill>
+            <a:prstDash val="solid"/>
+            <a:round/>
+            <a:headEnd type="none" w="med" len="med"/>
+            <a:tailEnd type="none" w="med" len="med"/>
+          </a:ln>
+          <a:effectLst/>
+          <a:extLst>
+            <a:ext uri="{AF507438-7753-43e0-B8FC-AC1667EBCBE1}">
+              <a14:hiddenEffects xmlns:a14="http://schemas.microsoft.com/office/drawing/2010/main" xmlns="">
+                <a:effectLst>
+                  <a:outerShdw dist="35921" dir="2700000" algn="ctr" rotWithShape="0">
+                    <a:schemeClr val="bg2"/>
+                  </a:outerShdw>
+                </a:effectLst>
+              </a14:hiddenEffects>
+            </a:ext>
+          </a:extLst>
+        </p:spPr>
+      </p:cxnSp>
       <p:grpSp>
         <p:nvGrpSpPr>
           <p:cNvPr id="17" name="Group 16">
             <a:extLst>
               <a:ext uri="{FF2B5EF4-FFF2-40B4-BE49-F238E27FC236}">
-                <a16:creationId xmlns:a16="http://schemas.microsoft.com/office/drawing/2014/main" id="{805B18CB-5FCA-49E9-9474-93EEAF482318}"/>
+                <a16:creationId xmlns:a16="http://schemas.microsoft.com/office/drawing/2014/main" xmlns="" id="{805B18CB-5FCA-49E9-9474-93EEAF482318}"/>
               </a:ext>
             </a:extLst>
           </p:cNvPr>
@@ -7935,7 +8033,7 @@
             <p:cNvPr id="54" name="Text Box 263">
               <a:extLst>
                 <a:ext uri="{FF2B5EF4-FFF2-40B4-BE49-F238E27FC236}">
-                  <a16:creationId xmlns:a16="http://schemas.microsoft.com/office/drawing/2014/main" id="{2C460C58-64E7-4204-912A-7A9F8309B605}"/>
+                  <a16:creationId xmlns:a16="http://schemas.microsoft.com/office/drawing/2014/main" xmlns="" id="{2C460C58-64E7-4204-912A-7A9F8309B605}"/>
                 </a:ext>
               </a:extLst>
             </p:cNvPr>
@@ -8077,6 +8175,12 @@
             </a:p>
             <a:p>
               <a:pPr indent="-228600"/>
+              <a:r>
+                <a:rPr lang="en-US" sz="1000" dirty="0">
+                  <a:effectLst/>
+                </a:rPr>
+                <a:t/>
+              </a:r>
               <a:br>
                 <a:rPr lang="en-US" sz="1000" dirty="0">
                   <a:effectLst/>
@@ -8091,6 +8195,12 @@
             </a:p>
             <a:p>
               <a:pPr indent="-228600"/>
+              <a:r>
+                <a:rPr lang="en-US" sz="1000" dirty="0">
+                  <a:effectLst/>
+                </a:rPr>
+                <a:t/>
+              </a:r>
               <a:br>
                 <a:rPr lang="en-US" sz="1000" dirty="0">
                   <a:effectLst/>
@@ -8114,7 +8224,7 @@
             <p:cNvPr id="56" name="Text Box 263">
               <a:extLst>
                 <a:ext uri="{FF2B5EF4-FFF2-40B4-BE49-F238E27FC236}">
-                  <a16:creationId xmlns:a16="http://schemas.microsoft.com/office/drawing/2014/main" id="{6F1A8300-3B19-45F5-99FA-F65FB890D220}"/>
+                  <a16:creationId xmlns:a16="http://schemas.microsoft.com/office/drawing/2014/main" xmlns="" id="{6F1A8300-3B19-45F5-99FA-F65FB890D220}"/>
                 </a:ext>
               </a:extLst>
             </p:cNvPr>
@@ -8345,7 +8455,7 @@
           <p:cNvPr id="66" name="Isosceles Triangle 65">
             <a:extLst>
               <a:ext uri="{FF2B5EF4-FFF2-40B4-BE49-F238E27FC236}">
-                <a16:creationId xmlns:a16="http://schemas.microsoft.com/office/drawing/2014/main" id="{8BDCDC91-A860-4F73-A609-A050B902D6E3}"/>
+                <a16:creationId xmlns:a16="http://schemas.microsoft.com/office/drawing/2014/main" xmlns="" id="{8BDCDC91-A860-4F73-A609-A050B902D6E3}"/>
               </a:ext>
             </a:extLst>
           </p:cNvPr>
@@ -8354,12 +8464,12 @@
         </p:nvSpPr>
         <p:spPr bwMode="auto">
           <a:xfrm rot="16200000">
-            <a:off x="6508070" y="15729350"/>
-            <a:ext cx="12103703" cy="6835375"/>
+            <a:off x="6539993" y="15731288"/>
+            <a:ext cx="12087058" cy="6882575"/>
           </a:xfrm>
           <a:prstGeom prst="triangle">
             <a:avLst>
-              <a:gd name="adj" fmla="val 27961"/>
+              <a:gd name="adj" fmla="val 28237"/>
             </a:avLst>
           </a:prstGeom>
           <a:solidFill>
@@ -8378,7 +8488,7 @@
           <a:effectLst/>
           <a:extLst>
             <a:ext uri="{AF507438-7753-43e0-B8FC-AC1667EBCBE1}">
-              <a14:hiddenEffects xmlns="" xmlns:a14="http://schemas.microsoft.com/office/drawing/2010/main">
+              <a14:hiddenEffects xmlns:a14="http://schemas.microsoft.com/office/drawing/2010/main" xmlns="">
                 <a:effectLst>
                   <a:outerShdw dist="35921" dir="2700000" algn="ctr" rotWithShape="0">
                     <a:schemeClr val="bg2"/>
@@ -8431,12 +8541,56 @@
           </a:p>
         </p:txBody>
       </p:sp>
+      <p:cxnSp>
+        <p:nvCxnSpPr>
+          <p:cNvPr id="73" name="Straight Connector 72"/>
+          <p:cNvCxnSpPr>
+            <a:stCxn id="66" idx="0"/>
+          </p:cNvCxnSpPr>
+          <p:nvPr/>
+        </p:nvCxnSpPr>
+        <p:spPr bwMode="auto">
+          <a:xfrm flipV="1">
+            <a:off x="9142235" y="13094617"/>
+            <a:ext cx="6904688" cy="8708465"/>
+          </a:xfrm>
+          <a:prstGeom prst="line">
+            <a:avLst/>
+          </a:prstGeom>
+          <a:solidFill>
+            <a:schemeClr val="accent1"/>
+          </a:solidFill>
+          <a:ln w="9525" cap="flat" cmpd="sng" algn="ctr">
+            <a:solidFill>
+              <a:schemeClr val="accent2">
+                <a:lumMod val="50000"/>
+              </a:schemeClr>
+            </a:solidFill>
+            <a:prstDash val="solid"/>
+            <a:round/>
+            <a:headEnd type="none" w="med" len="med"/>
+            <a:tailEnd type="none" w="med" len="med"/>
+          </a:ln>
+          <a:effectLst/>
+          <a:extLst>
+            <a:ext uri="{AF507438-7753-43e0-B8FC-AC1667EBCBE1}">
+              <a14:hiddenEffects xmlns:a14="http://schemas.microsoft.com/office/drawing/2010/main" xmlns="">
+                <a:effectLst>
+                  <a:outerShdw dist="35921" dir="2700000" algn="ctr" rotWithShape="0">
+                    <a:schemeClr val="bg2"/>
+                  </a:outerShdw>
+                </a:effectLst>
+              </a14:hiddenEffects>
+            </a:ext>
+          </a:extLst>
+        </p:spPr>
+      </p:cxnSp>
       <p:grpSp>
         <p:nvGrpSpPr>
           <p:cNvPr id="19" name="Group 18">
             <a:extLst>
               <a:ext uri="{FF2B5EF4-FFF2-40B4-BE49-F238E27FC236}">
-                <a16:creationId xmlns:a16="http://schemas.microsoft.com/office/drawing/2014/main" id="{96D30C17-4ACB-43AB-9D65-23EFCFEF01E7}"/>
+                <a16:creationId xmlns:a16="http://schemas.microsoft.com/office/drawing/2014/main" xmlns="" id="{96D30C17-4ACB-43AB-9D65-23EFCFEF01E7}"/>
               </a:ext>
             </a:extLst>
           </p:cNvPr>
@@ -8446,9 +8600,9 @@
         <p:grpSpPr>
           <a:xfrm>
             <a:off x="1225199" y="11260472"/>
-            <a:ext cx="14984866" cy="4537358"/>
+            <a:ext cx="14984866" cy="4518053"/>
             <a:chOff x="1133918" y="11244854"/>
-            <a:chExt cx="14984866" cy="4537358"/>
+            <a:chExt cx="14984866" cy="4518053"/>
           </a:xfrm>
           <a:solidFill>
             <a:schemeClr val="bg1"/>
@@ -8459,7 +8613,7 @@
             <p:cNvPr id="50" name="Text Box 263">
               <a:extLst>
                 <a:ext uri="{FF2B5EF4-FFF2-40B4-BE49-F238E27FC236}">
-                  <a16:creationId xmlns:a16="http://schemas.microsoft.com/office/drawing/2014/main" id="{E092D375-05B1-4228-A258-8E736865B013}"/>
+                  <a16:creationId xmlns:a16="http://schemas.microsoft.com/office/drawing/2014/main" xmlns="" id="{E092D375-05B1-4228-A258-8E736865B013}"/>
                 </a:ext>
               </a:extLst>
             </p:cNvPr>
@@ -8609,7 +8763,7 @@
             <p:cNvPr id="43" name="Text Box 263">
               <a:extLst>
                 <a:ext uri="{FF2B5EF4-FFF2-40B4-BE49-F238E27FC236}">
-                  <a16:creationId xmlns:a16="http://schemas.microsoft.com/office/drawing/2014/main" id="{99FC432D-809F-4CEB-B05C-4352B08C803C}"/>
+                  <a16:creationId xmlns:a16="http://schemas.microsoft.com/office/drawing/2014/main" xmlns="" id="{99FC432D-809F-4CEB-B05C-4352B08C803C}"/>
                 </a:ext>
               </a:extLst>
             </p:cNvPr>
@@ -8867,7 +9021,7 @@
             <p:cNvPr id="9" name="Picture 8">
               <a:extLst>
                 <a:ext uri="{FF2B5EF4-FFF2-40B4-BE49-F238E27FC236}">
-                  <a16:creationId xmlns:a16="http://schemas.microsoft.com/office/drawing/2014/main" id="{530F80FF-73F5-4B97-B0D1-3AEB30FF03F8}"/>
+                  <a16:creationId xmlns:a16="http://schemas.microsoft.com/office/drawing/2014/main" xmlns="" id="{530F80FF-73F5-4B97-B0D1-3AEB30FF03F8}"/>
                 </a:ext>
               </a:extLst>
             </p:cNvPr>
@@ -8904,7 +9058,7 @@
             <p:cNvPr id="16" name="TextBox 15">
               <a:extLst>
                 <a:ext uri="{FF2B5EF4-FFF2-40B4-BE49-F238E27FC236}">
-                  <a16:creationId xmlns:a16="http://schemas.microsoft.com/office/drawing/2014/main" id="{45F0E81A-41C8-4AF1-B9DF-E1F549B787BE}"/>
+                  <a16:creationId xmlns:a16="http://schemas.microsoft.com/office/drawing/2014/main" xmlns="" id="{45F0E81A-41C8-4AF1-B9DF-E1F549B787BE}"/>
                 </a:ext>
               </a:extLst>
             </p:cNvPr>
@@ -8939,7 +9093,7 @@
             <p:cNvPr id="51" name="TextBox 50">
               <a:extLst>
                 <a:ext uri="{FF2B5EF4-FFF2-40B4-BE49-F238E27FC236}">
-                  <a16:creationId xmlns:a16="http://schemas.microsoft.com/office/drawing/2014/main" id="{9814A516-53B3-4476-8997-FBF776CECA44}"/>
+                  <a16:creationId xmlns:a16="http://schemas.microsoft.com/office/drawing/2014/main" xmlns="" id="{9814A516-53B3-4476-8997-FBF776CECA44}"/>
                 </a:ext>
               </a:extLst>
             </p:cNvPr>
@@ -8948,8 +9102,8 @@
           </p:nvSpPr>
           <p:spPr>
             <a:xfrm>
-              <a:off x="8316315" y="14951215"/>
-              <a:ext cx="7398025" cy="830997"/>
+              <a:off x="8340881" y="14925455"/>
+              <a:ext cx="7356922" cy="830997"/>
             </a:xfrm>
             <a:prstGeom prst="rect">
               <a:avLst/>
@@ -8976,7 +9130,7 @@
           <p:cNvPr id="70" name="Picture 69">
             <a:extLst>
               <a:ext uri="{FF2B5EF4-FFF2-40B4-BE49-F238E27FC236}">
-                <a16:creationId xmlns:a16="http://schemas.microsoft.com/office/drawing/2014/main" id="{12A9C63F-EBD0-4D06-A504-D824E374D8B9}"/>
+                <a16:creationId xmlns:a16="http://schemas.microsoft.com/office/drawing/2014/main" xmlns="" id="{12A9C63F-EBD0-4D06-A504-D824E374D8B9}"/>
               </a:ext>
             </a:extLst>
           </p:cNvPr>
@@ -9012,7 +9166,7 @@
           <p:cNvPr id="83" name="TextBox 82">
             <a:extLst>
               <a:ext uri="{FF2B5EF4-FFF2-40B4-BE49-F238E27FC236}">
-                <a16:creationId xmlns:a16="http://schemas.microsoft.com/office/drawing/2014/main" id="{7BC5959E-C084-4F76-8353-609093824D69}"/>
+                <a16:creationId xmlns:a16="http://schemas.microsoft.com/office/drawing/2014/main" xmlns="" id="{7BC5959E-C084-4F76-8353-609093824D69}"/>
               </a:ext>
             </a:extLst>
           </p:cNvPr>
@@ -9041,6 +9195,10 @@
             </a:r>
           </a:p>
           <a:p>
+            <a:r>
+              <a:rPr lang="en-US" dirty="0"/>
+              <a:t/>
+            </a:r>
             <a:br>
               <a:rPr lang="en-US" dirty="0"/>
             </a:br>
@@ -9053,7 +9211,7 @@
           <p:cNvPr id="85" name="TextBox 84">
             <a:extLst>
               <a:ext uri="{FF2B5EF4-FFF2-40B4-BE49-F238E27FC236}">
-                <a16:creationId xmlns:a16="http://schemas.microsoft.com/office/drawing/2014/main" id="{797ACB8E-1701-408D-98F9-FFC2BFD4783A}"/>
+                <a16:creationId xmlns:a16="http://schemas.microsoft.com/office/drawing/2014/main" xmlns="" id="{797ACB8E-1701-408D-98F9-FFC2BFD4783A}"/>
               </a:ext>
             </a:extLst>
           </p:cNvPr>
@@ -9088,7 +9246,7 @@
           <p:cNvPr id="3" name="Group 2">
             <a:extLst>
               <a:ext uri="{FF2B5EF4-FFF2-40B4-BE49-F238E27FC236}">
-                <a16:creationId xmlns:a16="http://schemas.microsoft.com/office/drawing/2014/main" id="{C2C36A0C-5609-49E1-8036-B3523FDCB596}"/>
+                <a16:creationId xmlns:a16="http://schemas.microsoft.com/office/drawing/2014/main" xmlns="" id="{C2C36A0C-5609-49E1-8036-B3523FDCB596}"/>
               </a:ext>
             </a:extLst>
           </p:cNvPr>
@@ -9108,7 +9266,7 @@
             <p:cNvPr id="84" name="Group 83">
               <a:extLst>
                 <a:ext uri="{FF2B5EF4-FFF2-40B4-BE49-F238E27FC236}">
-                  <a16:creationId xmlns:a16="http://schemas.microsoft.com/office/drawing/2014/main" id="{58C465F4-B0F9-4E58-8951-C85675715723}"/>
+                  <a16:creationId xmlns:a16="http://schemas.microsoft.com/office/drawing/2014/main" xmlns="" id="{58C465F4-B0F9-4E58-8951-C85675715723}"/>
                 </a:ext>
               </a:extLst>
             </p:cNvPr>
@@ -9128,7 +9286,7 @@
               <p:cNvPr id="75" name="Picture 74">
                 <a:extLst>
                   <a:ext uri="{FF2B5EF4-FFF2-40B4-BE49-F238E27FC236}">
-                    <a16:creationId xmlns:a16="http://schemas.microsoft.com/office/drawing/2014/main" id="{CE37A18D-44BC-4012-BC15-9652DE7C5DF0}"/>
+                    <a16:creationId xmlns:a16="http://schemas.microsoft.com/office/drawing/2014/main" xmlns="" id="{CE37A18D-44BC-4012-BC15-9652DE7C5DF0}"/>
                   </a:ext>
                 </a:extLst>
               </p:cNvPr>
@@ -9164,7 +9322,7 @@
               <p:cNvPr id="77" name="Picture 76">
                 <a:extLst>
                   <a:ext uri="{FF2B5EF4-FFF2-40B4-BE49-F238E27FC236}">
-                    <a16:creationId xmlns:a16="http://schemas.microsoft.com/office/drawing/2014/main" id="{BAE44E80-F692-4FE3-8D73-EC35C5E8CBFC}"/>
+                    <a16:creationId xmlns:a16="http://schemas.microsoft.com/office/drawing/2014/main" xmlns="" id="{BAE44E80-F692-4FE3-8D73-EC35C5E8CBFC}"/>
                   </a:ext>
                 </a:extLst>
               </p:cNvPr>
@@ -9200,7 +9358,7 @@
             <p:cNvPr id="58" name="TextBox 57">
               <a:extLst>
                 <a:ext uri="{FF2B5EF4-FFF2-40B4-BE49-F238E27FC236}">
-                  <a16:creationId xmlns:a16="http://schemas.microsoft.com/office/drawing/2014/main" id="{7E622FE0-B4BF-4456-B87B-B9290A2288C9}"/>
+                  <a16:creationId xmlns:a16="http://schemas.microsoft.com/office/drawing/2014/main" xmlns="" id="{7E622FE0-B4BF-4456-B87B-B9290A2288C9}"/>
                 </a:ext>
               </a:extLst>
             </p:cNvPr>
@@ -9229,6 +9387,10 @@
               </a:r>
             </a:p>
             <a:p>
+              <a:r>
+                <a:rPr lang="en-US" dirty="0"/>
+                <a:t/>
+              </a:r>
               <a:br>
                 <a:rPr lang="en-US" dirty="0"/>
               </a:br>
@@ -9241,7 +9403,7 @@
             <p:cNvPr id="59" name="TextBox 58">
               <a:extLst>
                 <a:ext uri="{FF2B5EF4-FFF2-40B4-BE49-F238E27FC236}">
-                  <a16:creationId xmlns:a16="http://schemas.microsoft.com/office/drawing/2014/main" id="{655D8046-4C33-4752-899F-6853C02D14AB}"/>
+                  <a16:creationId xmlns:a16="http://schemas.microsoft.com/office/drawing/2014/main" xmlns="" id="{655D8046-4C33-4752-899F-6853C02D14AB}"/>
                 </a:ext>
               </a:extLst>
             </p:cNvPr>
@@ -9270,6 +9432,10 @@
               </a:r>
             </a:p>
             <a:p>
+              <a:r>
+                <a:rPr lang="en-US" dirty="0"/>
+                <a:t/>
+              </a:r>
               <a:br>
                 <a:rPr lang="en-US" dirty="0"/>
               </a:br>
@@ -9278,6 +9444,50 @@
           </p:txBody>
         </p:sp>
       </p:grpSp>
+      <p:cxnSp>
+        <p:nvCxnSpPr>
+          <p:cNvPr id="62" name="Straight Connector 61"/>
+          <p:cNvCxnSpPr>
+            <a:stCxn id="63" idx="2"/>
+          </p:cNvCxnSpPr>
+          <p:nvPr/>
+        </p:nvCxnSpPr>
+        <p:spPr bwMode="auto">
+          <a:xfrm>
+            <a:off x="9140265" y="21790944"/>
+            <a:ext cx="6895997" cy="3425161"/>
+          </a:xfrm>
+          <a:prstGeom prst="line">
+            <a:avLst/>
+          </a:prstGeom>
+          <a:solidFill>
+            <a:schemeClr val="accent1"/>
+          </a:solidFill>
+          <a:ln w="9525" cap="flat" cmpd="sng" algn="ctr">
+            <a:solidFill>
+              <a:schemeClr val="accent2">
+                <a:lumMod val="50000"/>
+              </a:schemeClr>
+            </a:solidFill>
+            <a:prstDash val="solid"/>
+            <a:round/>
+            <a:headEnd type="none" w="med" len="med"/>
+            <a:tailEnd type="none" w="med" len="med"/>
+          </a:ln>
+          <a:effectLst/>
+          <a:extLst>
+            <a:ext uri="{AF507438-7753-43e0-B8FC-AC1667EBCBE1}">
+              <a14:hiddenEffects xmlns:a14="http://schemas.microsoft.com/office/drawing/2010/main" xmlns="">
+                <a:effectLst>
+                  <a:outerShdw dist="35921" dir="2700000" algn="ctr" rotWithShape="0">
+                    <a:schemeClr val="bg2"/>
+                  </a:outerShdw>
+                </a:effectLst>
+              </a14:hiddenEffects>
+            </a:ext>
+          </a:extLst>
+        </p:spPr>
+      </p:cxnSp>
     </p:spTree>
   </p:cSld>
   <p:clrMapOvr>
@@ -9536,7 +9746,7 @@
         <a:effectLst/>
         <a:extLst>
           <a:ext uri="{AF507438-7753-43e0-B8FC-AC1667EBCBE1}">
-            <a14:hiddenEffects xmlns="" xmlns:a14="http://schemas.microsoft.com/office/drawing/2010/main">
+            <a14:hiddenEffects xmlns:a14="http://schemas.microsoft.com/office/drawing/2010/main" xmlns="">
               <a:effectLst>
                 <a:outerShdw dist="35921" dir="2700000" algn="ctr" rotWithShape="0">
                   <a:schemeClr val="bg2"/>
@@ -9615,7 +9825,7 @@
         <a:effectLst/>
         <a:extLst>
           <a:ext uri="{AF507438-7753-43e0-B8FC-AC1667EBCBE1}">
-            <a14:hiddenEffects xmlns="" xmlns:a14="http://schemas.microsoft.com/office/drawing/2010/main">
+            <a14:hiddenEffects xmlns:a14="http://schemas.microsoft.com/office/drawing/2010/main" xmlns="">
               <a:effectLst>
                 <a:outerShdw dist="35921" dir="2700000" algn="ctr" rotWithShape="0">
                   <a:schemeClr val="bg2"/>

</xml_diff>

<commit_message>
Made progress on converter structure. Need to finish adding mapping and assemble the various sub-steps
</commit_message>
<xml_diff>
--- a/Poster Rough Draft.pptx
+++ b/Poster Rough Draft.pptx
@@ -290,14 +290,14 @@
           <a:effectLst/>
           <a:extLst>
             <a:ext uri="{909E8E84-426E-40dd-AFC4-6F175D3DCCD1}">
-              <a14:hiddenFill xmlns:a14="http://schemas.microsoft.com/office/drawing/2010/main" xmlns="">
+              <a14:hiddenFill xmlns="" xmlns:a14="http://schemas.microsoft.com/office/drawing/2010/main">
                 <a:solidFill>
                   <a:schemeClr val="accent1"/>
                 </a:solidFill>
               </a14:hiddenFill>
             </a:ext>
             <a:ext uri="{91240B29-F687-4f45-9708-019B960494DF}">
-              <a14:hiddenLine xmlns:a14="http://schemas.microsoft.com/office/drawing/2010/main" xmlns="" w="9525">
+              <a14:hiddenLine xmlns="" xmlns:a14="http://schemas.microsoft.com/office/drawing/2010/main" w="9525">
                 <a:solidFill>
                   <a:schemeClr val="tx1"/>
                 </a:solidFill>
@@ -307,7 +307,7 @@
               </a14:hiddenLine>
             </a:ext>
             <a:ext uri="{AF507438-7753-43e0-B8FC-AC1667EBCBE1}">
-              <a14:hiddenEffects xmlns:a14="http://schemas.microsoft.com/office/drawing/2010/main" xmlns="">
+              <a14:hiddenEffects xmlns="" xmlns:a14="http://schemas.microsoft.com/office/drawing/2010/main">
                 <a:effectLst>
                   <a:outerShdw dist="35921" dir="2700000" algn="ctr" rotWithShape="0">
                     <a:schemeClr val="bg2"/>
@@ -360,14 +360,14 @@
           <a:effectLst/>
           <a:extLst>
             <a:ext uri="{909E8E84-426E-40dd-AFC4-6F175D3DCCD1}">
-              <a14:hiddenFill xmlns:a14="http://schemas.microsoft.com/office/drawing/2010/main" xmlns="">
+              <a14:hiddenFill xmlns="" xmlns:a14="http://schemas.microsoft.com/office/drawing/2010/main">
                 <a:solidFill>
                   <a:schemeClr val="accent1"/>
                 </a:solidFill>
               </a14:hiddenFill>
             </a:ext>
             <a:ext uri="{91240B29-F687-4f45-9708-019B960494DF}">
-              <a14:hiddenLine xmlns:a14="http://schemas.microsoft.com/office/drawing/2010/main" xmlns="" w="9525">
+              <a14:hiddenLine xmlns="" xmlns:a14="http://schemas.microsoft.com/office/drawing/2010/main" w="9525">
                 <a:solidFill>
                   <a:schemeClr val="tx1"/>
                 </a:solidFill>
@@ -377,7 +377,7 @@
               </a14:hiddenLine>
             </a:ext>
             <a:ext uri="{AF507438-7753-43e0-B8FC-AC1667EBCBE1}">
-              <a14:hiddenEffects xmlns:a14="http://schemas.microsoft.com/office/drawing/2010/main" xmlns="">
+              <a14:hiddenEffects xmlns="" xmlns:a14="http://schemas.microsoft.com/office/drawing/2010/main">
                 <a:effectLst>
                   <a:outerShdw dist="35921" dir="2700000" algn="ctr" rotWithShape="0">
                     <a:schemeClr val="bg2"/>
@@ -430,14 +430,14 @@
           <a:effectLst/>
           <a:extLst>
             <a:ext uri="{909E8E84-426E-40dd-AFC4-6F175D3DCCD1}">
-              <a14:hiddenFill xmlns:a14="http://schemas.microsoft.com/office/drawing/2010/main" xmlns="">
+              <a14:hiddenFill xmlns="" xmlns:a14="http://schemas.microsoft.com/office/drawing/2010/main">
                 <a:solidFill>
                   <a:schemeClr val="accent1"/>
                 </a:solidFill>
               </a14:hiddenFill>
             </a:ext>
             <a:ext uri="{91240B29-F687-4f45-9708-019B960494DF}">
-              <a14:hiddenLine xmlns:a14="http://schemas.microsoft.com/office/drawing/2010/main" xmlns="" w="9525">
+              <a14:hiddenLine xmlns="" xmlns:a14="http://schemas.microsoft.com/office/drawing/2010/main" w="9525">
                 <a:solidFill>
                   <a:schemeClr val="tx1"/>
                 </a:solidFill>
@@ -447,7 +447,7 @@
               </a14:hiddenLine>
             </a:ext>
             <a:ext uri="{AF507438-7753-43e0-B8FC-AC1667EBCBE1}">
-              <a14:hiddenEffects xmlns:a14="http://schemas.microsoft.com/office/drawing/2010/main" xmlns="">
+              <a14:hiddenEffects xmlns="" xmlns:a14="http://schemas.microsoft.com/office/drawing/2010/main">
                 <a:effectLst>
                   <a:outerShdw dist="35921" dir="2700000" algn="ctr" rotWithShape="0">
                     <a:schemeClr val="bg2"/>
@@ -500,14 +500,14 @@
           <a:effectLst/>
           <a:extLst>
             <a:ext uri="{909E8E84-426E-40dd-AFC4-6F175D3DCCD1}">
-              <a14:hiddenFill xmlns:a14="http://schemas.microsoft.com/office/drawing/2010/main" xmlns="">
+              <a14:hiddenFill xmlns="" xmlns:a14="http://schemas.microsoft.com/office/drawing/2010/main">
                 <a:solidFill>
                   <a:schemeClr val="accent1"/>
                 </a:solidFill>
               </a14:hiddenFill>
             </a:ext>
             <a:ext uri="{91240B29-F687-4f45-9708-019B960494DF}">
-              <a14:hiddenLine xmlns:a14="http://schemas.microsoft.com/office/drawing/2010/main" xmlns="" w="9525">
+              <a14:hiddenLine xmlns="" xmlns:a14="http://schemas.microsoft.com/office/drawing/2010/main" w="9525">
                 <a:solidFill>
                   <a:schemeClr val="tx1"/>
                 </a:solidFill>
@@ -517,7 +517,7 @@
               </a14:hiddenLine>
             </a:ext>
             <a:ext uri="{AF507438-7753-43e0-B8FC-AC1667EBCBE1}">
-              <a14:hiddenEffects xmlns:a14="http://schemas.microsoft.com/office/drawing/2010/main" xmlns="">
+              <a14:hiddenEffects xmlns="" xmlns:a14="http://schemas.microsoft.com/office/drawing/2010/main">
                 <a:effectLst>
                   <a:outerShdw dist="35921" dir="2700000" algn="ctr" rotWithShape="0">
                     <a:schemeClr val="bg2"/>
@@ -611,14 +611,14 @@
           <a:effectLst/>
           <a:extLst>
             <a:ext uri="{909E8E84-426E-40dd-AFC4-6F175D3DCCD1}">
-              <a14:hiddenFill xmlns:a14="http://schemas.microsoft.com/office/drawing/2010/main" xmlns="">
+              <a14:hiddenFill xmlns="" xmlns:a14="http://schemas.microsoft.com/office/drawing/2010/main">
                 <a:solidFill>
                   <a:schemeClr val="accent1"/>
                 </a:solidFill>
               </a14:hiddenFill>
             </a:ext>
             <a:ext uri="{91240B29-F687-4f45-9708-019B960494DF}">
-              <a14:hiddenLine xmlns:a14="http://schemas.microsoft.com/office/drawing/2010/main" xmlns="" w="9525">
+              <a14:hiddenLine xmlns="" xmlns:a14="http://schemas.microsoft.com/office/drawing/2010/main" w="9525">
                 <a:solidFill>
                   <a:schemeClr val="tx1"/>
                 </a:solidFill>
@@ -628,7 +628,7 @@
               </a14:hiddenLine>
             </a:ext>
             <a:ext uri="{AF507438-7753-43e0-B8FC-AC1667EBCBE1}">
-              <a14:hiddenEffects xmlns:a14="http://schemas.microsoft.com/office/drawing/2010/main" xmlns="">
+              <a14:hiddenEffects xmlns="" xmlns:a14="http://schemas.microsoft.com/office/drawing/2010/main">
                 <a:effectLst>
                   <a:outerShdw dist="35921" dir="2700000" algn="ctr" rotWithShape="0">
                     <a:schemeClr val="bg2"/>
@@ -681,14 +681,14 @@
           <a:effectLst/>
           <a:extLst>
             <a:ext uri="{909E8E84-426E-40dd-AFC4-6F175D3DCCD1}">
-              <a14:hiddenFill xmlns:a14="http://schemas.microsoft.com/office/drawing/2010/main" xmlns="">
+              <a14:hiddenFill xmlns="" xmlns:a14="http://schemas.microsoft.com/office/drawing/2010/main">
                 <a:solidFill>
                   <a:schemeClr val="accent1"/>
                 </a:solidFill>
               </a14:hiddenFill>
             </a:ext>
             <a:ext uri="{91240B29-F687-4f45-9708-019B960494DF}">
-              <a14:hiddenLine xmlns:a14="http://schemas.microsoft.com/office/drawing/2010/main" xmlns="" w="9525">
+              <a14:hiddenLine xmlns="" xmlns:a14="http://schemas.microsoft.com/office/drawing/2010/main" w="9525">
                 <a:solidFill>
                   <a:schemeClr val="tx1"/>
                 </a:solidFill>
@@ -698,7 +698,7 @@
               </a14:hiddenLine>
             </a:ext>
             <a:ext uri="{AF507438-7753-43e0-B8FC-AC1667EBCBE1}">
-              <a14:hiddenEffects xmlns:a14="http://schemas.microsoft.com/office/drawing/2010/main" xmlns="">
+              <a14:hiddenEffects xmlns="" xmlns:a14="http://schemas.microsoft.com/office/drawing/2010/main">
                 <a:effectLst>
                   <a:outerShdw dist="35921" dir="2700000" algn="ctr" rotWithShape="0">
                     <a:schemeClr val="bg2"/>
@@ -756,14 +756,14 @@
           <a:effectLst/>
           <a:extLst>
             <a:ext uri="{909E8E84-426E-40dd-AFC4-6F175D3DCCD1}">
-              <a14:hiddenFill xmlns:a14="http://schemas.microsoft.com/office/drawing/2010/main" xmlns="">
+              <a14:hiddenFill xmlns="" xmlns:a14="http://schemas.microsoft.com/office/drawing/2010/main">
                 <a:solidFill>
                   <a:srgbClr val="FFFFFF"/>
                 </a:solidFill>
               </a14:hiddenFill>
             </a:ext>
             <a:ext uri="{AF507438-7753-43e0-B8FC-AC1667EBCBE1}">
-              <a14:hiddenEffects xmlns:a14="http://schemas.microsoft.com/office/drawing/2010/main" xmlns="">
+              <a14:hiddenEffects xmlns="" xmlns:a14="http://schemas.microsoft.com/office/drawing/2010/main">
                 <a:effectLst>
                   <a:outerShdw dist="35921" dir="2700000" algn="ctr" rotWithShape="0">
                     <a:srgbClr val="808080"/>
@@ -772,7 +772,7 @@
               </a14:hiddenEffects>
             </a:ext>
             <a:ext uri="{53640926-AAD7-44d8-BBD7-CCE9431645EC}">
-              <a14:shadowObscured xmlns:a14="http://schemas.microsoft.com/office/drawing/2010/main" xmlns="" val="1"/>
+              <a14:shadowObscured xmlns="" xmlns:a14="http://schemas.microsoft.com/office/drawing/2010/main" val="1"/>
             </a:ext>
           </a:extLst>
         </p:spPr>
@@ -802,14 +802,14 @@
           <a:effectLst/>
           <a:extLst>
             <a:ext uri="{909E8E84-426E-40dd-AFC4-6F175D3DCCD1}">
-              <a14:hiddenFill xmlns:a14="http://schemas.microsoft.com/office/drawing/2010/main" xmlns="">
+              <a14:hiddenFill xmlns="" xmlns:a14="http://schemas.microsoft.com/office/drawing/2010/main">
                 <a:solidFill>
                   <a:schemeClr val="accent1"/>
                 </a:solidFill>
               </a14:hiddenFill>
             </a:ext>
             <a:ext uri="{91240B29-F687-4f45-9708-019B960494DF}">
-              <a14:hiddenLine xmlns:a14="http://schemas.microsoft.com/office/drawing/2010/main" xmlns="" w="9525">
+              <a14:hiddenLine xmlns="" xmlns:a14="http://schemas.microsoft.com/office/drawing/2010/main" w="9525">
                 <a:solidFill>
                   <a:schemeClr val="tx1"/>
                 </a:solidFill>
@@ -819,7 +819,7 @@
               </a14:hiddenLine>
             </a:ext>
             <a:ext uri="{AF507438-7753-43e0-B8FC-AC1667EBCBE1}">
-              <a14:hiddenEffects xmlns:a14="http://schemas.microsoft.com/office/drawing/2010/main" xmlns="">
+              <a14:hiddenEffects xmlns="" xmlns:a14="http://schemas.microsoft.com/office/drawing/2010/main">
                 <a:effectLst>
                   <a:outerShdw dist="35921" dir="2700000" algn="ctr" rotWithShape="0">
                     <a:schemeClr val="bg2"/>
@@ -898,14 +898,14 @@
           <a:effectLst/>
           <a:extLst>
             <a:ext uri="{909E8E84-426E-40dd-AFC4-6F175D3DCCD1}">
-              <a14:hiddenFill xmlns:a14="http://schemas.microsoft.com/office/drawing/2010/main" xmlns="">
+              <a14:hiddenFill xmlns="" xmlns:a14="http://schemas.microsoft.com/office/drawing/2010/main">
                 <a:solidFill>
                   <a:schemeClr val="accent1"/>
                 </a:solidFill>
               </a14:hiddenFill>
             </a:ext>
             <a:ext uri="{91240B29-F687-4f45-9708-019B960494DF}">
-              <a14:hiddenLine xmlns:a14="http://schemas.microsoft.com/office/drawing/2010/main" xmlns="" w="9525">
+              <a14:hiddenLine xmlns="" xmlns:a14="http://schemas.microsoft.com/office/drawing/2010/main" w="9525">
                 <a:solidFill>
                   <a:schemeClr val="tx1"/>
                 </a:solidFill>
@@ -915,7 +915,7 @@
               </a14:hiddenLine>
             </a:ext>
             <a:ext uri="{AF507438-7753-43e0-B8FC-AC1667EBCBE1}">
-              <a14:hiddenEffects xmlns:a14="http://schemas.microsoft.com/office/drawing/2010/main" xmlns="">
+              <a14:hiddenEffects xmlns="" xmlns:a14="http://schemas.microsoft.com/office/drawing/2010/main">
                 <a:effectLst>
                   <a:outerShdw dist="35921" dir="2700000" algn="ctr" rotWithShape="0">
                     <a:schemeClr val="bg2"/>
@@ -968,14 +968,14 @@
           <a:effectLst/>
           <a:extLst>
             <a:ext uri="{909E8E84-426E-40dd-AFC4-6F175D3DCCD1}">
-              <a14:hiddenFill xmlns:a14="http://schemas.microsoft.com/office/drawing/2010/main" xmlns="">
+              <a14:hiddenFill xmlns="" xmlns:a14="http://schemas.microsoft.com/office/drawing/2010/main">
                 <a:solidFill>
                   <a:schemeClr val="accent1"/>
                 </a:solidFill>
               </a14:hiddenFill>
             </a:ext>
             <a:ext uri="{91240B29-F687-4f45-9708-019B960494DF}">
-              <a14:hiddenLine xmlns:a14="http://schemas.microsoft.com/office/drawing/2010/main" xmlns="" w="9525">
+              <a14:hiddenLine xmlns="" xmlns:a14="http://schemas.microsoft.com/office/drawing/2010/main" w="9525">
                 <a:solidFill>
                   <a:schemeClr val="tx1"/>
                 </a:solidFill>
@@ -985,7 +985,7 @@
               </a14:hiddenLine>
             </a:ext>
             <a:ext uri="{AF507438-7753-43e0-B8FC-AC1667EBCBE1}">
-              <a14:hiddenEffects xmlns:a14="http://schemas.microsoft.com/office/drawing/2010/main" xmlns="">
+              <a14:hiddenEffects xmlns="" xmlns:a14="http://schemas.microsoft.com/office/drawing/2010/main">
                 <a:effectLst>
                   <a:outerShdw dist="35921" dir="2700000" algn="ctr" rotWithShape="0">
                     <a:schemeClr val="bg2"/>
@@ -3507,7 +3507,7 @@
           <p:cNvPr id="82" name="Text Box 263">
             <a:extLst>
               <a:ext uri="{FF2B5EF4-FFF2-40B4-BE49-F238E27FC236}">
-                <a16:creationId xmlns:a16="http://schemas.microsoft.com/office/drawing/2014/main" xmlns="" id="{90F87DD5-6D3C-41E1-B458-BCC75CE85A1E}"/>
+                <a16:creationId xmlns:a16="http://schemas.microsoft.com/office/drawing/2014/main" id="{90F87DD5-6D3C-41E1-B458-BCC75CE85A1E}"/>
               </a:ext>
             </a:extLst>
           </p:cNvPr>
@@ -3518,8 +3518,8 @@
         </p:nvSpPr>
         <p:spPr bwMode="auto">
           <a:xfrm>
-            <a:off x="16067617" y="25967759"/>
-            <a:ext cx="27143163" cy="6341041"/>
+            <a:off x="16002000" y="25462371"/>
+            <a:ext cx="27366383" cy="6718892"/>
           </a:xfrm>
           <a:prstGeom prst="rect">
             <a:avLst/>
@@ -3706,7 +3706,7 @@
           <p:cNvPr id="63" name="Isosceles Triangle 62">
             <a:extLst>
               <a:ext uri="{FF2B5EF4-FFF2-40B4-BE49-F238E27FC236}">
-                <a16:creationId xmlns:a16="http://schemas.microsoft.com/office/drawing/2014/main" xmlns="" id="{3F9C176A-6E97-4DAC-88C4-191DB65B1BBD}"/>
+                <a16:creationId xmlns:a16="http://schemas.microsoft.com/office/drawing/2014/main" id="{3F9C176A-6E97-4DAC-88C4-191DB65B1BBD}"/>
               </a:ext>
             </a:extLst>
           </p:cNvPr>
@@ -3715,8 +3715,8 @@
         </p:nvSpPr>
         <p:spPr bwMode="auto">
           <a:xfrm>
-            <a:off x="9140265" y="5419121"/>
-            <a:ext cx="6927351" cy="16371823"/>
+            <a:off x="9079543" y="4913734"/>
+            <a:ext cx="6922456" cy="14629622"/>
           </a:xfrm>
           <a:prstGeom prst="triangle">
             <a:avLst>
@@ -3739,7 +3739,7 @@
           <a:effectLst/>
           <a:extLst>
             <a:ext uri="{AF507438-7753-43e0-B8FC-AC1667EBCBE1}">
-              <a14:hiddenEffects xmlns:a14="http://schemas.microsoft.com/office/drawing/2010/main" xmlns="">
+              <a14:hiddenEffects xmlns="" xmlns:a14="http://schemas.microsoft.com/office/drawing/2010/main">
                 <a:effectLst>
                   <a:outerShdw dist="35921" dir="2700000" algn="ctr" rotWithShape="0">
                     <a:schemeClr val="bg2"/>
@@ -3797,7 +3797,7 @@
           <p:cNvPr id="65" name="Isosceles Triangle 64">
             <a:extLst>
               <a:ext uri="{FF2B5EF4-FFF2-40B4-BE49-F238E27FC236}">
-                <a16:creationId xmlns:a16="http://schemas.microsoft.com/office/drawing/2014/main" xmlns="" id="{2F961EF3-413C-4E75-B740-62DC15A766C8}"/>
+                <a16:creationId xmlns:a16="http://schemas.microsoft.com/office/drawing/2014/main" id="{2F961EF3-413C-4E75-B740-62DC15A766C8}"/>
               </a:ext>
             </a:extLst>
           </p:cNvPr>
@@ -3806,8 +3806,8 @@
         </p:nvSpPr>
         <p:spPr bwMode="auto">
           <a:xfrm rot="10800000">
-            <a:off x="9155577" y="21808160"/>
-            <a:ext cx="6912040" cy="10500640"/>
+            <a:off x="9079542" y="19542047"/>
+            <a:ext cx="6922458" cy="12639215"/>
           </a:xfrm>
           <a:prstGeom prst="triangle">
             <a:avLst>
@@ -3830,7 +3830,7 @@
           <a:effectLst/>
           <a:extLst>
             <a:ext uri="{AF507438-7753-43e0-B8FC-AC1667EBCBE1}">
-              <a14:hiddenEffects xmlns:a14="http://schemas.microsoft.com/office/drawing/2010/main" xmlns="">
+              <a14:hiddenEffects xmlns="" xmlns:a14="http://schemas.microsoft.com/office/drawing/2010/main">
                 <a:effectLst>
                   <a:outerShdw dist="35921" dir="2700000" algn="ctr" rotWithShape="0">
                     <a:schemeClr val="bg2"/>
@@ -3888,7 +3888,7 @@
           <p:cNvPr id="79" name="Text Box 263">
             <a:extLst>
               <a:ext uri="{FF2B5EF4-FFF2-40B4-BE49-F238E27FC236}">
-                <a16:creationId xmlns:a16="http://schemas.microsoft.com/office/drawing/2014/main" xmlns="" id="{DEEF7061-7B22-4636-B9EF-91C755EEA5D3}"/>
+                <a16:creationId xmlns:a16="http://schemas.microsoft.com/office/drawing/2014/main" id="{DEEF7061-7B22-4636-B9EF-91C755EEA5D3}"/>
               </a:ext>
             </a:extLst>
           </p:cNvPr>
@@ -3899,7 +3899,7 @@
         </p:nvSpPr>
         <p:spPr bwMode="auto">
           <a:xfrm>
-            <a:off x="16034112" y="6094692"/>
+            <a:off x="15968495" y="5589304"/>
             <a:ext cx="27028568" cy="6986412"/>
           </a:xfrm>
           <a:prstGeom prst="rect">
@@ -4039,7 +4039,7 @@
           <p:cNvPr id="78" name="Text Box 263">
             <a:extLst>
               <a:ext uri="{FF2B5EF4-FFF2-40B4-BE49-F238E27FC236}">
-                <a16:creationId xmlns:a16="http://schemas.microsoft.com/office/drawing/2014/main" xmlns="" id="{F8CB70EF-F166-4A7D-B609-3B331F37F8E1}"/>
+                <a16:creationId xmlns:a16="http://schemas.microsoft.com/office/drawing/2014/main" id="{F8CB70EF-F166-4A7D-B609-3B331F37F8E1}"/>
               </a:ext>
             </a:extLst>
           </p:cNvPr>
@@ -4050,7 +4050,7 @@
         </p:nvSpPr>
         <p:spPr bwMode="auto">
           <a:xfrm>
-            <a:off x="15977609" y="13864628"/>
+            <a:off x="15911992" y="13359240"/>
             <a:ext cx="27148037" cy="11334262"/>
           </a:xfrm>
           <a:prstGeom prst="rect">
@@ -4193,7 +4193,7 @@
         </p:nvGrpSpPr>
         <p:grpSpPr>
           <a:xfrm>
-            <a:off x="1218766" y="648602"/>
+            <a:off x="1153149" y="143214"/>
             <a:ext cx="41794578" cy="4610100"/>
             <a:chOff x="1054474" y="495300"/>
             <a:chExt cx="41794578" cy="4610100"/>
@@ -4491,7 +4491,7 @@
         </p:nvSpPr>
         <p:spPr bwMode="auto">
           <a:xfrm>
-            <a:off x="6781800" y="869361"/>
+            <a:off x="6716183" y="363973"/>
             <a:ext cx="30175200" cy="3718814"/>
           </a:xfrm>
           <a:prstGeom prst="rect">
@@ -4504,14 +4504,14 @@
           <a:effectLst/>
           <a:extLst>
             <a:ext uri="{909E8E84-426E-40dd-AFC4-6F175D3DCCD1}">
-              <a14:hiddenFill xmlns:a14="http://schemas.microsoft.com/office/drawing/2010/main" xmlns="">
+              <a14:hiddenFill xmlns="" xmlns:a14="http://schemas.microsoft.com/office/drawing/2010/main">
                 <a:solidFill>
                   <a:srgbClr val="000000"/>
                 </a:solidFill>
               </a14:hiddenFill>
             </a:ext>
             <a:ext uri="{91240B29-F687-4f45-9708-019B960494DF}">
-              <a14:hiddenLine xmlns:a14="http://schemas.microsoft.com/office/drawing/2010/main" xmlns="" w="9525">
+              <a14:hiddenLine xmlns="" xmlns:a14="http://schemas.microsoft.com/office/drawing/2010/main" w="9525">
                 <a:solidFill>
                   <a:schemeClr val="tx1"/>
                 </a:solidFill>
@@ -4521,7 +4521,7 @@
               </a14:hiddenLine>
             </a:ext>
             <a:ext uri="{AF507438-7753-43e0-B8FC-AC1667EBCBE1}">
-              <a14:hiddenEffects xmlns:a14="http://schemas.microsoft.com/office/drawing/2010/main" xmlns="">
+              <a14:hiddenEffects xmlns="" xmlns:a14="http://schemas.microsoft.com/office/drawing/2010/main">
                 <a:effectLst>
                   <a:outerShdw dist="35921" dir="2700000" algn="ctr" rotWithShape="0">
                     <a:srgbClr val="FFBF0B"/>
@@ -4684,7 +4684,7 @@
       </p:sp>
       <p:sp>
         <p:nvSpPr>
-          <p:cNvPr id="41" name="Text Box 248"/>
+          <p:cNvPr id="44" name="Text Box 248"/>
           <p:cNvSpPr txBox="1">
             <a:spLocks noChangeArrowheads="1"/>
           </p:cNvSpPr>
@@ -4692,8 +4692,8 @@
         </p:nvSpPr>
         <p:spPr bwMode="auto">
           <a:xfrm>
-            <a:off x="1218766" y="5477442"/>
-            <a:ext cx="14545752" cy="769441"/>
+            <a:off x="1154517" y="15299575"/>
+            <a:ext cx="7925022" cy="769441"/>
           </a:xfrm>
           <a:prstGeom prst="rect">
             <a:avLst/>
@@ -4824,162 +4824,6 @@
                 <a:ea typeface="SimSun" pitchFamily="2" charset="-122"/>
                 <a:cs typeface="Lucida Sans" pitchFamily="34" charset="0"/>
               </a:rPr>
-              <a:t>Why Sonic Signatures?</a:t>
-            </a:r>
-            <a:endParaRPr lang="en-US" altLang="zh-CN" sz="3200" b="1" dirty="0">
-              <a:solidFill>
-                <a:schemeClr val="bg1"/>
-              </a:solidFill>
-              <a:effectLst/>
-              <a:latin typeface="Lucida Sans" pitchFamily="34" charset="0"/>
-              <a:ea typeface="SimSun" pitchFamily="2" charset="-122"/>
-              <a:cs typeface="Lucida Sans" pitchFamily="34" charset="0"/>
-            </a:endParaRPr>
-          </a:p>
-        </p:txBody>
-      </p:sp>
-      <p:sp>
-        <p:nvSpPr>
-          <p:cNvPr id="44" name="Text Box 248"/>
-          <p:cNvSpPr txBox="1">
-            <a:spLocks noChangeArrowheads="1"/>
-          </p:cNvSpPr>
-          <p:nvPr/>
-        </p:nvSpPr>
-        <p:spPr bwMode="auto">
-          <a:xfrm>
-            <a:off x="1218766" y="15988048"/>
-            <a:ext cx="7894002" cy="769441"/>
-          </a:xfrm>
-          <a:prstGeom prst="rect">
-            <a:avLst/>
-          </a:prstGeom>
-          <a:solidFill>
-            <a:schemeClr val="accent2">
-              <a:lumMod val="50000"/>
-            </a:schemeClr>
-          </a:solidFill>
-          <a:ln w="19050">
-            <a:noFill/>
-            <a:miter lim="800000"/>
-            <a:headEnd/>
-            <a:tailEnd/>
-          </a:ln>
-          <a:effectLst/>
-        </p:spPr>
-        <p:txBody>
-          <a:bodyPr wrap="square">
-            <a:spAutoFit/>
-          </a:bodyPr>
-          <a:lstStyle>
-            <a:lvl1pPr>
-              <a:defRPr sz="2400">
-                <a:solidFill>
-                  <a:schemeClr val="tx1"/>
-                </a:solidFill>
-                <a:latin typeface="Times New Roman" pitchFamily="18" charset="0"/>
-              </a:defRPr>
-            </a:lvl1pPr>
-            <a:lvl2pPr marL="742950" indent="-285750">
-              <a:defRPr sz="2400">
-                <a:solidFill>
-                  <a:schemeClr val="tx1"/>
-                </a:solidFill>
-                <a:latin typeface="Times New Roman" pitchFamily="18" charset="0"/>
-              </a:defRPr>
-            </a:lvl2pPr>
-            <a:lvl3pPr marL="1143000" indent="-228600">
-              <a:defRPr sz="2400">
-                <a:solidFill>
-                  <a:schemeClr val="tx1"/>
-                </a:solidFill>
-                <a:latin typeface="Times New Roman" pitchFamily="18" charset="0"/>
-              </a:defRPr>
-            </a:lvl3pPr>
-            <a:lvl4pPr marL="1600200" indent="-228600">
-              <a:defRPr sz="2400">
-                <a:solidFill>
-                  <a:schemeClr val="tx1"/>
-                </a:solidFill>
-                <a:latin typeface="Times New Roman" pitchFamily="18" charset="0"/>
-              </a:defRPr>
-            </a:lvl4pPr>
-            <a:lvl5pPr marL="2057400" indent="-228600">
-              <a:defRPr sz="2400">
-                <a:solidFill>
-                  <a:schemeClr val="tx1"/>
-                </a:solidFill>
-                <a:latin typeface="Times New Roman" pitchFamily="18" charset="0"/>
-              </a:defRPr>
-            </a:lvl5pPr>
-            <a:lvl6pPr marL="2514600" indent="-228600" eaLnBrk="0" fontAlgn="base" hangingPunct="0">
-              <a:spcBef>
-                <a:spcPct val="0"/>
-              </a:spcBef>
-              <a:spcAft>
-                <a:spcPct val="0"/>
-              </a:spcAft>
-              <a:defRPr sz="2400">
-                <a:solidFill>
-                  <a:schemeClr val="tx1"/>
-                </a:solidFill>
-                <a:latin typeface="Times New Roman" pitchFamily="18" charset="0"/>
-              </a:defRPr>
-            </a:lvl6pPr>
-            <a:lvl7pPr marL="2971800" indent="-228600" eaLnBrk="0" fontAlgn="base" hangingPunct="0">
-              <a:spcBef>
-                <a:spcPct val="0"/>
-              </a:spcBef>
-              <a:spcAft>
-                <a:spcPct val="0"/>
-              </a:spcAft>
-              <a:defRPr sz="2400">
-                <a:solidFill>
-                  <a:schemeClr val="tx1"/>
-                </a:solidFill>
-                <a:latin typeface="Times New Roman" pitchFamily="18" charset="0"/>
-              </a:defRPr>
-            </a:lvl7pPr>
-            <a:lvl8pPr marL="3429000" indent="-228600" eaLnBrk="0" fontAlgn="base" hangingPunct="0">
-              <a:spcBef>
-                <a:spcPct val="0"/>
-              </a:spcBef>
-              <a:spcAft>
-                <a:spcPct val="0"/>
-              </a:spcAft>
-              <a:defRPr sz="2400">
-                <a:solidFill>
-                  <a:schemeClr val="tx1"/>
-                </a:solidFill>
-                <a:latin typeface="Times New Roman" pitchFamily="18" charset="0"/>
-              </a:defRPr>
-            </a:lvl8pPr>
-            <a:lvl9pPr marL="3886200" indent="-228600" eaLnBrk="0" fontAlgn="base" hangingPunct="0">
-              <a:spcBef>
-                <a:spcPct val="0"/>
-              </a:spcBef>
-              <a:spcAft>
-                <a:spcPct val="0"/>
-              </a:spcAft>
-              <a:defRPr sz="2400">
-                <a:solidFill>
-                  <a:schemeClr val="tx1"/>
-                </a:solidFill>
-                <a:latin typeface="Times New Roman" pitchFamily="18" charset="0"/>
-              </a:defRPr>
-            </a:lvl9pPr>
-          </a:lstStyle>
-          <a:p>
-            <a:r>
-              <a:rPr lang="en-US" altLang="zh-CN" sz="4400" b="1" dirty="0">
-                <a:solidFill>
-                  <a:schemeClr val="bg1"/>
-                </a:solidFill>
-                <a:effectLst/>
-                <a:latin typeface="Lucida Sans" pitchFamily="34" charset="0"/>
-                <a:ea typeface="SimSun" pitchFamily="2" charset="-122"/>
-                <a:cs typeface="Lucida Sans" pitchFamily="34" charset="0"/>
-              </a:rPr>
               <a:t>Depicting Features</a:t>
             </a:r>
             <a:endParaRPr lang="en-US" altLang="zh-CN" sz="3200" b="1" dirty="0">
@@ -5004,7 +4848,7 @@
         </p:nvSpPr>
         <p:spPr bwMode="auto">
           <a:xfrm>
-            <a:off x="16030880" y="6246883"/>
+            <a:off x="15965263" y="5741495"/>
             <a:ext cx="12311440" cy="6740307"/>
           </a:xfrm>
           <a:prstGeom prst="rect">
@@ -5170,7 +5014,7 @@
                 <a:effectLst/>
                 <a:ea typeface="SimSun" pitchFamily="2" charset="-122"/>
               </a:rPr>
-              <a:t>The </a:t>
+              <a:t>We performed </a:t>
             </a:r>
             <a:r>
               <a:rPr lang="en-US" altLang="zh-CN" sz="2800" b="1" dirty="0">
@@ -5184,7 +5028,7 @@
                 <a:effectLst/>
                 <a:ea typeface="SimSun" pitchFamily="2" charset="-122"/>
               </a:rPr>
-              <a:t>Bayes classification was performed through first filtering out any character classified as “other” before re-classifying the remaining characters as antagonists, protagonists, or. Fools</a:t>
+              <a:t>Bayes classification by first filtering out any character classified as “other” before re-classifying the remaining characters as antagonists, protagonists, or fools.</a:t>
             </a:r>
           </a:p>
           <a:p>
@@ -5209,7 +5053,7 @@
                 <a:effectLst/>
                 <a:ea typeface="SimSun" pitchFamily="2" charset="-122"/>
               </a:rPr>
-              <a:t> Highest success was achieved when training data was weighted by number of speaking lines, and role determination was done iteratively. The classification results for gender are comparable to previous results based on text analysis, and </a:t>
+              <a:t> We achieved highest success when training data was weighted by number of speaking lines, and role determination was done iteratively. The classification results for gender are comparable to previous results based on text analysis, and </a:t>
             </a:r>
           </a:p>
           <a:p>
@@ -5223,7 +5067,21 @@
                 <a:effectLst/>
                 <a:ea typeface="SimSun" pitchFamily="2" charset="-122"/>
               </a:rPr>
-              <a:t>the role classification was particularly successful at filtering out “other” characters and identifying protagonists.</a:t>
+              <a:t>the role classification was particularly successful at filtering out “other”</a:t>
+            </a:r>
+          </a:p>
+          <a:p>
+            <a:pPr>
+              <a:lnSpc>
+                <a:spcPct val="125000"/>
+              </a:lnSpc>
+            </a:pPr>
+            <a:r>
+              <a:rPr lang="en-US" altLang="zh-CN" sz="2800" dirty="0">
+                <a:effectLst/>
+                <a:ea typeface="SimSun" pitchFamily="2" charset="-122"/>
+              </a:rPr>
+              <a:t>characters and identifying protagonists.</a:t>
             </a:r>
           </a:p>
         </p:txBody>
@@ -5238,7 +5096,7 @@
         </p:nvSpPr>
         <p:spPr bwMode="auto">
           <a:xfrm>
-            <a:off x="16034959" y="5419121"/>
+            <a:off x="15969342" y="4913733"/>
             <a:ext cx="26978385" cy="769441"/>
           </a:xfrm>
           <a:prstGeom prst="rect">
@@ -5404,7 +5262,7 @@
         </p:nvSpPr>
         <p:spPr bwMode="auto">
           <a:xfrm>
-            <a:off x="16036262" y="13095187"/>
+            <a:off x="15970645" y="12589799"/>
             <a:ext cx="27174519" cy="769441"/>
           </a:xfrm>
           <a:prstGeom prst="rect">
@@ -5570,7 +5428,7 @@
         </p:nvSpPr>
         <p:spPr bwMode="auto">
           <a:xfrm>
-            <a:off x="16020419" y="25194054"/>
+            <a:off x="15954802" y="24688666"/>
             <a:ext cx="26669141" cy="774848"/>
           </a:xfrm>
           <a:prstGeom prst="rect">
@@ -5728,162 +5586,6 @@
       </p:sp>
       <p:sp>
         <p:nvSpPr>
-          <p:cNvPr id="71" name="Text Box 248"/>
-          <p:cNvSpPr txBox="1">
-            <a:spLocks noChangeArrowheads="1"/>
-          </p:cNvSpPr>
-          <p:nvPr/>
-        </p:nvSpPr>
-        <p:spPr bwMode="auto">
-          <a:xfrm>
-            <a:off x="1231092" y="10507605"/>
-            <a:ext cx="14568103" cy="769441"/>
-          </a:xfrm>
-          <a:prstGeom prst="rect">
-            <a:avLst/>
-          </a:prstGeom>
-          <a:solidFill>
-            <a:schemeClr val="accent2">
-              <a:lumMod val="50000"/>
-            </a:schemeClr>
-          </a:solidFill>
-          <a:ln w="19050">
-            <a:noFill/>
-            <a:miter lim="800000"/>
-            <a:headEnd/>
-            <a:tailEnd/>
-          </a:ln>
-          <a:effectLst/>
-        </p:spPr>
-        <p:txBody>
-          <a:bodyPr wrap="square">
-            <a:spAutoFit/>
-          </a:bodyPr>
-          <a:lstStyle>
-            <a:lvl1pPr>
-              <a:defRPr sz="2400">
-                <a:solidFill>
-                  <a:schemeClr val="tx1"/>
-                </a:solidFill>
-                <a:latin typeface="Times New Roman" pitchFamily="18" charset="0"/>
-              </a:defRPr>
-            </a:lvl1pPr>
-            <a:lvl2pPr marL="742950" indent="-285750">
-              <a:defRPr sz="2400">
-                <a:solidFill>
-                  <a:schemeClr val="tx1"/>
-                </a:solidFill>
-                <a:latin typeface="Times New Roman" pitchFamily="18" charset="0"/>
-              </a:defRPr>
-            </a:lvl2pPr>
-            <a:lvl3pPr marL="1143000" indent="-228600">
-              <a:defRPr sz="2400">
-                <a:solidFill>
-                  <a:schemeClr val="tx1"/>
-                </a:solidFill>
-                <a:latin typeface="Times New Roman" pitchFamily="18" charset="0"/>
-              </a:defRPr>
-            </a:lvl3pPr>
-            <a:lvl4pPr marL="1600200" indent="-228600">
-              <a:defRPr sz="2400">
-                <a:solidFill>
-                  <a:schemeClr val="tx1"/>
-                </a:solidFill>
-                <a:latin typeface="Times New Roman" pitchFamily="18" charset="0"/>
-              </a:defRPr>
-            </a:lvl4pPr>
-            <a:lvl5pPr marL="2057400" indent="-228600">
-              <a:defRPr sz="2400">
-                <a:solidFill>
-                  <a:schemeClr val="tx1"/>
-                </a:solidFill>
-                <a:latin typeface="Times New Roman" pitchFamily="18" charset="0"/>
-              </a:defRPr>
-            </a:lvl5pPr>
-            <a:lvl6pPr marL="2514600" indent="-228600" eaLnBrk="0" fontAlgn="base" hangingPunct="0">
-              <a:spcBef>
-                <a:spcPct val="0"/>
-              </a:spcBef>
-              <a:spcAft>
-                <a:spcPct val="0"/>
-              </a:spcAft>
-              <a:defRPr sz="2400">
-                <a:solidFill>
-                  <a:schemeClr val="tx1"/>
-                </a:solidFill>
-                <a:latin typeface="Times New Roman" pitchFamily="18" charset="0"/>
-              </a:defRPr>
-            </a:lvl6pPr>
-            <a:lvl7pPr marL="2971800" indent="-228600" eaLnBrk="0" fontAlgn="base" hangingPunct="0">
-              <a:spcBef>
-                <a:spcPct val="0"/>
-              </a:spcBef>
-              <a:spcAft>
-                <a:spcPct val="0"/>
-              </a:spcAft>
-              <a:defRPr sz="2400">
-                <a:solidFill>
-                  <a:schemeClr val="tx1"/>
-                </a:solidFill>
-                <a:latin typeface="Times New Roman" pitchFamily="18" charset="0"/>
-              </a:defRPr>
-            </a:lvl7pPr>
-            <a:lvl8pPr marL="3429000" indent="-228600" eaLnBrk="0" fontAlgn="base" hangingPunct="0">
-              <a:spcBef>
-                <a:spcPct val="0"/>
-              </a:spcBef>
-              <a:spcAft>
-                <a:spcPct val="0"/>
-              </a:spcAft>
-              <a:defRPr sz="2400">
-                <a:solidFill>
-                  <a:schemeClr val="tx1"/>
-                </a:solidFill>
-                <a:latin typeface="Times New Roman" pitchFamily="18" charset="0"/>
-              </a:defRPr>
-            </a:lvl8pPr>
-            <a:lvl9pPr marL="3886200" indent="-228600" eaLnBrk="0" fontAlgn="base" hangingPunct="0">
-              <a:spcBef>
-                <a:spcPct val="0"/>
-              </a:spcBef>
-              <a:spcAft>
-                <a:spcPct val="0"/>
-              </a:spcAft>
-              <a:defRPr sz="2400">
-                <a:solidFill>
-                  <a:schemeClr val="tx1"/>
-                </a:solidFill>
-                <a:latin typeface="Times New Roman" pitchFamily="18" charset="0"/>
-              </a:defRPr>
-            </a:lvl9pPr>
-          </a:lstStyle>
-          <a:p>
-            <a:r>
-              <a:rPr lang="en-US" altLang="zh-CN" sz="4400" b="1" dirty="0">
-                <a:solidFill>
-                  <a:schemeClr val="bg1"/>
-                </a:solidFill>
-                <a:effectLst/>
-                <a:latin typeface="Lucida Sans" pitchFamily="34" charset="0"/>
-                <a:ea typeface="SimSun" pitchFamily="2" charset="-122"/>
-                <a:cs typeface="Lucida Sans" pitchFamily="34" charset="0"/>
-              </a:rPr>
-              <a:t>Quantifying “How Characters Sound”</a:t>
-            </a:r>
-            <a:endParaRPr lang="en-US" altLang="zh-CN" sz="3200" b="1" dirty="0">
-              <a:solidFill>
-                <a:schemeClr val="bg1"/>
-              </a:solidFill>
-              <a:effectLst/>
-              <a:latin typeface="Lucida Sans" pitchFamily="34" charset="0"/>
-              <a:ea typeface="SimSun" pitchFamily="2" charset="-122"/>
-              <a:cs typeface="Lucida Sans" pitchFamily="34" charset="0"/>
-            </a:endParaRPr>
-          </a:p>
-        </p:txBody>
-      </p:sp>
-      <p:sp>
-        <p:nvSpPr>
           <p:cNvPr id="80" name="Text Box 263"/>
           <p:cNvSpPr txBox="1">
             <a:spLocks noChangeArrowheads="1"/>
@@ -5892,8 +5594,8 @@
         </p:nvSpPr>
         <p:spPr bwMode="auto">
           <a:xfrm>
-            <a:off x="16029813" y="13864628"/>
-            <a:ext cx="11859387" cy="5124480"/>
+            <a:off x="15964196" y="13359240"/>
+            <a:ext cx="11859387" cy="10510570"/>
           </a:xfrm>
           <a:prstGeom prst="rect">
             <a:avLst/>
@@ -6088,9 +5790,7 @@
             <a:r>
               <a:rPr lang="en-AU" sz="2800" dirty="0">
                 <a:solidFill>
-                  <a:schemeClr val="accent2">
-                    <a:lumMod val="50000"/>
-                  </a:schemeClr>
+                  <a:srgbClr val="7030A0"/>
                 </a:solidFill>
                 <a:effectLst/>
               </a:rPr>
@@ -6215,6 +5915,76 @@
                 <a:effectLst/>
               </a:rPr>
               <a:t> for a role.</a:t>
+            </a:r>
+          </a:p>
+          <a:p>
+            <a:pPr>
+              <a:lnSpc>
+                <a:spcPct val="125000"/>
+              </a:lnSpc>
+            </a:pPr>
+            <a:endParaRPr lang="en-AU" sz="2800" dirty="0">
+              <a:effectLst/>
+            </a:endParaRPr>
+          </a:p>
+          <a:p>
+            <a:pPr>
+              <a:lnSpc>
+                <a:spcPct val="125000"/>
+              </a:lnSpc>
+            </a:pPr>
+            <a:r>
+              <a:rPr lang="en-AU" sz="2800" dirty="0">
+                <a:effectLst/>
+              </a:rPr>
+              <a:t>The central line in each chart represents an abstracted mean value for the given characteristic among all roles. The </a:t>
+            </a:r>
+            <a:r>
+              <a:rPr lang="en-AU" sz="2800" b="1" dirty="0">
+                <a:effectLst/>
+              </a:rPr>
+              <a:t>distance between this central axis and the end of a bar </a:t>
+            </a:r>
+            <a:r>
+              <a:rPr lang="en-AU" sz="2800" dirty="0">
+                <a:effectLst/>
+              </a:rPr>
+              <a:t>scales with the </a:t>
+            </a:r>
+            <a:r>
+              <a:rPr lang="en-AU" sz="2800" b="1" dirty="0">
+                <a:effectLst/>
+              </a:rPr>
+              <a:t>number of standard deviations from the mean </a:t>
+            </a:r>
+            <a:r>
+              <a:rPr lang="en-AU" sz="2800" dirty="0">
+                <a:effectLst/>
+              </a:rPr>
+              <a:t>exhibited by a specific role, on average, or a specific character. The left edge corresponds to two or more standard deviations below the mean, and the right edge to two or more standard deviations above the mean.</a:t>
+            </a:r>
+          </a:p>
+          <a:p>
+            <a:pPr>
+              <a:lnSpc>
+                <a:spcPct val="125000"/>
+              </a:lnSpc>
+            </a:pPr>
+            <a:endParaRPr lang="en-AU" sz="2800" dirty="0">
+              <a:effectLst/>
+            </a:endParaRPr>
+          </a:p>
+          <a:p>
+            <a:pPr>
+              <a:lnSpc>
+                <a:spcPct val="125000"/>
+              </a:lnSpc>
+            </a:pPr>
+            <a:r>
+              <a:rPr lang="en-AU" sz="2800" dirty="0">
+                <a:effectLst/>
+              </a:rPr>
+              <a:t>This tool allows us to explore how far any given character’s sonic signature deviates from the  role averages for protagonists, antagonists, and fools.</a:t>
             </a:r>
           </a:p>
         </p:txBody>
@@ -6223,14 +5993,16 @@
         <p:nvCxnSpPr>
           <p:cNvPr id="11" name="Straight Connector 10"/>
           <p:cNvCxnSpPr>
+            <a:cxnSpLocks/>
             <a:stCxn id="65" idx="4"/>
+            <a:endCxn id="65" idx="0"/>
           </p:cNvCxnSpPr>
           <p:nvPr/>
         </p:nvCxnSpPr>
         <p:spPr bwMode="auto">
           <a:xfrm>
-            <a:off x="9155577" y="21808160"/>
-            <a:ext cx="6923494" cy="10500640"/>
+            <a:off x="9079542" y="19542047"/>
+            <a:ext cx="6922458" cy="12639215"/>
           </a:xfrm>
           <a:prstGeom prst="line">
             <a:avLst/>
@@ -6252,7 +6024,7 @@
           <a:effectLst/>
           <a:extLst>
             <a:ext uri="{AF507438-7753-43e0-B8FC-AC1667EBCBE1}">
-              <a14:hiddenEffects xmlns:a14="http://schemas.microsoft.com/office/drawing/2010/main" xmlns="">
+              <a14:hiddenEffects xmlns="" xmlns:a14="http://schemas.microsoft.com/office/drawing/2010/main">
                 <a:effectLst>
                   <a:outerShdw dist="35921" dir="2700000" algn="ctr" rotWithShape="0">
                     <a:schemeClr val="bg2"/>
@@ -6273,8 +6045,8 @@
         </p:nvSpPr>
         <p:spPr bwMode="auto">
           <a:xfrm>
-            <a:off x="16025127" y="26064011"/>
-            <a:ext cx="11098441" cy="5878532"/>
+            <a:off x="16013454" y="25462369"/>
+            <a:ext cx="11189712" cy="6309420"/>
           </a:xfrm>
           <a:prstGeom prst="rect">
             <a:avLst/>
@@ -6401,28 +6173,10 @@
               <a:rPr lang="en-US" sz="2800" dirty="0">
                 <a:effectLst/>
               </a:rPr>
-              <a:t>Stanley Newman, in his experiments in Sound Symbolism, scaled vowels from bright to dark in how subjects perceived them. “IH” as in “Lit” sounded brightest, </a:t>
-            </a:r>
-            <a:r>
-              <a:rPr lang="en-US" dirty="0">
-                <a:effectLst/>
-              </a:rPr>
-              <a:t>while “UH </a:t>
-            </a:r>
-            <a:r>
-              <a:rPr lang="en-US" sz="2800" dirty="0">
-                <a:effectLst/>
-              </a:rPr>
-              <a:t>” as in “Put” sounded darkest and biggest. </a:t>
-            </a:r>
-          </a:p>
-          <a:p>
-            <a:r>
-              <a:rPr lang="en-US" sz="2800" dirty="0">
-                <a:effectLst/>
-              </a:rPr>
-              <a:t/>
-            </a:r>
+              <a:t>Stanley Newman, in his experiments in Sound Symbolism, scaled vowels from bright to dark in how subjects perceived them. “IH” as in “Lit” sounded brightest and smallest, while “UH ” as in “Put” sounded darkest and biggest. </a:t>
+            </a:r>
+          </a:p>
+          <a:p>
             <a:br>
               <a:rPr lang="en-US" sz="2800" dirty="0">
                 <a:effectLst/>
@@ -6432,7 +6186,7 @@
               <a:rPr lang="en-US" sz="2800" dirty="0">
                 <a:effectLst/>
               </a:rPr>
-              <a:t>We wanted to examine </a:t>
+              <a:t>We wanted to create a visualization to examine </a:t>
             </a:r>
             <a:r>
               <a:rPr lang="en-US" sz="2800" b="1" dirty="0">
@@ -6486,11 +6240,13 @@
               <a:rPr lang="en-US" sz="2800" dirty="0">
                 <a:effectLst/>
               </a:rPr>
-              <a:t>This tool allows us to see at a glance that certain characters do, indeed, have “brighter” or “darker” overall characterization to their speech.</a:t>
-            </a:r>
-            <a:r>
-              <a:rPr lang="en-US" sz="2800" dirty="0"/>
-              <a:t/>
+              <a:t>This tool allows us to see at a glance that certain characters do, indeed, have </a:t>
+            </a:r>
+            <a:r>
+              <a:rPr lang="en-US" sz="2800" b="1" dirty="0">
+                <a:effectLst/>
+              </a:rPr>
+              <a:t>“brighter” or “darker” overall characterization to their speech.</a:t>
             </a:r>
             <a:br>
               <a:rPr lang="en-US" sz="2800" dirty="0"/>
@@ -6501,387 +6257,15 @@
           </a:p>
         </p:txBody>
       </p:sp>
-      <p:sp>
-        <p:nvSpPr>
-          <p:cNvPr id="96" name="Text Box 248"/>
-          <p:cNvSpPr txBox="1">
-            <a:spLocks noChangeArrowheads="1"/>
-          </p:cNvSpPr>
-          <p:nvPr/>
-        </p:nvSpPr>
-        <p:spPr bwMode="auto">
-          <a:xfrm>
-            <a:off x="1227557" y="25843212"/>
-            <a:ext cx="14606202" cy="769014"/>
-          </a:xfrm>
-          <a:prstGeom prst="rect">
-            <a:avLst/>
-          </a:prstGeom>
-          <a:solidFill>
-            <a:schemeClr val="accent2">
-              <a:lumMod val="50000"/>
-            </a:schemeClr>
-          </a:solidFill>
-          <a:ln w="19050">
-            <a:noFill/>
-            <a:miter lim="800000"/>
-            <a:headEnd/>
-            <a:tailEnd/>
-          </a:ln>
-          <a:effectLst/>
-        </p:spPr>
-        <p:txBody>
-          <a:bodyPr wrap="square">
-            <a:spAutoFit/>
-          </a:bodyPr>
-          <a:lstStyle>
-            <a:lvl1pPr>
-              <a:defRPr sz="2400">
-                <a:solidFill>
-                  <a:schemeClr val="tx1"/>
-                </a:solidFill>
-                <a:latin typeface="Times New Roman" pitchFamily="18" charset="0"/>
-              </a:defRPr>
-            </a:lvl1pPr>
-            <a:lvl2pPr marL="742950" indent="-285750">
-              <a:defRPr sz="2400">
-                <a:solidFill>
-                  <a:schemeClr val="tx1"/>
-                </a:solidFill>
-                <a:latin typeface="Times New Roman" pitchFamily="18" charset="0"/>
-              </a:defRPr>
-            </a:lvl2pPr>
-            <a:lvl3pPr marL="1143000" indent="-228600">
-              <a:defRPr sz="2400">
-                <a:solidFill>
-                  <a:schemeClr val="tx1"/>
-                </a:solidFill>
-                <a:latin typeface="Times New Roman" pitchFamily="18" charset="0"/>
-              </a:defRPr>
-            </a:lvl3pPr>
-            <a:lvl4pPr marL="1600200" indent="-228600">
-              <a:defRPr sz="2400">
-                <a:solidFill>
-                  <a:schemeClr val="tx1"/>
-                </a:solidFill>
-                <a:latin typeface="Times New Roman" pitchFamily="18" charset="0"/>
-              </a:defRPr>
-            </a:lvl4pPr>
-            <a:lvl5pPr marL="2057400" indent="-228600">
-              <a:defRPr sz="2400">
-                <a:solidFill>
-                  <a:schemeClr val="tx1"/>
-                </a:solidFill>
-                <a:latin typeface="Times New Roman" pitchFamily="18" charset="0"/>
-              </a:defRPr>
-            </a:lvl5pPr>
-            <a:lvl6pPr marL="2514600" indent="-228600" eaLnBrk="0" fontAlgn="base" hangingPunct="0">
-              <a:spcBef>
-                <a:spcPct val="0"/>
-              </a:spcBef>
-              <a:spcAft>
-                <a:spcPct val="0"/>
-              </a:spcAft>
-              <a:defRPr sz="2400">
-                <a:solidFill>
-                  <a:schemeClr val="tx1"/>
-                </a:solidFill>
-                <a:latin typeface="Times New Roman" pitchFamily="18" charset="0"/>
-              </a:defRPr>
-            </a:lvl6pPr>
-            <a:lvl7pPr marL="2971800" indent="-228600" eaLnBrk="0" fontAlgn="base" hangingPunct="0">
-              <a:spcBef>
-                <a:spcPct val="0"/>
-              </a:spcBef>
-              <a:spcAft>
-                <a:spcPct val="0"/>
-              </a:spcAft>
-              <a:defRPr sz="2400">
-                <a:solidFill>
-                  <a:schemeClr val="tx1"/>
-                </a:solidFill>
-                <a:latin typeface="Times New Roman" pitchFamily="18" charset="0"/>
-              </a:defRPr>
-            </a:lvl7pPr>
-            <a:lvl8pPr marL="3429000" indent="-228600" eaLnBrk="0" fontAlgn="base" hangingPunct="0">
-              <a:spcBef>
-                <a:spcPct val="0"/>
-              </a:spcBef>
-              <a:spcAft>
-                <a:spcPct val="0"/>
-              </a:spcAft>
-              <a:defRPr sz="2400">
-                <a:solidFill>
-                  <a:schemeClr val="tx1"/>
-                </a:solidFill>
-                <a:latin typeface="Times New Roman" pitchFamily="18" charset="0"/>
-              </a:defRPr>
-            </a:lvl8pPr>
-            <a:lvl9pPr marL="3886200" indent="-228600" eaLnBrk="0" fontAlgn="base" hangingPunct="0">
-              <a:spcBef>
-                <a:spcPct val="0"/>
-              </a:spcBef>
-              <a:spcAft>
-                <a:spcPct val="0"/>
-              </a:spcAft>
-              <a:defRPr sz="2400">
-                <a:solidFill>
-                  <a:schemeClr val="tx1"/>
-                </a:solidFill>
-                <a:latin typeface="Times New Roman" pitchFamily="18" charset="0"/>
-              </a:defRPr>
-            </a:lvl9pPr>
-          </a:lstStyle>
-          <a:p>
-            <a:r>
-              <a:rPr lang="en-US" altLang="zh-CN" sz="4400" b="1" dirty="0">
-                <a:solidFill>
-                  <a:schemeClr val="bg1"/>
-                </a:solidFill>
-                <a:effectLst/>
-                <a:latin typeface="Lucida Sans" pitchFamily="34" charset="0"/>
-                <a:ea typeface="SimSun" pitchFamily="2" charset="-122"/>
-                <a:cs typeface="Lucida Sans" pitchFamily="34" charset="0"/>
-              </a:rPr>
-              <a:t>What Next?</a:t>
-            </a:r>
-          </a:p>
-        </p:txBody>
-      </p:sp>
-      <p:sp>
-        <p:nvSpPr>
-          <p:cNvPr id="45" name="Text Box 263"/>
-          <p:cNvSpPr txBox="1">
-            <a:spLocks noChangeArrowheads="1"/>
-          </p:cNvSpPr>
-          <p:nvPr/>
-        </p:nvSpPr>
-        <p:spPr bwMode="auto">
-          <a:xfrm>
-            <a:off x="1226969" y="26612227"/>
-            <a:ext cx="14606790" cy="2766483"/>
-          </a:xfrm>
-          <a:prstGeom prst="rect">
-            <a:avLst/>
-          </a:prstGeom>
-          <a:solidFill>
-            <a:schemeClr val="bg1"/>
-          </a:solidFill>
-          <a:ln w="57150" cmpd="thinThick">
-            <a:noFill/>
-            <a:miter lim="800000"/>
-            <a:headEnd/>
-            <a:tailEnd/>
-          </a:ln>
-          <a:effectLst/>
-          <a:extLst/>
-        </p:spPr>
-        <p:txBody>
-          <a:bodyPr wrap="square" lIns="182880" tIns="91440" rIns="182880" bIns="182880" numCol="2">
-            <a:noAutofit/>
-          </a:bodyPr>
-          <a:lstStyle>
-            <a:lvl1pPr>
-              <a:defRPr sz="2400">
-                <a:solidFill>
-                  <a:schemeClr val="tx1"/>
-                </a:solidFill>
-                <a:latin typeface="Times New Roman" pitchFamily="18" charset="0"/>
-              </a:defRPr>
-            </a:lvl1pPr>
-            <a:lvl2pPr marL="685800" indent="-228600">
-              <a:defRPr sz="2400">
-                <a:solidFill>
-                  <a:schemeClr val="tx1"/>
-                </a:solidFill>
-                <a:latin typeface="Times New Roman" pitchFamily="18" charset="0"/>
-              </a:defRPr>
-            </a:lvl2pPr>
-            <a:lvl3pPr marL="1143000" indent="-228600">
-              <a:defRPr sz="2400">
-                <a:solidFill>
-                  <a:schemeClr val="tx1"/>
-                </a:solidFill>
-                <a:latin typeface="Times New Roman" pitchFamily="18" charset="0"/>
-              </a:defRPr>
-            </a:lvl3pPr>
-            <a:lvl4pPr marL="1600200" indent="-228600">
-              <a:defRPr sz="2400">
-                <a:solidFill>
-                  <a:schemeClr val="tx1"/>
-                </a:solidFill>
-                <a:latin typeface="Times New Roman" pitchFamily="18" charset="0"/>
-              </a:defRPr>
-            </a:lvl4pPr>
-            <a:lvl5pPr marL="2057400" indent="-228600">
-              <a:defRPr sz="2400">
-                <a:solidFill>
-                  <a:schemeClr val="tx1"/>
-                </a:solidFill>
-                <a:latin typeface="Times New Roman" pitchFamily="18" charset="0"/>
-              </a:defRPr>
-            </a:lvl5pPr>
-            <a:lvl6pPr marL="2514600" indent="-228600" eaLnBrk="0" fontAlgn="base" hangingPunct="0">
-              <a:spcBef>
-                <a:spcPct val="0"/>
-              </a:spcBef>
-              <a:spcAft>
-                <a:spcPct val="0"/>
-              </a:spcAft>
-              <a:defRPr sz="2400">
-                <a:solidFill>
-                  <a:schemeClr val="tx1"/>
-                </a:solidFill>
-                <a:latin typeface="Times New Roman" pitchFamily="18" charset="0"/>
-              </a:defRPr>
-            </a:lvl6pPr>
-            <a:lvl7pPr marL="2971800" indent="-228600" eaLnBrk="0" fontAlgn="base" hangingPunct="0">
-              <a:spcBef>
-                <a:spcPct val="0"/>
-              </a:spcBef>
-              <a:spcAft>
-                <a:spcPct val="0"/>
-              </a:spcAft>
-              <a:defRPr sz="2400">
-                <a:solidFill>
-                  <a:schemeClr val="tx1"/>
-                </a:solidFill>
-                <a:latin typeface="Times New Roman" pitchFamily="18" charset="0"/>
-              </a:defRPr>
-            </a:lvl7pPr>
-            <a:lvl8pPr marL="3429000" indent="-228600" eaLnBrk="0" fontAlgn="base" hangingPunct="0">
-              <a:spcBef>
-                <a:spcPct val="0"/>
-              </a:spcBef>
-              <a:spcAft>
-                <a:spcPct val="0"/>
-              </a:spcAft>
-              <a:defRPr sz="2400">
-                <a:solidFill>
-                  <a:schemeClr val="tx1"/>
-                </a:solidFill>
-                <a:latin typeface="Times New Roman" pitchFamily="18" charset="0"/>
-              </a:defRPr>
-            </a:lvl8pPr>
-            <a:lvl9pPr marL="3886200" indent="-228600" eaLnBrk="0" fontAlgn="base" hangingPunct="0">
-              <a:spcBef>
-                <a:spcPct val="0"/>
-              </a:spcBef>
-              <a:spcAft>
-                <a:spcPct val="0"/>
-              </a:spcAft>
-              <a:defRPr sz="2400">
-                <a:solidFill>
-                  <a:schemeClr val="tx1"/>
-                </a:solidFill>
-                <a:latin typeface="Times New Roman" pitchFamily="18" charset="0"/>
-              </a:defRPr>
-            </a:lvl9pPr>
-          </a:lstStyle>
-          <a:p>
-            <a:pPr>
-              <a:lnSpc>
-                <a:spcPct val="125000"/>
-              </a:lnSpc>
-            </a:pPr>
-            <a:r>
-              <a:rPr lang="en-AU" sz="2000" b="1" dirty="0">
-                <a:effectLst/>
-              </a:rPr>
-              <a:t>Beyond Shakespeare: </a:t>
-            </a:r>
-          </a:p>
-          <a:p>
-            <a:pPr>
-              <a:lnSpc>
-                <a:spcPct val="125000"/>
-              </a:lnSpc>
-            </a:pPr>
-            <a:r>
-              <a:rPr lang="en-AU" sz="2000" dirty="0">
-                <a:effectLst/>
-              </a:rPr>
-              <a:t>Expand our analysis to other authors, not limited to playwrights </a:t>
-            </a:r>
-          </a:p>
-          <a:p>
-            <a:pPr>
-              <a:lnSpc>
-                <a:spcPct val="125000"/>
-              </a:lnSpc>
-            </a:pPr>
-            <a:r>
-              <a:rPr lang="en-AU" sz="2000" dirty="0">
-                <a:effectLst/>
-              </a:rPr>
-              <a:t>or anglophones, with a particular interest in the role of verse and prose. </a:t>
-            </a:r>
-            <a:r>
-              <a:rPr lang="en-AU" sz="2000" b="1" dirty="0">
-                <a:effectLst/>
-              </a:rPr>
-              <a:t>Does the significance of sonic signatures change across form and language?</a:t>
-            </a:r>
-          </a:p>
-          <a:p>
-            <a:pPr>
-              <a:lnSpc>
-                <a:spcPct val="125000"/>
-              </a:lnSpc>
-            </a:pPr>
-            <a:endParaRPr lang="en-AU" sz="2000" b="1" dirty="0">
-              <a:effectLst/>
-            </a:endParaRPr>
-          </a:p>
-          <a:p>
-            <a:pPr>
-              <a:lnSpc>
-                <a:spcPct val="125000"/>
-              </a:lnSpc>
-            </a:pPr>
-            <a:r>
-              <a:rPr lang="en-AU" sz="2000" b="1" dirty="0">
-                <a:effectLst/>
-              </a:rPr>
-              <a:t>Word Choice Covariance:</a:t>
-            </a:r>
-            <a:r>
-              <a:rPr lang="en-AU" sz="2000" dirty="0">
-                <a:effectLst/>
-              </a:rPr>
-              <a:t> </a:t>
-            </a:r>
-          </a:p>
-          <a:p>
-            <a:pPr>
-              <a:lnSpc>
-                <a:spcPct val="125000"/>
-              </a:lnSpc>
-            </a:pPr>
-            <a:r>
-              <a:rPr lang="en-AU" sz="2000" dirty="0">
-                <a:effectLst/>
-              </a:rPr>
-              <a:t>Previous work has shown that word-based analysis yields promising categorization results, so do sonic signatures provide unique features, or merely reflect the same information as the words they comprise? </a:t>
-            </a:r>
-            <a:r>
-              <a:rPr lang="en-AU" sz="2000" b="1" dirty="0">
-                <a:effectLst/>
-              </a:rPr>
-              <a:t>To what degree are sonic signatures covariant with word choice in determining classification?</a:t>
-            </a:r>
-          </a:p>
-        </p:txBody>
-      </p:sp>
       <p:pic>
         <p:nvPicPr>
-          <p:cNvPr id="6" name="Picture 5"/>
+          <p:cNvPr id="7" name="Picture 6"/>
           <p:cNvPicPr>
             <a:picLocks noChangeAspect="1"/>
           </p:cNvPicPr>
           <p:nvPr/>
         </p:nvPicPr>
-        <p:blipFill>
+        <p:blipFill rotWithShape="1">
           <a:blip r:embed="rId5">
             <a:extLst>
               <a:ext uri="{28A0092B-C50C-407E-A947-70E740481C1C}">
@@ -6889,23 +6273,80 @@
               </a:ext>
             </a:extLst>
           </a:blip>
-          <a:stretch>
-            <a:fillRect/>
-          </a:stretch>
+          <a:srcRect b="2118"/>
+          <a:stretch/>
         </p:blipFill>
         <p:spPr>
           <a:xfrm>
-            <a:off x="32163261" y="6258028"/>
-            <a:ext cx="5638800" cy="4229100"/>
+            <a:off x="37131785" y="5904794"/>
+            <a:ext cx="5739644" cy="4213561"/>
           </a:xfrm>
           <a:prstGeom prst="rect">
             <a:avLst/>
           </a:prstGeom>
         </p:spPr>
       </p:pic>
+      <p:sp>
+        <p:nvSpPr>
+          <p:cNvPr id="8" name="TextBox 7"/>
+          <p:cNvSpPr txBox="1"/>
+          <p:nvPr/>
+        </p:nvSpPr>
+        <p:spPr>
+          <a:xfrm>
+            <a:off x="32628813" y="10611830"/>
+            <a:ext cx="5107631" cy="1200329"/>
+          </a:xfrm>
+          <a:prstGeom prst="rect">
+            <a:avLst/>
+          </a:prstGeom>
+          <a:noFill/>
+        </p:spPr>
+        <p:txBody>
+          <a:bodyPr wrap="square" rtlCol="0">
+            <a:spAutoFit/>
+          </a:bodyPr>
+          <a:lstStyle/>
+          <a:p>
+            <a:r>
+              <a:rPr lang="en-US" dirty="0"/>
+              <a:t>Confusion matrix resulting from weighted naïve Bayes classification of gender</a:t>
+            </a:r>
+          </a:p>
+        </p:txBody>
+      </p:sp>
+      <p:sp>
+        <p:nvSpPr>
+          <p:cNvPr id="48" name="TextBox 47"/>
+          <p:cNvSpPr txBox="1"/>
+          <p:nvPr/>
+        </p:nvSpPr>
+        <p:spPr>
+          <a:xfrm>
+            <a:off x="38578144" y="10561400"/>
+            <a:ext cx="4481885" cy="1200329"/>
+          </a:xfrm>
+          <a:prstGeom prst="rect">
+            <a:avLst/>
+          </a:prstGeom>
+          <a:noFill/>
+        </p:spPr>
+        <p:txBody>
+          <a:bodyPr wrap="square" rtlCol="0">
+            <a:spAutoFit/>
+          </a:bodyPr>
+          <a:lstStyle/>
+          <a:p>
+            <a:r>
+              <a:rPr lang="en-US" dirty="0"/>
+              <a:t>Confusion matrix resulting from weighted iterative naïve Bayes classification of role</a:t>
+            </a:r>
+          </a:p>
+        </p:txBody>
+      </p:sp>
       <p:pic>
         <p:nvPicPr>
-          <p:cNvPr id="7" name="Picture 6"/>
+          <p:cNvPr id="12" name="Picture 11"/>
           <p:cNvPicPr>
             <a:picLocks noChangeAspect="1"/>
           </p:cNvPicPr>
@@ -6925,95 +6366,7 @@
         </p:blipFill>
         <p:spPr>
           <a:xfrm>
-            <a:off x="37197402" y="6410182"/>
-            <a:ext cx="5739644" cy="4304733"/>
-          </a:xfrm>
-          <a:prstGeom prst="rect">
-            <a:avLst/>
-          </a:prstGeom>
-        </p:spPr>
-      </p:pic>
-      <p:sp>
-        <p:nvSpPr>
-          <p:cNvPr id="8" name="TextBox 7"/>
-          <p:cNvSpPr txBox="1"/>
-          <p:nvPr/>
-        </p:nvSpPr>
-        <p:spPr>
-          <a:xfrm>
-            <a:off x="32694430" y="11117218"/>
-            <a:ext cx="5107631" cy="1200329"/>
-          </a:xfrm>
-          <a:prstGeom prst="rect">
-            <a:avLst/>
-          </a:prstGeom>
-          <a:noFill/>
-        </p:spPr>
-        <p:txBody>
-          <a:bodyPr wrap="square" rtlCol="0">
-            <a:spAutoFit/>
-          </a:bodyPr>
-          <a:lstStyle/>
-          <a:p>
-            <a:r>
-              <a:rPr lang="en-US" dirty="0"/>
-              <a:t>Confusion matrix resulting from weighted naïve Bayes classification of gender</a:t>
-            </a:r>
-          </a:p>
-        </p:txBody>
-      </p:sp>
-      <p:sp>
-        <p:nvSpPr>
-          <p:cNvPr id="48" name="TextBox 47"/>
-          <p:cNvSpPr txBox="1"/>
-          <p:nvPr/>
-        </p:nvSpPr>
-        <p:spPr>
-          <a:xfrm>
-            <a:off x="38643761" y="11066788"/>
-            <a:ext cx="4481885" cy="1200329"/>
-          </a:xfrm>
-          <a:prstGeom prst="rect">
-            <a:avLst/>
-          </a:prstGeom>
-          <a:noFill/>
-        </p:spPr>
-        <p:txBody>
-          <a:bodyPr wrap="square" rtlCol="0">
-            <a:spAutoFit/>
-          </a:bodyPr>
-          <a:lstStyle/>
-          <a:p>
-            <a:r>
-              <a:rPr lang="en-US" dirty="0"/>
-              <a:t>Confusion matrix resulting from weighted iterative naïve Bayes classification of role</a:t>
-            </a:r>
-          </a:p>
-        </p:txBody>
-      </p:sp>
-      <p:pic>
-        <p:nvPicPr>
-          <p:cNvPr id="12" name="Picture 11"/>
-          <p:cNvPicPr>
-            <a:picLocks noChangeAspect="1"/>
-          </p:cNvPicPr>
-          <p:nvPr/>
-        </p:nvPicPr>
-        <p:blipFill>
-          <a:blip r:embed="rId7">
-            <a:extLst>
-              <a:ext uri="{28A0092B-C50C-407E-A947-70E740481C1C}">
-                <a14:useLocalDpi xmlns:a14="http://schemas.microsoft.com/office/drawing/2010/main" val="0"/>
-              </a:ext>
-            </a:extLst>
-          </a:blip>
-          <a:stretch>
-            <a:fillRect/>
-          </a:stretch>
-        </p:blipFill>
-        <p:spPr>
-          <a:xfrm>
-            <a:off x="28645419" y="6186669"/>
+            <a:off x="28579802" y="5681281"/>
             <a:ext cx="3574895" cy="4465835"/>
           </a:xfrm>
           <a:prstGeom prst="rect">
@@ -7029,7 +6382,7 @@
         </p:nvSpPr>
         <p:spPr>
           <a:xfrm>
-            <a:off x="28028701" y="11066788"/>
+            <a:off x="27963084" y="10561400"/>
             <a:ext cx="4468063" cy="1200329"/>
           </a:xfrm>
           <a:prstGeom prst="rect">
@@ -7050,36 +6403,6 @@
           </a:p>
         </p:txBody>
       </p:sp>
-      <p:pic>
-        <p:nvPicPr>
-          <p:cNvPr id="14" name="Picture 13"/>
-          <p:cNvPicPr>
-            <a:picLocks noChangeAspect="1"/>
-          </p:cNvPicPr>
-          <p:nvPr/>
-        </p:nvPicPr>
-        <p:blipFill>
-          <a:blip r:embed="rId8">
-            <a:extLst>
-              <a:ext uri="{28A0092B-C50C-407E-A947-70E740481C1C}">
-                <a14:useLocalDpi xmlns:a14="http://schemas.microsoft.com/office/drawing/2010/main" val="0"/>
-              </a:ext>
-            </a:extLst>
-          </a:blip>
-          <a:stretch>
-            <a:fillRect/>
-          </a:stretch>
-        </p:blipFill>
-        <p:spPr>
-          <a:xfrm>
-            <a:off x="27574818" y="13958542"/>
-            <a:ext cx="15477252" cy="7905178"/>
-          </a:xfrm>
-          <a:prstGeom prst="rect">
-            <a:avLst/>
-          </a:prstGeom>
-        </p:spPr>
-      </p:pic>
       <p:sp>
         <p:nvSpPr>
           <p:cNvPr id="53" name="TextBox 52"/>
@@ -7088,8 +6411,8 @@
         </p:nvSpPr>
         <p:spPr>
           <a:xfrm>
-            <a:off x="27574818" y="22083681"/>
-            <a:ext cx="11979046" cy="461665"/>
+            <a:off x="38447370" y="20693928"/>
+            <a:ext cx="4336539" cy="1938992"/>
           </a:xfrm>
           <a:prstGeom prst="rect">
             <a:avLst/>
@@ -7112,41 +6435,11 @@
             </a:r>
             <a:r>
               <a:rPr lang="en-US" dirty="0"/>
-              <a:t>’s Hamlet and the standards for all archetypes </a:t>
+              <a:t>’s Hamlet and the standards for all archetypes, sorted by highest significance for protagonists </a:t>
             </a:r>
           </a:p>
         </p:txBody>
       </p:sp>
-      <p:pic>
-        <p:nvPicPr>
-          <p:cNvPr id="15" name="Picture 14"/>
-          <p:cNvPicPr>
-            <a:picLocks noChangeAspect="1"/>
-          </p:cNvPicPr>
-          <p:nvPr/>
-        </p:nvPicPr>
-        <p:blipFill>
-          <a:blip r:embed="rId9" cstate="print">
-            <a:extLst>
-              <a:ext uri="{28A0092B-C50C-407E-A947-70E740481C1C}">
-                <a14:useLocalDpi xmlns:a14="http://schemas.microsoft.com/office/drawing/2010/main" val="0"/>
-              </a:ext>
-            </a:extLst>
-          </a:blip>
-          <a:stretch>
-            <a:fillRect/>
-          </a:stretch>
-        </p:blipFill>
-        <p:spPr>
-          <a:xfrm>
-            <a:off x="16208452" y="19201835"/>
-            <a:ext cx="4288887" cy="2449157"/>
-          </a:xfrm>
-          <a:prstGeom prst="rect">
-            <a:avLst/>
-          </a:prstGeom>
-        </p:spPr>
-      </p:pic>
       <p:sp>
         <p:nvSpPr>
           <p:cNvPr id="55" name="TextBox 54"/>
@@ -7155,7 +6448,7 @@
         </p:nvSpPr>
         <p:spPr>
           <a:xfrm>
-            <a:off x="21142000" y="19310928"/>
+            <a:off x="38617751" y="15201362"/>
             <a:ext cx="4006192" cy="1938992"/>
           </a:xfrm>
           <a:prstGeom prst="rect">
@@ -7191,12 +6484,20 @@
             <a:r>
               <a:rPr lang="en-US" dirty="0">
                 <a:solidFill>
+                  <a:srgbClr val="7030A0"/>
+                </a:solidFill>
+              </a:rPr>
+              <a:t>features</a:t>
+            </a:r>
+            <a:r>
+              <a:rPr lang="en-US" dirty="0">
+                <a:solidFill>
                   <a:schemeClr val="accent2">
                     <a:lumMod val="50000"/>
                   </a:schemeClr>
                 </a:solidFill>
               </a:rPr>
-              <a:t>features </a:t>
+              <a:t> </a:t>
             </a:r>
             <a:r>
               <a:rPr lang="en-US" dirty="0"/>
@@ -7215,7 +6516,7 @@
         </p:nvSpPr>
         <p:spPr bwMode="auto">
           <a:xfrm>
-            <a:off x="1225198" y="29378710"/>
+            <a:off x="1159581" y="28538010"/>
             <a:ext cx="14608561" cy="769441"/>
           </a:xfrm>
           <a:prstGeom prst="rect">
@@ -7362,8 +6663,8 @@
         </p:nvSpPr>
         <p:spPr bwMode="auto">
           <a:xfrm>
-            <a:off x="1216733" y="30127938"/>
-            <a:ext cx="14617026" cy="2180862"/>
+            <a:off x="1151116" y="29283739"/>
+            <a:ext cx="14617026" cy="2897524"/>
           </a:xfrm>
           <a:prstGeom prst="rect">
             <a:avLst/>
@@ -7380,7 +6681,7 @@
           <a:effectLst/>
           <a:extLst>
             <a:ext uri="{AF507438-7753-43e0-B8FC-AC1667EBCBE1}">
-              <a14:hiddenEffects xmlns:a14="http://schemas.microsoft.com/office/drawing/2010/main" xmlns="">
+              <a14:hiddenEffects xmlns="" xmlns:a14="http://schemas.microsoft.com/office/drawing/2010/main">
                 <a:effectLst>
                   <a:outerShdw dist="35921" dir="2700000" algn="ctr" rotWithShape="0">
                     <a:schemeClr val="bg2"/>
@@ -7501,31 +6802,31 @@
               <a:buChar char="•"/>
             </a:pPr>
             <a:r>
-              <a:rPr lang="en-US" sz="2000" dirty="0">
+              <a:rPr lang="en-US" dirty="0">
                 <a:effectLst/>
               </a:rPr>
               <a:t>Scikit-learn: Machine Learning in Python, </a:t>
             </a:r>
             <a:r>
-              <a:rPr lang="en-US" sz="2000" dirty="0" err="1">
+              <a:rPr lang="en-US" dirty="0" err="1">
                 <a:effectLst/>
               </a:rPr>
               <a:t>Pedregosa</a:t>
             </a:r>
             <a:r>
-              <a:rPr lang="en-US" sz="2000" dirty="0">
+              <a:rPr lang="en-US" dirty="0">
                 <a:effectLst/>
               </a:rPr>
               <a:t> et al</a:t>
             </a:r>
             <a:r>
-              <a:rPr lang="en-US" sz="2000" i="1" dirty="0">
+              <a:rPr lang="en-US" i="1" dirty="0">
                 <a:effectLst/>
               </a:rPr>
               <a:t>.</a:t>
             </a:r>
             <a:r>
-              <a:rPr lang="en-US" sz="2000" dirty="0">
+              <a:rPr lang="en-US" dirty="0">
                 <a:effectLst/>
               </a:rPr>
               <a:t>, JMLR 12, pp. 2825-2830, 2011.</a:t>
@@ -7540,7 +6841,7 @@
               <a:buChar char="•"/>
             </a:pPr>
             <a:r>
-              <a:rPr lang="en-US" altLang="ja-JP" sz="2000" dirty="0">
+              <a:rPr lang="en-US" altLang="ja-JP" dirty="0">
                 <a:effectLst/>
                 <a:ea typeface="ＭＳ Ｐゴシック" charset="-128"/>
               </a:rPr>
@@ -7556,31 +6857,31 @@
               <a:buChar char="•"/>
             </a:pPr>
             <a:r>
-              <a:rPr lang="en-US" sz="2000" dirty="0">
+              <a:rPr lang="en-US" dirty="0">
                 <a:effectLst/>
               </a:rPr>
               <a:t>Bird, Steven, Edward </a:t>
             </a:r>
             <a:r>
-              <a:rPr lang="en-US" sz="2000" dirty="0" err="1">
+              <a:rPr lang="en-US" dirty="0" err="1">
                 <a:effectLst/>
               </a:rPr>
               <a:t>Loper</a:t>
             </a:r>
             <a:r>
-              <a:rPr lang="en-US" sz="2000" dirty="0">
+              <a:rPr lang="en-US" dirty="0">
                 <a:effectLst/>
               </a:rPr>
               <a:t> and Ewan Klein (2009), </a:t>
             </a:r>
             <a:r>
-              <a:rPr lang="en-US" sz="2000" i="1" dirty="0">
+              <a:rPr lang="en-US" i="1" dirty="0">
                 <a:effectLst/>
               </a:rPr>
               <a:t>Natural Language Processing with Python</a:t>
             </a:r>
             <a:r>
-              <a:rPr lang="en-US" sz="2000" dirty="0">
+              <a:rPr lang="en-US" dirty="0">
                 <a:effectLst/>
               </a:rPr>
               <a:t>. O’Reilly Media Inc.</a:t>
@@ -7595,31 +6896,31 @@
               <a:buChar char="•"/>
             </a:pPr>
             <a:r>
-              <a:rPr lang="en-US" sz="2000" dirty="0">
+              <a:rPr lang="en-US" dirty="0">
                 <a:effectLst/>
               </a:rPr>
               <a:t>Folger Shakespeare Library. (</a:t>
             </a:r>
             <a:r>
-              <a:rPr lang="en-US" sz="2000" dirty="0" err="1">
+              <a:rPr lang="en-US" dirty="0" err="1">
                 <a:effectLst/>
               </a:rPr>
               <a:t>n.d.</a:t>
             </a:r>
             <a:r>
-              <a:rPr lang="en-US" sz="2000" dirty="0">
+              <a:rPr lang="en-US" dirty="0">
                 <a:effectLst/>
               </a:rPr>
               <a:t>) </a:t>
             </a:r>
             <a:r>
-              <a:rPr lang="en-US" sz="2000" i="1" dirty="0">
+              <a:rPr lang="en-US" i="1" dirty="0">
                 <a:effectLst/>
               </a:rPr>
               <a:t>Shakespeare's Plays, Sonnets and Poems</a:t>
             </a:r>
             <a:r>
-              <a:rPr lang="en-US" sz="2000" dirty="0">
+              <a:rPr lang="en-US" dirty="0">
                 <a:effectLst/>
               </a:rPr>
               <a:t> from Folger Digital Texts. Retrieved from www.folgerdigitaltexts.org</a:t>
@@ -7632,7 +6933,7 @@
           <p:cNvPr id="20" name="Group 19">
             <a:extLst>
               <a:ext uri="{FF2B5EF4-FFF2-40B4-BE49-F238E27FC236}">
-                <a16:creationId xmlns:a16="http://schemas.microsoft.com/office/drawing/2014/main" xmlns="" id="{753607CC-CD60-49E7-A323-72FC13B79B7D}"/>
+                <a16:creationId xmlns:a16="http://schemas.microsoft.com/office/drawing/2014/main" id="{753607CC-CD60-49E7-A323-72FC13B79B7D}"/>
               </a:ext>
             </a:extLst>
           </p:cNvPr>
@@ -7641,10 +6942,10 @@
         </p:nvGrpSpPr>
         <p:grpSpPr>
           <a:xfrm>
-            <a:off x="1214011" y="16757489"/>
-            <a:ext cx="7898758" cy="9002785"/>
-            <a:chOff x="1145421" y="16601032"/>
-            <a:chExt cx="7808546" cy="8873469"/>
+            <a:off x="1146834" y="16039277"/>
+            <a:ext cx="7932706" cy="7330065"/>
+            <a:chOff x="1145421" y="16442739"/>
+            <a:chExt cx="7808546" cy="9031762"/>
           </a:xfrm>
         </p:grpSpPr>
         <p:sp>
@@ -7657,7 +6958,7 @@
           </p:nvSpPr>
           <p:spPr bwMode="auto">
             <a:xfrm>
-              <a:off x="1145421" y="16633077"/>
+              <a:off x="1145421" y="16442739"/>
               <a:ext cx="7808545" cy="8841424"/>
             </a:xfrm>
             <a:prstGeom prst="rect">
@@ -7675,7 +6976,7 @@
             <a:effectLst/>
             <a:extLst>
               <a:ext uri="{AF507438-7753-43e0-B8FC-AC1667EBCBE1}">
-                <a14:hiddenEffects xmlns:a14="http://schemas.microsoft.com/office/drawing/2010/main" xmlns="">
+                <a14:hiddenEffects xmlns="" xmlns:a14="http://schemas.microsoft.com/office/drawing/2010/main">
                   <a:effectLst>
                     <a:outerShdw dist="35921" dir="2700000" algn="ctr" rotWithShape="0">
                       <a:schemeClr val="bg2"/>
@@ -7817,7 +7118,7 @@
             <p:nvPr/>
           </p:nvPicPr>
           <p:blipFill rotWithShape="1">
-            <a:blip r:embed="rId10">
+            <a:blip r:embed="rId7">
               <a:extLst>
                 <a:ext uri="{28A0092B-C50C-407E-A947-70E740481C1C}">
                   <a14:useLocalDpi xmlns:a14="http://schemas.microsoft.com/office/drawing/2010/main" val="0"/>
@@ -7875,7 +7176,7 @@
           <p:spPr>
             <a:xfrm>
               <a:off x="1177306" y="16601032"/>
-              <a:ext cx="7776661" cy="1690174"/>
+              <a:ext cx="7776661" cy="1666151"/>
             </a:xfrm>
             <a:prstGeom prst="rect">
               <a:avLst/>
@@ -7888,7 +7189,7 @@
             <a:lstStyle/>
             <a:p>
               <a:r>
-                <a:rPr lang="en-US" sz="3600" dirty="0">
+                <a:rPr lang="en-US" sz="2800" dirty="0">
                   <a:solidFill>
                     <a:srgbClr val="000000"/>
                   </a:solidFill>
@@ -7898,66 +7199,26 @@
                 <a:t>We turned each character’s speech into a </a:t>
               </a:r>
               <a:r>
-                <a:rPr lang="en-US" sz="3600" b="1" dirty="0">
+                <a:rPr lang="en-US" sz="2800" b="1" dirty="0">
                   <a:solidFill>
                     <a:srgbClr val="000000"/>
                   </a:solidFill>
                   <a:effectLst/>
                   <a:latin typeface="+mj-lt"/>
                 </a:rPr>
-                <a:t>vector</a:t>
+                <a:t>vector </a:t>
               </a:r>
               <a:r>
-                <a:rPr lang="en-US" sz="3600" dirty="0">
+                <a:rPr lang="en-US" sz="2800" dirty="0">
                   <a:solidFill>
                     <a:srgbClr val="000000"/>
                   </a:solidFill>
                   <a:effectLst/>
                   <a:latin typeface="+mj-lt"/>
                 </a:rPr>
-                <a:t> and used </a:t>
+                <a:t>in order to explore and compare characters’ sonic signatures.</a:t>
               </a:r>
-              <a:r>
-                <a:rPr lang="en-US" sz="3600" b="1" dirty="0">
-                  <a:solidFill>
-                    <a:srgbClr val="000000"/>
-                  </a:solidFill>
-                  <a:effectLst/>
-                  <a:latin typeface="+mj-lt"/>
-                </a:rPr>
-                <a:t>multidimensional scaling </a:t>
-              </a:r>
-              <a:r>
-                <a:rPr lang="en-US" sz="3600" dirty="0">
-                  <a:solidFill>
-                    <a:srgbClr val="000000"/>
-                  </a:solidFill>
-                  <a:effectLst/>
-                  <a:latin typeface="+mj-lt"/>
-                </a:rPr>
-                <a:t>to look for </a:t>
-              </a:r>
-              <a:r>
-                <a:rPr lang="en-US" sz="3600" b="1" dirty="0">
-                  <a:solidFill>
-                    <a:srgbClr val="000000"/>
-                  </a:solidFill>
-                  <a:effectLst/>
-                  <a:latin typeface="+mj-lt"/>
-                </a:rPr>
-                <a:t>groups</a:t>
-              </a:r>
-              <a:r>
-                <a:rPr lang="en-US" sz="3600" dirty="0">
-                  <a:solidFill>
-                    <a:srgbClr val="000000"/>
-                  </a:solidFill>
-                  <a:effectLst/>
-                  <a:latin typeface="+mj-lt"/>
-                </a:rPr>
-                <a:t> of characters.</a:t>
-              </a:r>
-              <a:endParaRPr lang="en-US" sz="3600" dirty="0">
+              <a:endParaRPr lang="en-US" sz="2800" dirty="0">
                 <a:latin typeface="+mj-lt"/>
               </a:endParaRPr>
             </a:p>
@@ -7968,14 +7229,15 @@
         <p:nvCxnSpPr>
           <p:cNvPr id="86" name="Straight Connector 85"/>
           <p:cNvCxnSpPr>
+            <a:cxnSpLocks/>
             <a:stCxn id="63" idx="2"/>
           </p:cNvCxnSpPr>
           <p:nvPr/>
         </p:nvCxnSpPr>
         <p:spPr bwMode="auto">
           <a:xfrm flipV="1">
-            <a:off x="9140265" y="5414043"/>
-            <a:ext cx="6901360" cy="16376901"/>
+            <a:off x="9079543" y="4908656"/>
+            <a:ext cx="6896465" cy="14634700"/>
           </a:xfrm>
           <a:prstGeom prst="line">
             <a:avLst/>
@@ -7997,7 +7259,7 @@
           <a:effectLst/>
           <a:extLst>
             <a:ext uri="{AF507438-7753-43e0-B8FC-AC1667EBCBE1}">
-              <a14:hiddenEffects xmlns:a14="http://schemas.microsoft.com/office/drawing/2010/main" xmlns="">
+              <a14:hiddenEffects xmlns="" xmlns:a14="http://schemas.microsoft.com/office/drawing/2010/main">
                 <a:effectLst>
                   <a:outerShdw dist="35921" dir="2700000" algn="ctr" rotWithShape="0">
                     <a:schemeClr val="bg2"/>
@@ -8013,7 +7275,7 @@
           <p:cNvPr id="17" name="Group 16">
             <a:extLst>
               <a:ext uri="{FF2B5EF4-FFF2-40B4-BE49-F238E27FC236}">
-                <a16:creationId xmlns:a16="http://schemas.microsoft.com/office/drawing/2014/main" xmlns="" id="{805B18CB-5FCA-49E9-9474-93EEAF482318}"/>
+                <a16:creationId xmlns:a16="http://schemas.microsoft.com/office/drawing/2014/main" id="{805B18CB-5FCA-49E9-9474-93EEAF482318}"/>
               </a:ext>
             </a:extLst>
           </p:cNvPr>
@@ -8022,8 +7284,8 @@
         </p:nvGrpSpPr>
         <p:grpSpPr>
           <a:xfrm>
-            <a:off x="1220134" y="6216925"/>
-            <a:ext cx="14545752" cy="4304064"/>
+            <a:off x="1154517" y="5711536"/>
+            <a:ext cx="14545752" cy="4702553"/>
             <a:chOff x="1177306" y="6201893"/>
             <a:chExt cx="14545752" cy="4304064"/>
           </a:xfrm>
@@ -8033,7 +7295,7 @@
             <p:cNvPr id="54" name="Text Box 263">
               <a:extLst>
                 <a:ext uri="{FF2B5EF4-FFF2-40B4-BE49-F238E27FC236}">
-                  <a16:creationId xmlns:a16="http://schemas.microsoft.com/office/drawing/2014/main" xmlns="" id="{2C460C58-64E7-4204-912A-7A9F8309B605}"/>
+                  <a16:creationId xmlns:a16="http://schemas.microsoft.com/office/drawing/2014/main" id="{2C460C58-64E7-4204-912A-7A9F8309B605}"/>
                 </a:ext>
               </a:extLst>
             </p:cNvPr>
@@ -8170,47 +7432,16 @@
                 <a:rPr lang="en-US" sz="2800" dirty="0">
                   <a:effectLst/>
                 </a:rPr>
-                <a:t>The sounds that make up a word are thought to have meaning. </a:t>
+                <a:t>Linguists theorize that the sounds that make up</a:t>
               </a:r>
             </a:p>
             <a:p>
               <a:pPr indent="-228600"/>
               <a:r>
-                <a:rPr lang="en-US" sz="1000" dirty="0">
-                  <a:effectLst/>
-                </a:rPr>
-                <a:t/>
-              </a:r>
-              <a:br>
-                <a:rPr lang="en-US" sz="1000" dirty="0">
-                  <a:effectLst/>
-                </a:rPr>
-              </a:br>
-              <a:r>
                 <a:rPr lang="en-US" sz="2800" dirty="0">
                   <a:effectLst/>
                 </a:rPr>
-                <a:t>When researchers make up gibberish words for objects, people tend to agree on which gibberish words should refer to small and large objects. </a:t>
-              </a:r>
-            </a:p>
-            <a:p>
-              <a:pPr indent="-228600"/>
-              <a:r>
-                <a:rPr lang="en-US" sz="1000" dirty="0">
-                  <a:effectLst/>
-                </a:rPr>
-                <a:t/>
-              </a:r>
-              <a:br>
-                <a:rPr lang="en-US" sz="1000" dirty="0">
-                  <a:effectLst/>
-                </a:rPr>
-              </a:br>
-              <a:r>
-                <a:rPr lang="en-US" sz="2800" dirty="0">
-                  <a:effectLst/>
-                </a:rPr>
-                <a:t>When close reading a poem, readers pay attention to assonance and consonance and draw meaning from the repetition of sounds.</a:t>
+                <a:t>a word have autonomous meaning. When researchers make up gibberish words for objects, people tend to agree on which gibberish words should refer to small and large objects. When close reading a poem, readers pay attention to assonance and consonance and draw meaning from the repetition of sounds.</a:t>
               </a:r>
               <a:endParaRPr lang="en-US" altLang="zh-CN" sz="2800" dirty="0">
                 <a:effectLst/>
@@ -8224,7 +7455,7 @@
             <p:cNvPr id="56" name="Text Box 263">
               <a:extLst>
                 <a:ext uri="{FF2B5EF4-FFF2-40B4-BE49-F238E27FC236}">
-                  <a16:creationId xmlns:a16="http://schemas.microsoft.com/office/drawing/2014/main" xmlns="" id="{6F1A8300-3B19-45F5-99FA-F65FB890D220}"/>
+                  <a16:creationId xmlns:a16="http://schemas.microsoft.com/office/drawing/2014/main" id="{6F1A8300-3B19-45F5-99FA-F65FB890D220}"/>
                 </a:ext>
               </a:extLst>
             </p:cNvPr>
@@ -8379,6 +7610,9 @@
                 </a:rPr>
                 <a:t>it then possible to visualize how a character “sounds”?</a:t>
               </a:r>
+              <a:endParaRPr lang="en-US" sz="1000" b="1" dirty="0">
+                <a:effectLst/>
+              </a:endParaRPr>
             </a:p>
             <a:p>
               <a:pPr>
@@ -8455,7 +7689,7 @@
           <p:cNvPr id="66" name="Isosceles Triangle 65">
             <a:extLst>
               <a:ext uri="{FF2B5EF4-FFF2-40B4-BE49-F238E27FC236}">
-                <a16:creationId xmlns:a16="http://schemas.microsoft.com/office/drawing/2014/main" xmlns="" id="{8BDCDC91-A860-4F73-A609-A050B902D6E3}"/>
+                <a16:creationId xmlns:a16="http://schemas.microsoft.com/office/drawing/2014/main" id="{8BDCDC91-A860-4F73-A609-A050B902D6E3}"/>
               </a:ext>
             </a:extLst>
           </p:cNvPr>
@@ -8464,12 +7698,12 @@
         </p:nvSpPr>
         <p:spPr bwMode="auto">
           <a:xfrm rot="16200000">
-            <a:off x="6539993" y="15731288"/>
+            <a:off x="6474378" y="15225900"/>
             <a:ext cx="12087058" cy="6882575"/>
           </a:xfrm>
           <a:prstGeom prst="triangle">
             <a:avLst>
-              <a:gd name="adj" fmla="val 28237"/>
+              <a:gd name="adj" fmla="val 42762"/>
             </a:avLst>
           </a:prstGeom>
           <a:solidFill>
@@ -8488,7 +7722,7 @@
           <a:effectLst/>
           <a:extLst>
             <a:ext uri="{AF507438-7753-43e0-B8FC-AC1667EBCBE1}">
-              <a14:hiddenEffects xmlns:a14="http://schemas.microsoft.com/office/drawing/2010/main" xmlns="">
+              <a14:hiddenEffects xmlns="" xmlns:a14="http://schemas.microsoft.com/office/drawing/2010/main">
                 <a:effectLst>
                   <a:outerShdw dist="35921" dir="2700000" algn="ctr" rotWithShape="0">
                     <a:schemeClr val="bg2"/>
@@ -8551,8 +7785,8 @@
         </p:nvCxnSpPr>
         <p:spPr bwMode="auto">
           <a:xfrm flipV="1">
-            <a:off x="9142235" y="13094617"/>
-            <a:ext cx="6904688" cy="8708465"/>
+            <a:off x="9076619" y="12589231"/>
+            <a:ext cx="6904689" cy="6952818"/>
           </a:xfrm>
           <a:prstGeom prst="line">
             <a:avLst/>
@@ -8574,7 +7808,7 @@
           <a:effectLst/>
           <a:extLst>
             <a:ext uri="{AF507438-7753-43e0-B8FC-AC1667EBCBE1}">
-              <a14:hiddenEffects xmlns:a14="http://schemas.microsoft.com/office/drawing/2010/main" xmlns="">
+              <a14:hiddenEffects xmlns="" xmlns:a14="http://schemas.microsoft.com/office/drawing/2010/main">
                 <a:effectLst>
                   <a:outerShdw dist="35921" dir="2700000" algn="ctr" rotWithShape="0">
                     <a:schemeClr val="bg2"/>
@@ -8590,7 +7824,7 @@
           <p:cNvPr id="19" name="Group 18">
             <a:extLst>
               <a:ext uri="{FF2B5EF4-FFF2-40B4-BE49-F238E27FC236}">
-                <a16:creationId xmlns:a16="http://schemas.microsoft.com/office/drawing/2014/main" xmlns="" id="{96D30C17-4ACB-43AB-9D65-23EFCFEF01E7}"/>
+                <a16:creationId xmlns:a16="http://schemas.microsoft.com/office/drawing/2014/main" id="{96D30C17-4ACB-43AB-9D65-23EFCFEF01E7}"/>
               </a:ext>
             </a:extLst>
           </p:cNvPr>
@@ -8599,10 +7833,10 @@
         </p:nvGrpSpPr>
         <p:grpSpPr>
           <a:xfrm>
-            <a:off x="1225199" y="11260472"/>
-            <a:ext cx="14984866" cy="4518053"/>
-            <a:chOff x="1133918" y="11244854"/>
-            <a:chExt cx="14984866" cy="4518053"/>
+            <a:off x="1146835" y="10755084"/>
+            <a:ext cx="15036555" cy="4518053"/>
+            <a:chOff x="1121171" y="11244854"/>
+            <a:chExt cx="15036555" cy="4518053"/>
           </a:xfrm>
           <a:solidFill>
             <a:schemeClr val="bg1"/>
@@ -8613,7 +7847,7 @@
             <p:cNvPr id="50" name="Text Box 263">
               <a:extLst>
                 <a:ext uri="{FF2B5EF4-FFF2-40B4-BE49-F238E27FC236}">
-                  <a16:creationId xmlns:a16="http://schemas.microsoft.com/office/drawing/2014/main" xmlns="" id="{E092D375-05B1-4228-A258-8E736865B013}"/>
+                  <a16:creationId xmlns:a16="http://schemas.microsoft.com/office/drawing/2014/main" id="{E092D375-05B1-4228-A258-8E736865B013}"/>
                 </a:ext>
               </a:extLst>
             </p:cNvPr>
@@ -8763,7 +7997,7 @@
             <p:cNvPr id="43" name="Text Box 263">
               <a:extLst>
                 <a:ext uri="{FF2B5EF4-FFF2-40B4-BE49-F238E27FC236}">
-                  <a16:creationId xmlns:a16="http://schemas.microsoft.com/office/drawing/2014/main" xmlns="" id="{99FC432D-809F-4CEB-B05C-4352B08C803C}"/>
+                  <a16:creationId xmlns:a16="http://schemas.microsoft.com/office/drawing/2014/main" id="{99FC432D-809F-4CEB-B05C-4352B08C803C}"/>
                 </a:ext>
               </a:extLst>
             </p:cNvPr>
@@ -8774,8 +8008,8 @@
           </p:nvSpPr>
           <p:spPr bwMode="auto">
             <a:xfrm>
-              <a:off x="1209684" y="11272370"/>
-              <a:ext cx="7563561" cy="4316566"/>
+              <a:off x="1121171" y="11460417"/>
+              <a:ext cx="7563561" cy="2862322"/>
             </a:xfrm>
             <a:prstGeom prst="rect">
               <a:avLst/>
@@ -8893,20 +8127,15 @@
               </a:lvl9pPr>
             </a:lstStyle>
             <a:p>
-              <a:pPr>
-                <a:lnSpc>
-                  <a:spcPct val="125000"/>
-                </a:lnSpc>
-              </a:pPr>
               <a:r>
-                <a:rPr lang="en-US" altLang="zh-CN" sz="3000" dirty="0">
+                <a:rPr lang="en-US" altLang="zh-CN" sz="2800" dirty="0">
                   <a:effectLst/>
                   <a:ea typeface="SimSun" pitchFamily="2" charset="-122"/>
                 </a:rPr>
                 <a:t>Words break down into a set of fundamental elements called </a:t>
               </a:r>
               <a:r>
-                <a:rPr lang="en-US" altLang="zh-CN" sz="3000" b="1" dirty="0">
+                <a:rPr lang="en-US" altLang="zh-CN" sz="2800" b="1" dirty="0">
                   <a:solidFill>
                     <a:srgbClr val="FF0080"/>
                   </a:solidFill>
@@ -8916,18 +8145,16 @@
                 <a:t>phonemes</a:t>
               </a:r>
               <a:r>
-                <a:rPr lang="en-US" altLang="zh-CN" sz="3000" dirty="0">
+                <a:rPr lang="en-US" altLang="zh-CN" sz="2800" dirty="0">
                   <a:effectLst/>
                   <a:ea typeface="SimSun" pitchFamily="2" charset="-122"/>
                 </a:rPr>
                 <a:t>. Every phoneme has an associated list of </a:t>
               </a:r>
               <a:r>
-                <a:rPr lang="en-US" altLang="zh-CN" sz="3000" b="1" dirty="0">
+                <a:rPr lang="en-US" altLang="zh-CN" sz="2800" b="1" dirty="0">
                   <a:solidFill>
-                    <a:schemeClr val="accent2">
-                      <a:lumMod val="50000"/>
-                    </a:schemeClr>
+                    <a:srgbClr val="7030A0"/>
                   </a:solidFill>
                   <a:effectLst/>
                   <a:ea typeface="SimSun" pitchFamily="2" charset="-122"/>
@@ -8935,7 +8162,7 @@
                 <a:t>features</a:t>
               </a:r>
               <a:r>
-                <a:rPr lang="en-US" altLang="zh-CN" sz="3000" dirty="0">
+                <a:rPr lang="en-US" altLang="zh-CN" sz="2800" dirty="0">
                   <a:solidFill>
                     <a:schemeClr val="accent2">
                       <a:lumMod val="50000"/>
@@ -8947,18 +8174,16 @@
                 <a:t> </a:t>
               </a:r>
               <a:r>
-                <a:rPr lang="en-US" altLang="zh-CN" sz="3000" dirty="0">
+                <a:rPr lang="en-US" altLang="zh-CN" sz="2800" dirty="0">
                   <a:effectLst/>
                   <a:ea typeface="SimSun" pitchFamily="2" charset="-122"/>
                 </a:rPr>
                 <a:t>which describe the physical processes necessary to produce it. We analyzed characters using the </a:t>
               </a:r>
               <a:r>
-                <a:rPr lang="en-US" altLang="zh-CN" sz="3000" b="1" dirty="0">
+                <a:rPr lang="en-US" altLang="zh-CN" sz="2800" b="1" dirty="0">
                   <a:solidFill>
-                    <a:schemeClr val="accent2">
-                      <a:lumMod val="50000"/>
-                    </a:schemeClr>
+                    <a:srgbClr val="7030A0"/>
                   </a:solidFill>
                   <a:effectLst/>
                   <a:ea typeface="SimSun" pitchFamily="2" charset="-122"/>
@@ -8966,14 +8191,14 @@
                 <a:t>types of sounds </a:t>
               </a:r>
               <a:r>
-                <a:rPr lang="en-US" altLang="zh-CN" sz="3000" dirty="0">
+                <a:rPr lang="en-US" altLang="zh-CN" sz="2800" dirty="0">
                   <a:effectLst/>
                   <a:ea typeface="SimSun" pitchFamily="2" charset="-122"/>
                 </a:rPr>
                 <a:t>they made and the </a:t>
               </a:r>
               <a:r>
-                <a:rPr lang="en-US" altLang="zh-CN" sz="3000" b="1" dirty="0">
+                <a:rPr lang="en-US" altLang="zh-CN" sz="2800" b="1" dirty="0">
                   <a:solidFill>
                     <a:srgbClr val="FF0080"/>
                   </a:solidFill>
@@ -8983,7 +8208,7 @@
                 <a:t>specific sounds</a:t>
               </a:r>
               <a:r>
-                <a:rPr lang="en-US" altLang="zh-CN" sz="3000" dirty="0">
+                <a:rPr lang="en-US" altLang="zh-CN" sz="2800" dirty="0">
                   <a:solidFill>
                     <a:srgbClr val="FF0080"/>
                   </a:solidFill>
@@ -8993,18 +8218,11 @@
                 <a:t> </a:t>
               </a:r>
               <a:r>
-                <a:rPr lang="en-US" altLang="zh-CN" sz="3000" dirty="0">
-                  <a:effectLst/>
-                  <a:ea typeface="SimSun" pitchFamily="2" charset="-122"/>
-                </a:rPr>
-                <a:t>they made</a:t>
-              </a:r>
-              <a:r>
                 <a:rPr lang="en-US" altLang="zh-CN" sz="2800" dirty="0">
                   <a:effectLst/>
                   <a:ea typeface="SimSun" pitchFamily="2" charset="-122"/>
                 </a:rPr>
-                <a:t>.</a:t>
+                <a:t>they made.</a:t>
               </a:r>
               <a:endParaRPr lang="en-US" altLang="zh-CN" sz="2800" b="1" dirty="0">
                 <a:solidFill>
@@ -9021,7 +8239,7 @@
             <p:cNvPr id="9" name="Picture 8">
               <a:extLst>
                 <a:ext uri="{FF2B5EF4-FFF2-40B4-BE49-F238E27FC236}">
-                  <a16:creationId xmlns:a16="http://schemas.microsoft.com/office/drawing/2014/main" xmlns="" id="{530F80FF-73F5-4B97-B0D1-3AEB30FF03F8}"/>
+                  <a16:creationId xmlns:a16="http://schemas.microsoft.com/office/drawing/2014/main" id="{530F80FF-73F5-4B97-B0D1-3AEB30FF03F8}"/>
                 </a:ext>
               </a:extLst>
             </p:cNvPr>
@@ -9031,7 +8249,7 @@
             <p:nvPr/>
           </p:nvPicPr>
           <p:blipFill>
-            <a:blip r:embed="rId11">
+            <a:blip r:embed="rId8">
               <a:extLst>
                 <a:ext uri="{28A0092B-C50C-407E-A947-70E740481C1C}">
                   <a14:useLocalDpi xmlns:a14="http://schemas.microsoft.com/office/drawing/2010/main" val="0"/>
@@ -9044,8 +8262,8 @@
           </p:blipFill>
           <p:spPr>
             <a:xfrm>
-              <a:off x="8571007" y="11822246"/>
-              <a:ext cx="6938278" cy="3199935"/>
+              <a:off x="8731663" y="11945871"/>
+              <a:ext cx="6657967" cy="3070656"/>
             </a:xfrm>
             <a:prstGeom prst="rect">
               <a:avLst/>
@@ -9058,7 +8276,7 @@
             <p:cNvPr id="16" name="TextBox 15">
               <a:extLst>
                 <a:ext uri="{FF2B5EF4-FFF2-40B4-BE49-F238E27FC236}">
-                  <a16:creationId xmlns:a16="http://schemas.microsoft.com/office/drawing/2014/main" xmlns="" id="{45F0E81A-41C8-4AF1-B9DF-E1F549B787BE}"/>
+                  <a16:creationId xmlns:a16="http://schemas.microsoft.com/office/drawing/2014/main" id="{45F0E81A-41C8-4AF1-B9DF-E1F549B787BE}"/>
                 </a:ext>
               </a:extLst>
             </p:cNvPr>
@@ -9067,7 +8285,7 @@
           </p:nvSpPr>
           <p:spPr>
             <a:xfrm>
-              <a:off x="8342516" y="11356627"/>
+              <a:off x="8381458" y="11448029"/>
               <a:ext cx="7776268" cy="830997"/>
             </a:xfrm>
             <a:prstGeom prst="rect">
@@ -9093,7 +8311,7 @@
             <p:cNvPr id="51" name="TextBox 50">
               <a:extLst>
                 <a:ext uri="{FF2B5EF4-FFF2-40B4-BE49-F238E27FC236}">
-                  <a16:creationId xmlns:a16="http://schemas.microsoft.com/office/drawing/2014/main" xmlns="" id="{9814A516-53B3-4476-8997-FBF776CECA44}"/>
+                  <a16:creationId xmlns:a16="http://schemas.microsoft.com/office/drawing/2014/main" id="{9814A516-53B3-4476-8997-FBF776CECA44}"/>
                 </a:ext>
               </a:extLst>
             </p:cNvPr>
@@ -9102,7 +8320,7 @@
           </p:nvSpPr>
           <p:spPr>
             <a:xfrm>
-              <a:off x="8340881" y="14925455"/>
+              <a:off x="8266191" y="14925216"/>
               <a:ext cx="7356922" cy="830997"/>
             </a:xfrm>
             <a:prstGeom prst="rect">
@@ -9119,7 +8337,7 @@
               <a:pPr algn="ctr"/>
               <a:r>
                 <a:rPr lang="en-US" dirty="0"/>
-                <a:t>The phoneme “S” has the features that it is coronal, sibilant, and fricative, among other features.</a:t>
+                <a:t>The phoneme “S” has features including coronal, sibilant, and fricative.</a:t>
               </a:r>
             </a:p>
           </p:txBody>
@@ -9130,7 +8348,7 @@
           <p:cNvPr id="70" name="Picture 69">
             <a:extLst>
               <a:ext uri="{FF2B5EF4-FFF2-40B4-BE49-F238E27FC236}">
-                <a16:creationId xmlns:a16="http://schemas.microsoft.com/office/drawing/2014/main" xmlns="" id="{12A9C63F-EBD0-4D06-A504-D824E374D8B9}"/>
+                <a16:creationId xmlns:a16="http://schemas.microsoft.com/office/drawing/2014/main" id="{12A9C63F-EBD0-4D06-A504-D824E374D8B9}"/>
               </a:ext>
             </a:extLst>
           </p:cNvPr>
@@ -9140,7 +8358,7 @@
           <p:nvPr/>
         </p:nvPicPr>
         <p:blipFill>
-          <a:blip r:embed="rId12">
+          <a:blip r:embed="rId9">
             <a:extLst>
               <a:ext uri="{28A0092B-C50C-407E-A947-70E740481C1C}">
                 <a14:useLocalDpi xmlns:a14="http://schemas.microsoft.com/office/drawing/2010/main" val="0"/>
@@ -9153,7 +8371,7 @@
         </p:blipFill>
         <p:spPr>
           <a:xfrm>
-            <a:off x="32102541" y="26190424"/>
+            <a:off x="32036924" y="25685036"/>
             <a:ext cx="10980122" cy="4792172"/>
           </a:xfrm>
           <a:prstGeom prst="rect">
@@ -9166,7 +8384,7 @@
           <p:cNvPr id="83" name="TextBox 82">
             <a:extLst>
               <a:ext uri="{FF2B5EF4-FFF2-40B4-BE49-F238E27FC236}">
-                <a16:creationId xmlns:a16="http://schemas.microsoft.com/office/drawing/2014/main" xmlns="" id="{7BC5959E-C084-4F76-8353-609093824D69}"/>
+                <a16:creationId xmlns:a16="http://schemas.microsoft.com/office/drawing/2014/main" id="{7BC5959E-C084-4F76-8353-609093824D69}"/>
               </a:ext>
             </a:extLst>
           </p:cNvPr>
@@ -9175,7 +8393,7 @@
         </p:nvSpPr>
         <p:spPr>
           <a:xfrm>
-            <a:off x="32039289" y="30955962"/>
+            <a:off x="31973672" y="30450574"/>
             <a:ext cx="10440282" cy="1938992"/>
           </a:xfrm>
           <a:prstGeom prst="rect">
@@ -9195,10 +8413,6 @@
             </a:r>
           </a:p>
           <a:p>
-            <a:r>
-              <a:rPr lang="en-US" dirty="0"/>
-              <a:t/>
-            </a:r>
             <a:br>
               <a:rPr lang="en-US" dirty="0"/>
             </a:br>
@@ -9211,7 +8425,7 @@
           <p:cNvPr id="85" name="TextBox 84">
             <a:extLst>
               <a:ext uri="{FF2B5EF4-FFF2-40B4-BE49-F238E27FC236}">
-                <a16:creationId xmlns:a16="http://schemas.microsoft.com/office/drawing/2014/main" xmlns="" id="{797ACB8E-1701-408D-98F9-FFC2BFD4783A}"/>
+                <a16:creationId xmlns:a16="http://schemas.microsoft.com/office/drawing/2014/main" id="{797ACB8E-1701-408D-98F9-FFC2BFD4783A}"/>
               </a:ext>
             </a:extLst>
           </p:cNvPr>
@@ -9220,7 +8434,7 @@
         </p:nvSpPr>
         <p:spPr>
           <a:xfrm>
-            <a:off x="32090878" y="32414622"/>
+            <a:off x="34226831" y="32236595"/>
             <a:ext cx="17580429" cy="461665"/>
           </a:xfrm>
           <a:prstGeom prst="rect">
@@ -9236,7 +8450,7 @@
           <a:p>
             <a:r>
               <a:rPr lang="en-US" dirty="0"/>
-              <a:t>Thank you  to Carleton College, Eric Alexander, and Mike Tie for supporting this research</a:t>
+              <a:t>Thank you  to Carleton College and Mike Tie for supporting this research</a:t>
             </a:r>
           </a:p>
         </p:txBody>
@@ -9246,7 +8460,7 @@
           <p:cNvPr id="3" name="Group 2">
             <a:extLst>
               <a:ext uri="{FF2B5EF4-FFF2-40B4-BE49-F238E27FC236}">
-                <a16:creationId xmlns:a16="http://schemas.microsoft.com/office/drawing/2014/main" xmlns="" id="{C2C36A0C-5609-49E1-8036-B3523FDCB596}"/>
+                <a16:creationId xmlns:a16="http://schemas.microsoft.com/office/drawing/2014/main" id="{C2C36A0C-5609-49E1-8036-B3523FDCB596}"/>
               </a:ext>
             </a:extLst>
           </p:cNvPr>
@@ -9255,7 +8469,7 @@
         </p:nvGrpSpPr>
         <p:grpSpPr>
           <a:xfrm>
-            <a:off x="26976138" y="26178585"/>
+            <a:off x="26910521" y="25673197"/>
             <a:ext cx="10488351" cy="5910812"/>
             <a:chOff x="27041001" y="26157977"/>
             <a:chExt cx="10488351" cy="5910812"/>
@@ -9266,7 +8480,7 @@
             <p:cNvPr id="84" name="Group 83">
               <a:extLst>
                 <a:ext uri="{FF2B5EF4-FFF2-40B4-BE49-F238E27FC236}">
-                  <a16:creationId xmlns:a16="http://schemas.microsoft.com/office/drawing/2014/main" xmlns="" id="{58C465F4-B0F9-4E58-8951-C85675715723}"/>
+                  <a16:creationId xmlns:a16="http://schemas.microsoft.com/office/drawing/2014/main" id="{58C465F4-B0F9-4E58-8951-C85675715723}"/>
                 </a:ext>
               </a:extLst>
             </p:cNvPr>
@@ -9286,7 +8500,7 @@
               <p:cNvPr id="75" name="Picture 74">
                 <a:extLst>
                   <a:ext uri="{FF2B5EF4-FFF2-40B4-BE49-F238E27FC236}">
-                    <a16:creationId xmlns:a16="http://schemas.microsoft.com/office/drawing/2014/main" xmlns="" id="{CE37A18D-44BC-4012-BC15-9652DE7C5DF0}"/>
+                    <a16:creationId xmlns:a16="http://schemas.microsoft.com/office/drawing/2014/main" id="{CE37A18D-44BC-4012-BC15-9652DE7C5DF0}"/>
                   </a:ext>
                 </a:extLst>
               </p:cNvPr>
@@ -9296,7 +8510,7 @@
               <p:nvPr/>
             </p:nvPicPr>
             <p:blipFill>
-              <a:blip r:embed="rId13">
+              <a:blip r:embed="rId10">
                 <a:extLst>
                   <a:ext uri="{28A0092B-C50C-407E-A947-70E740481C1C}">
                     <a14:useLocalDpi xmlns:a14="http://schemas.microsoft.com/office/drawing/2010/main" val="0"/>
@@ -9322,7 +8536,7 @@
               <p:cNvPr id="77" name="Picture 76">
                 <a:extLst>
                   <a:ext uri="{FF2B5EF4-FFF2-40B4-BE49-F238E27FC236}">
-                    <a16:creationId xmlns:a16="http://schemas.microsoft.com/office/drawing/2014/main" xmlns="" id="{BAE44E80-F692-4FE3-8D73-EC35C5E8CBFC}"/>
+                    <a16:creationId xmlns:a16="http://schemas.microsoft.com/office/drawing/2014/main" id="{BAE44E80-F692-4FE3-8D73-EC35C5E8CBFC}"/>
                   </a:ext>
                 </a:extLst>
               </p:cNvPr>
@@ -9332,7 +8546,7 @@
               <p:nvPr/>
             </p:nvPicPr>
             <p:blipFill rotWithShape="1">
-              <a:blip r:embed="rId14">
+              <a:blip r:embed="rId11">
                 <a:extLst>
                   <a:ext uri="{28A0092B-C50C-407E-A947-70E740481C1C}">
                     <a14:useLocalDpi xmlns:a14="http://schemas.microsoft.com/office/drawing/2010/main" val="0"/>
@@ -9358,7 +8572,7 @@
             <p:cNvPr id="58" name="TextBox 57">
               <a:extLst>
                 <a:ext uri="{FF2B5EF4-FFF2-40B4-BE49-F238E27FC236}">
-                  <a16:creationId xmlns:a16="http://schemas.microsoft.com/office/drawing/2014/main" xmlns="" id="{7E622FE0-B4BF-4456-B87B-B9290A2288C9}"/>
+                  <a16:creationId xmlns:a16="http://schemas.microsoft.com/office/drawing/2014/main" id="{7E622FE0-B4BF-4456-B87B-B9290A2288C9}"/>
                 </a:ext>
               </a:extLst>
             </p:cNvPr>
@@ -9387,10 +8601,6 @@
               </a:r>
             </a:p>
             <a:p>
-              <a:r>
-                <a:rPr lang="en-US" dirty="0"/>
-                <a:t/>
-              </a:r>
               <a:br>
                 <a:rPr lang="en-US" dirty="0"/>
               </a:br>
@@ -9403,7 +8613,7 @@
             <p:cNvPr id="59" name="TextBox 58">
               <a:extLst>
                 <a:ext uri="{FF2B5EF4-FFF2-40B4-BE49-F238E27FC236}">
-                  <a16:creationId xmlns:a16="http://schemas.microsoft.com/office/drawing/2014/main" xmlns="" id="{655D8046-4C33-4752-899F-6853C02D14AB}"/>
+                  <a16:creationId xmlns:a16="http://schemas.microsoft.com/office/drawing/2014/main" id="{655D8046-4C33-4752-899F-6853C02D14AB}"/>
                 </a:ext>
               </a:extLst>
             </p:cNvPr>
@@ -9432,10 +8642,6 @@
               </a:r>
             </a:p>
             <a:p>
-              <a:r>
-                <a:rPr lang="en-US" dirty="0"/>
-                <a:t/>
-              </a:r>
               <a:br>
                 <a:rPr lang="en-US" dirty="0"/>
               </a:br>
@@ -9448,14 +8654,15 @@
         <p:nvCxnSpPr>
           <p:cNvPr id="62" name="Straight Connector 61"/>
           <p:cNvCxnSpPr>
+            <a:cxnSpLocks/>
             <a:stCxn id="63" idx="2"/>
           </p:cNvCxnSpPr>
           <p:nvPr/>
         </p:nvCxnSpPr>
         <p:spPr bwMode="auto">
           <a:xfrm>
-            <a:off x="9140265" y="21790944"/>
-            <a:ext cx="6895997" cy="3425161"/>
+            <a:off x="9079543" y="19543356"/>
+            <a:ext cx="6891102" cy="5167361"/>
           </a:xfrm>
           <a:prstGeom prst="line">
             <a:avLst/>
@@ -9477,7 +8684,7 @@
           <a:effectLst/>
           <a:extLst>
             <a:ext uri="{AF507438-7753-43e0-B8FC-AC1667EBCBE1}">
-              <a14:hiddenEffects xmlns:a14="http://schemas.microsoft.com/office/drawing/2010/main" xmlns="">
+              <a14:hiddenEffects xmlns="" xmlns:a14="http://schemas.microsoft.com/office/drawing/2010/main">
                 <a:effectLst>
                   <a:outerShdw dist="35921" dir="2700000" algn="ctr" rotWithShape="0">
                     <a:schemeClr val="bg2"/>
@@ -9488,6 +8695,902 @@
           </a:extLst>
         </p:spPr>
       </p:cxnSp>
+      <p:sp>
+        <p:nvSpPr>
+          <p:cNvPr id="71" name="Text Box 248"/>
+          <p:cNvSpPr txBox="1">
+            <a:spLocks noChangeArrowheads="1"/>
+          </p:cNvSpPr>
+          <p:nvPr/>
+        </p:nvSpPr>
+        <p:spPr bwMode="auto">
+          <a:xfrm>
+            <a:off x="1160845" y="10156306"/>
+            <a:ext cx="14568103" cy="769441"/>
+          </a:xfrm>
+          <a:prstGeom prst="rect">
+            <a:avLst/>
+          </a:prstGeom>
+          <a:solidFill>
+            <a:schemeClr val="accent2">
+              <a:lumMod val="50000"/>
+            </a:schemeClr>
+          </a:solidFill>
+          <a:ln w="19050">
+            <a:noFill/>
+            <a:miter lim="800000"/>
+            <a:headEnd/>
+            <a:tailEnd/>
+          </a:ln>
+          <a:effectLst/>
+        </p:spPr>
+        <p:txBody>
+          <a:bodyPr wrap="square">
+            <a:spAutoFit/>
+          </a:bodyPr>
+          <a:lstStyle>
+            <a:lvl1pPr>
+              <a:defRPr sz="2400">
+                <a:solidFill>
+                  <a:schemeClr val="tx1"/>
+                </a:solidFill>
+                <a:latin typeface="Times New Roman" pitchFamily="18" charset="0"/>
+              </a:defRPr>
+            </a:lvl1pPr>
+            <a:lvl2pPr marL="742950" indent="-285750">
+              <a:defRPr sz="2400">
+                <a:solidFill>
+                  <a:schemeClr val="tx1"/>
+                </a:solidFill>
+                <a:latin typeface="Times New Roman" pitchFamily="18" charset="0"/>
+              </a:defRPr>
+            </a:lvl2pPr>
+            <a:lvl3pPr marL="1143000" indent="-228600">
+              <a:defRPr sz="2400">
+                <a:solidFill>
+                  <a:schemeClr val="tx1"/>
+                </a:solidFill>
+                <a:latin typeface="Times New Roman" pitchFamily="18" charset="0"/>
+              </a:defRPr>
+            </a:lvl3pPr>
+            <a:lvl4pPr marL="1600200" indent="-228600">
+              <a:defRPr sz="2400">
+                <a:solidFill>
+                  <a:schemeClr val="tx1"/>
+                </a:solidFill>
+                <a:latin typeface="Times New Roman" pitchFamily="18" charset="0"/>
+              </a:defRPr>
+            </a:lvl4pPr>
+            <a:lvl5pPr marL="2057400" indent="-228600">
+              <a:defRPr sz="2400">
+                <a:solidFill>
+                  <a:schemeClr val="tx1"/>
+                </a:solidFill>
+                <a:latin typeface="Times New Roman" pitchFamily="18" charset="0"/>
+              </a:defRPr>
+            </a:lvl5pPr>
+            <a:lvl6pPr marL="2514600" indent="-228600" eaLnBrk="0" fontAlgn="base" hangingPunct="0">
+              <a:spcBef>
+                <a:spcPct val="0"/>
+              </a:spcBef>
+              <a:spcAft>
+                <a:spcPct val="0"/>
+              </a:spcAft>
+              <a:defRPr sz="2400">
+                <a:solidFill>
+                  <a:schemeClr val="tx1"/>
+                </a:solidFill>
+                <a:latin typeface="Times New Roman" pitchFamily="18" charset="0"/>
+              </a:defRPr>
+            </a:lvl6pPr>
+            <a:lvl7pPr marL="2971800" indent="-228600" eaLnBrk="0" fontAlgn="base" hangingPunct="0">
+              <a:spcBef>
+                <a:spcPct val="0"/>
+              </a:spcBef>
+              <a:spcAft>
+                <a:spcPct val="0"/>
+              </a:spcAft>
+              <a:defRPr sz="2400">
+                <a:solidFill>
+                  <a:schemeClr val="tx1"/>
+                </a:solidFill>
+                <a:latin typeface="Times New Roman" pitchFamily="18" charset="0"/>
+              </a:defRPr>
+            </a:lvl7pPr>
+            <a:lvl8pPr marL="3429000" indent="-228600" eaLnBrk="0" fontAlgn="base" hangingPunct="0">
+              <a:spcBef>
+                <a:spcPct val="0"/>
+              </a:spcBef>
+              <a:spcAft>
+                <a:spcPct val="0"/>
+              </a:spcAft>
+              <a:defRPr sz="2400">
+                <a:solidFill>
+                  <a:schemeClr val="tx1"/>
+                </a:solidFill>
+                <a:latin typeface="Times New Roman" pitchFamily="18" charset="0"/>
+              </a:defRPr>
+            </a:lvl8pPr>
+            <a:lvl9pPr marL="3886200" indent="-228600" eaLnBrk="0" fontAlgn="base" hangingPunct="0">
+              <a:spcBef>
+                <a:spcPct val="0"/>
+              </a:spcBef>
+              <a:spcAft>
+                <a:spcPct val="0"/>
+              </a:spcAft>
+              <a:defRPr sz="2400">
+                <a:solidFill>
+                  <a:schemeClr val="tx1"/>
+                </a:solidFill>
+                <a:latin typeface="Times New Roman" pitchFamily="18" charset="0"/>
+              </a:defRPr>
+            </a:lvl9pPr>
+          </a:lstStyle>
+          <a:p>
+            <a:r>
+              <a:rPr lang="en-US" altLang="zh-CN" sz="4400" b="1" dirty="0">
+                <a:solidFill>
+                  <a:schemeClr val="bg1"/>
+                </a:solidFill>
+                <a:effectLst/>
+                <a:latin typeface="Lucida Sans" pitchFamily="34" charset="0"/>
+                <a:ea typeface="SimSun" pitchFamily="2" charset="-122"/>
+                <a:cs typeface="Lucida Sans" pitchFamily="34" charset="0"/>
+              </a:rPr>
+              <a:t>Quantifying “How Characters Sound”</a:t>
+            </a:r>
+            <a:endParaRPr lang="en-US" altLang="zh-CN" sz="3200" b="1" dirty="0">
+              <a:solidFill>
+                <a:schemeClr val="bg1"/>
+              </a:solidFill>
+              <a:effectLst/>
+              <a:latin typeface="Lucida Sans" pitchFamily="34" charset="0"/>
+              <a:ea typeface="SimSun" pitchFamily="2" charset="-122"/>
+              <a:cs typeface="Lucida Sans" pitchFamily="34" charset="0"/>
+            </a:endParaRPr>
+          </a:p>
+        </p:txBody>
+      </p:sp>
+      <p:sp>
+        <p:nvSpPr>
+          <p:cNvPr id="96" name="Text Box 248"/>
+          <p:cNvSpPr txBox="1">
+            <a:spLocks noChangeArrowheads="1"/>
+          </p:cNvSpPr>
+          <p:nvPr/>
+        </p:nvSpPr>
+        <p:spPr bwMode="auto">
+          <a:xfrm>
+            <a:off x="1161940" y="23214073"/>
+            <a:ext cx="14606202" cy="769014"/>
+          </a:xfrm>
+          <a:prstGeom prst="rect">
+            <a:avLst/>
+          </a:prstGeom>
+          <a:solidFill>
+            <a:schemeClr val="accent2">
+              <a:lumMod val="50000"/>
+            </a:schemeClr>
+          </a:solidFill>
+          <a:ln w="19050">
+            <a:noFill/>
+            <a:miter lim="800000"/>
+            <a:headEnd/>
+            <a:tailEnd/>
+          </a:ln>
+          <a:effectLst/>
+        </p:spPr>
+        <p:txBody>
+          <a:bodyPr wrap="square">
+            <a:spAutoFit/>
+          </a:bodyPr>
+          <a:lstStyle>
+            <a:lvl1pPr>
+              <a:defRPr sz="2400">
+                <a:solidFill>
+                  <a:schemeClr val="tx1"/>
+                </a:solidFill>
+                <a:latin typeface="Times New Roman" pitchFamily="18" charset="0"/>
+              </a:defRPr>
+            </a:lvl1pPr>
+            <a:lvl2pPr marL="742950" indent="-285750">
+              <a:defRPr sz="2400">
+                <a:solidFill>
+                  <a:schemeClr val="tx1"/>
+                </a:solidFill>
+                <a:latin typeface="Times New Roman" pitchFamily="18" charset="0"/>
+              </a:defRPr>
+            </a:lvl2pPr>
+            <a:lvl3pPr marL="1143000" indent="-228600">
+              <a:defRPr sz="2400">
+                <a:solidFill>
+                  <a:schemeClr val="tx1"/>
+                </a:solidFill>
+                <a:latin typeface="Times New Roman" pitchFamily="18" charset="0"/>
+              </a:defRPr>
+            </a:lvl3pPr>
+            <a:lvl4pPr marL="1600200" indent="-228600">
+              <a:defRPr sz="2400">
+                <a:solidFill>
+                  <a:schemeClr val="tx1"/>
+                </a:solidFill>
+                <a:latin typeface="Times New Roman" pitchFamily="18" charset="0"/>
+              </a:defRPr>
+            </a:lvl4pPr>
+            <a:lvl5pPr marL="2057400" indent="-228600">
+              <a:defRPr sz="2400">
+                <a:solidFill>
+                  <a:schemeClr val="tx1"/>
+                </a:solidFill>
+                <a:latin typeface="Times New Roman" pitchFamily="18" charset="0"/>
+              </a:defRPr>
+            </a:lvl5pPr>
+            <a:lvl6pPr marL="2514600" indent="-228600" eaLnBrk="0" fontAlgn="base" hangingPunct="0">
+              <a:spcBef>
+                <a:spcPct val="0"/>
+              </a:spcBef>
+              <a:spcAft>
+                <a:spcPct val="0"/>
+              </a:spcAft>
+              <a:defRPr sz="2400">
+                <a:solidFill>
+                  <a:schemeClr val="tx1"/>
+                </a:solidFill>
+                <a:latin typeface="Times New Roman" pitchFamily="18" charset="0"/>
+              </a:defRPr>
+            </a:lvl6pPr>
+            <a:lvl7pPr marL="2971800" indent="-228600" eaLnBrk="0" fontAlgn="base" hangingPunct="0">
+              <a:spcBef>
+                <a:spcPct val="0"/>
+              </a:spcBef>
+              <a:spcAft>
+                <a:spcPct val="0"/>
+              </a:spcAft>
+              <a:defRPr sz="2400">
+                <a:solidFill>
+                  <a:schemeClr val="tx1"/>
+                </a:solidFill>
+                <a:latin typeface="Times New Roman" pitchFamily="18" charset="0"/>
+              </a:defRPr>
+            </a:lvl7pPr>
+            <a:lvl8pPr marL="3429000" indent="-228600" eaLnBrk="0" fontAlgn="base" hangingPunct="0">
+              <a:spcBef>
+                <a:spcPct val="0"/>
+              </a:spcBef>
+              <a:spcAft>
+                <a:spcPct val="0"/>
+              </a:spcAft>
+              <a:defRPr sz="2400">
+                <a:solidFill>
+                  <a:schemeClr val="tx1"/>
+                </a:solidFill>
+                <a:latin typeface="Times New Roman" pitchFamily="18" charset="0"/>
+              </a:defRPr>
+            </a:lvl8pPr>
+            <a:lvl9pPr marL="3886200" indent="-228600" eaLnBrk="0" fontAlgn="base" hangingPunct="0">
+              <a:spcBef>
+                <a:spcPct val="0"/>
+              </a:spcBef>
+              <a:spcAft>
+                <a:spcPct val="0"/>
+              </a:spcAft>
+              <a:defRPr sz="2400">
+                <a:solidFill>
+                  <a:schemeClr val="tx1"/>
+                </a:solidFill>
+                <a:latin typeface="Times New Roman" pitchFamily="18" charset="0"/>
+              </a:defRPr>
+            </a:lvl9pPr>
+          </a:lstStyle>
+          <a:p>
+            <a:r>
+              <a:rPr lang="en-US" altLang="zh-CN" sz="4400" b="1" dirty="0">
+                <a:solidFill>
+                  <a:schemeClr val="bg1"/>
+                </a:solidFill>
+                <a:effectLst/>
+                <a:latin typeface="Lucida Sans" pitchFamily="34" charset="0"/>
+                <a:ea typeface="SimSun" pitchFamily="2" charset="-122"/>
+                <a:cs typeface="Lucida Sans" pitchFamily="34" charset="0"/>
+              </a:rPr>
+              <a:t>What Next?</a:t>
+            </a:r>
+          </a:p>
+        </p:txBody>
+      </p:sp>
+      <p:sp>
+        <p:nvSpPr>
+          <p:cNvPr id="45" name="Text Box 263"/>
+          <p:cNvSpPr txBox="1">
+            <a:spLocks noChangeArrowheads="1"/>
+          </p:cNvSpPr>
+          <p:nvPr/>
+        </p:nvSpPr>
+        <p:spPr bwMode="auto">
+          <a:xfrm>
+            <a:off x="1161352" y="23980212"/>
+            <a:ext cx="14606790" cy="4557797"/>
+          </a:xfrm>
+          <a:prstGeom prst="rect">
+            <a:avLst/>
+          </a:prstGeom>
+          <a:solidFill>
+            <a:schemeClr val="bg1"/>
+          </a:solidFill>
+          <a:ln w="57150" cmpd="thinThick">
+            <a:noFill/>
+            <a:miter lim="800000"/>
+            <a:headEnd/>
+            <a:tailEnd/>
+          </a:ln>
+          <a:effectLst/>
+          <a:extLst/>
+        </p:spPr>
+        <p:txBody>
+          <a:bodyPr wrap="square" lIns="182880" tIns="91440" rIns="182880" bIns="182880" numCol="2">
+            <a:noAutofit/>
+          </a:bodyPr>
+          <a:lstStyle>
+            <a:lvl1pPr>
+              <a:defRPr sz="2400">
+                <a:solidFill>
+                  <a:schemeClr val="tx1"/>
+                </a:solidFill>
+                <a:latin typeface="Times New Roman" pitchFamily="18" charset="0"/>
+              </a:defRPr>
+            </a:lvl1pPr>
+            <a:lvl2pPr marL="685800" indent="-228600">
+              <a:defRPr sz="2400">
+                <a:solidFill>
+                  <a:schemeClr val="tx1"/>
+                </a:solidFill>
+                <a:latin typeface="Times New Roman" pitchFamily="18" charset="0"/>
+              </a:defRPr>
+            </a:lvl2pPr>
+            <a:lvl3pPr marL="1143000" indent="-228600">
+              <a:defRPr sz="2400">
+                <a:solidFill>
+                  <a:schemeClr val="tx1"/>
+                </a:solidFill>
+                <a:latin typeface="Times New Roman" pitchFamily="18" charset="0"/>
+              </a:defRPr>
+            </a:lvl3pPr>
+            <a:lvl4pPr marL="1600200" indent="-228600">
+              <a:defRPr sz="2400">
+                <a:solidFill>
+                  <a:schemeClr val="tx1"/>
+                </a:solidFill>
+                <a:latin typeface="Times New Roman" pitchFamily="18" charset="0"/>
+              </a:defRPr>
+            </a:lvl4pPr>
+            <a:lvl5pPr marL="2057400" indent="-228600">
+              <a:defRPr sz="2400">
+                <a:solidFill>
+                  <a:schemeClr val="tx1"/>
+                </a:solidFill>
+                <a:latin typeface="Times New Roman" pitchFamily="18" charset="0"/>
+              </a:defRPr>
+            </a:lvl5pPr>
+            <a:lvl6pPr marL="2514600" indent="-228600" eaLnBrk="0" fontAlgn="base" hangingPunct="0">
+              <a:spcBef>
+                <a:spcPct val="0"/>
+              </a:spcBef>
+              <a:spcAft>
+                <a:spcPct val="0"/>
+              </a:spcAft>
+              <a:defRPr sz="2400">
+                <a:solidFill>
+                  <a:schemeClr val="tx1"/>
+                </a:solidFill>
+                <a:latin typeface="Times New Roman" pitchFamily="18" charset="0"/>
+              </a:defRPr>
+            </a:lvl6pPr>
+            <a:lvl7pPr marL="2971800" indent="-228600" eaLnBrk="0" fontAlgn="base" hangingPunct="0">
+              <a:spcBef>
+                <a:spcPct val="0"/>
+              </a:spcBef>
+              <a:spcAft>
+                <a:spcPct val="0"/>
+              </a:spcAft>
+              <a:defRPr sz="2400">
+                <a:solidFill>
+                  <a:schemeClr val="tx1"/>
+                </a:solidFill>
+                <a:latin typeface="Times New Roman" pitchFamily="18" charset="0"/>
+              </a:defRPr>
+            </a:lvl7pPr>
+            <a:lvl8pPr marL="3429000" indent="-228600" eaLnBrk="0" fontAlgn="base" hangingPunct="0">
+              <a:spcBef>
+                <a:spcPct val="0"/>
+              </a:spcBef>
+              <a:spcAft>
+                <a:spcPct val="0"/>
+              </a:spcAft>
+              <a:defRPr sz="2400">
+                <a:solidFill>
+                  <a:schemeClr val="tx1"/>
+                </a:solidFill>
+                <a:latin typeface="Times New Roman" pitchFamily="18" charset="0"/>
+              </a:defRPr>
+            </a:lvl8pPr>
+            <a:lvl9pPr marL="3886200" indent="-228600" eaLnBrk="0" fontAlgn="base" hangingPunct="0">
+              <a:spcBef>
+                <a:spcPct val="0"/>
+              </a:spcBef>
+              <a:spcAft>
+                <a:spcPct val="0"/>
+              </a:spcAft>
+              <a:defRPr sz="2400">
+                <a:solidFill>
+                  <a:schemeClr val="tx1"/>
+                </a:solidFill>
+                <a:latin typeface="Times New Roman" pitchFamily="18" charset="0"/>
+              </a:defRPr>
+            </a:lvl9pPr>
+          </a:lstStyle>
+          <a:p>
+            <a:pPr>
+              <a:lnSpc>
+                <a:spcPct val="125000"/>
+              </a:lnSpc>
+            </a:pPr>
+            <a:r>
+              <a:rPr lang="en-AU" sz="2800" b="1" dirty="0">
+                <a:effectLst/>
+              </a:rPr>
+              <a:t>Beyond Shakespeare: </a:t>
+            </a:r>
+          </a:p>
+          <a:p>
+            <a:pPr>
+              <a:lnSpc>
+                <a:spcPct val="125000"/>
+              </a:lnSpc>
+            </a:pPr>
+            <a:r>
+              <a:rPr lang="en-AU" sz="2800" dirty="0">
+                <a:effectLst/>
+              </a:rPr>
+              <a:t>Expand our analysis to other authors, not limited to playwrights </a:t>
+            </a:r>
+          </a:p>
+          <a:p>
+            <a:pPr>
+              <a:lnSpc>
+                <a:spcPct val="125000"/>
+              </a:lnSpc>
+            </a:pPr>
+            <a:r>
+              <a:rPr lang="en-AU" sz="2800" dirty="0">
+                <a:effectLst/>
+              </a:rPr>
+              <a:t>or anglophones, with a particular interest in the role of verse and prose. </a:t>
+            </a:r>
+            <a:r>
+              <a:rPr lang="en-AU" sz="2800" b="1" dirty="0">
+                <a:effectLst/>
+              </a:rPr>
+              <a:t>Does the significance of sonic signatures change across form and language?</a:t>
+            </a:r>
+          </a:p>
+          <a:p>
+            <a:pPr>
+              <a:lnSpc>
+                <a:spcPct val="125000"/>
+              </a:lnSpc>
+            </a:pPr>
+            <a:endParaRPr lang="en-AU" sz="2800" b="1" dirty="0">
+              <a:effectLst/>
+            </a:endParaRPr>
+          </a:p>
+          <a:p>
+            <a:pPr>
+              <a:lnSpc>
+                <a:spcPct val="125000"/>
+              </a:lnSpc>
+            </a:pPr>
+            <a:r>
+              <a:rPr lang="en-AU" sz="2800" b="1" dirty="0">
+                <a:effectLst/>
+              </a:rPr>
+              <a:t>Word Choice Covariance:</a:t>
+            </a:r>
+            <a:r>
+              <a:rPr lang="en-AU" sz="2800" dirty="0">
+                <a:effectLst/>
+              </a:rPr>
+              <a:t> </a:t>
+            </a:r>
+          </a:p>
+          <a:p>
+            <a:pPr>
+              <a:lnSpc>
+                <a:spcPct val="125000"/>
+              </a:lnSpc>
+            </a:pPr>
+            <a:r>
+              <a:rPr lang="en-AU" sz="2800" dirty="0">
+                <a:effectLst/>
+              </a:rPr>
+              <a:t>Previous work has shown that word-based analysis yields promising categorization results, so do sonic signatures provide unique features, or merely reflect the same information as the words they comprise? </a:t>
+            </a:r>
+            <a:r>
+              <a:rPr lang="en-AU" sz="2800" b="1" dirty="0">
+                <a:effectLst/>
+              </a:rPr>
+              <a:t>To what degree are sonic signatures covariant with word choice in determining classification?</a:t>
+            </a:r>
+          </a:p>
+        </p:txBody>
+      </p:sp>
+      <p:pic>
+        <p:nvPicPr>
+          <p:cNvPr id="13" name="Picture 12">
+            <a:extLst>
+              <a:ext uri="{FF2B5EF4-FFF2-40B4-BE49-F238E27FC236}">
+                <a16:creationId xmlns:a16="http://schemas.microsoft.com/office/drawing/2014/main" id="{2C804434-CBD2-4B5B-926C-AD8DC66C6F8D}"/>
+              </a:ext>
+            </a:extLst>
+          </p:cNvPr>
+          <p:cNvPicPr>
+            <a:picLocks noChangeAspect="1"/>
+          </p:cNvPicPr>
+          <p:nvPr/>
+        </p:nvPicPr>
+        <p:blipFill>
+          <a:blip r:embed="rId12" cstate="print">
+            <a:extLst>
+              <a:ext uri="{28A0092B-C50C-407E-A947-70E740481C1C}">
+                <a14:useLocalDpi xmlns:a14="http://schemas.microsoft.com/office/drawing/2010/main" val="0"/>
+              </a:ext>
+            </a:extLst>
+          </a:blip>
+          <a:stretch>
+            <a:fillRect/>
+          </a:stretch>
+        </p:blipFill>
+        <p:spPr>
+          <a:xfrm>
+            <a:off x="28069564" y="19037557"/>
+            <a:ext cx="10181767" cy="5307006"/>
+          </a:xfrm>
+          <a:prstGeom prst="rect">
+            <a:avLst/>
+          </a:prstGeom>
+        </p:spPr>
+      </p:pic>
+      <p:pic>
+        <p:nvPicPr>
+          <p:cNvPr id="21" name="Picture 20">
+            <a:extLst>
+              <a:ext uri="{FF2B5EF4-FFF2-40B4-BE49-F238E27FC236}">
+                <a16:creationId xmlns:a16="http://schemas.microsoft.com/office/drawing/2014/main" id="{A9A1FF81-BAB7-4A96-ABDE-2C31563A3C39}"/>
+              </a:ext>
+            </a:extLst>
+          </p:cNvPr>
+          <p:cNvPicPr>
+            <a:picLocks noChangeAspect="1"/>
+          </p:cNvPicPr>
+          <p:nvPr/>
+        </p:nvPicPr>
+        <p:blipFill>
+          <a:blip r:embed="rId13" cstate="print">
+            <a:extLst>
+              <a:ext uri="{28A0092B-C50C-407E-A947-70E740481C1C}">
+                <a14:useLocalDpi xmlns:a14="http://schemas.microsoft.com/office/drawing/2010/main" val="0"/>
+              </a:ext>
+            </a:extLst>
+          </a:blip>
+          <a:stretch>
+            <a:fillRect/>
+          </a:stretch>
+        </p:blipFill>
+        <p:spPr>
+          <a:xfrm>
+            <a:off x="28069564" y="13507926"/>
+            <a:ext cx="10181767" cy="5331397"/>
+          </a:xfrm>
+          <a:prstGeom prst="rect">
+            <a:avLst/>
+          </a:prstGeom>
+        </p:spPr>
+      </p:pic>
+      <p:sp>
+        <p:nvSpPr>
+          <p:cNvPr id="41" name="Text Box 248"/>
+          <p:cNvSpPr txBox="1">
+            <a:spLocks noChangeArrowheads="1"/>
+          </p:cNvSpPr>
+          <p:nvPr/>
+        </p:nvSpPr>
+        <p:spPr bwMode="auto">
+          <a:xfrm>
+            <a:off x="1153149" y="4972054"/>
+            <a:ext cx="14545752" cy="769441"/>
+          </a:xfrm>
+          <a:prstGeom prst="rect">
+            <a:avLst/>
+          </a:prstGeom>
+          <a:solidFill>
+            <a:schemeClr val="accent2">
+              <a:lumMod val="50000"/>
+            </a:schemeClr>
+          </a:solidFill>
+          <a:ln w="19050">
+            <a:noFill/>
+            <a:miter lim="800000"/>
+            <a:headEnd/>
+            <a:tailEnd/>
+          </a:ln>
+          <a:effectLst/>
+        </p:spPr>
+        <p:txBody>
+          <a:bodyPr wrap="square">
+            <a:spAutoFit/>
+          </a:bodyPr>
+          <a:lstStyle>
+            <a:lvl1pPr>
+              <a:defRPr sz="2400">
+                <a:solidFill>
+                  <a:schemeClr val="tx1"/>
+                </a:solidFill>
+                <a:latin typeface="Times New Roman" pitchFamily="18" charset="0"/>
+              </a:defRPr>
+            </a:lvl1pPr>
+            <a:lvl2pPr marL="742950" indent="-285750">
+              <a:defRPr sz="2400">
+                <a:solidFill>
+                  <a:schemeClr val="tx1"/>
+                </a:solidFill>
+                <a:latin typeface="Times New Roman" pitchFamily="18" charset="0"/>
+              </a:defRPr>
+            </a:lvl2pPr>
+            <a:lvl3pPr marL="1143000" indent="-228600">
+              <a:defRPr sz="2400">
+                <a:solidFill>
+                  <a:schemeClr val="tx1"/>
+                </a:solidFill>
+                <a:latin typeface="Times New Roman" pitchFamily="18" charset="0"/>
+              </a:defRPr>
+            </a:lvl3pPr>
+            <a:lvl4pPr marL="1600200" indent="-228600">
+              <a:defRPr sz="2400">
+                <a:solidFill>
+                  <a:schemeClr val="tx1"/>
+                </a:solidFill>
+                <a:latin typeface="Times New Roman" pitchFamily="18" charset="0"/>
+              </a:defRPr>
+            </a:lvl4pPr>
+            <a:lvl5pPr marL="2057400" indent="-228600">
+              <a:defRPr sz="2400">
+                <a:solidFill>
+                  <a:schemeClr val="tx1"/>
+                </a:solidFill>
+                <a:latin typeface="Times New Roman" pitchFamily="18" charset="0"/>
+              </a:defRPr>
+            </a:lvl5pPr>
+            <a:lvl6pPr marL="2514600" indent="-228600" eaLnBrk="0" fontAlgn="base" hangingPunct="0">
+              <a:spcBef>
+                <a:spcPct val="0"/>
+              </a:spcBef>
+              <a:spcAft>
+                <a:spcPct val="0"/>
+              </a:spcAft>
+              <a:defRPr sz="2400">
+                <a:solidFill>
+                  <a:schemeClr val="tx1"/>
+                </a:solidFill>
+                <a:latin typeface="Times New Roman" pitchFamily="18" charset="0"/>
+              </a:defRPr>
+            </a:lvl6pPr>
+            <a:lvl7pPr marL="2971800" indent="-228600" eaLnBrk="0" fontAlgn="base" hangingPunct="0">
+              <a:spcBef>
+                <a:spcPct val="0"/>
+              </a:spcBef>
+              <a:spcAft>
+                <a:spcPct val="0"/>
+              </a:spcAft>
+              <a:defRPr sz="2400">
+                <a:solidFill>
+                  <a:schemeClr val="tx1"/>
+                </a:solidFill>
+                <a:latin typeface="Times New Roman" pitchFamily="18" charset="0"/>
+              </a:defRPr>
+            </a:lvl7pPr>
+            <a:lvl8pPr marL="3429000" indent="-228600" eaLnBrk="0" fontAlgn="base" hangingPunct="0">
+              <a:spcBef>
+                <a:spcPct val="0"/>
+              </a:spcBef>
+              <a:spcAft>
+                <a:spcPct val="0"/>
+              </a:spcAft>
+              <a:defRPr sz="2400">
+                <a:solidFill>
+                  <a:schemeClr val="tx1"/>
+                </a:solidFill>
+                <a:latin typeface="Times New Roman" pitchFamily="18" charset="0"/>
+              </a:defRPr>
+            </a:lvl8pPr>
+            <a:lvl9pPr marL="3886200" indent="-228600" eaLnBrk="0" fontAlgn="base" hangingPunct="0">
+              <a:spcBef>
+                <a:spcPct val="0"/>
+              </a:spcBef>
+              <a:spcAft>
+                <a:spcPct val="0"/>
+              </a:spcAft>
+              <a:defRPr sz="2400">
+                <a:solidFill>
+                  <a:schemeClr val="tx1"/>
+                </a:solidFill>
+                <a:latin typeface="Times New Roman" pitchFamily="18" charset="0"/>
+              </a:defRPr>
+            </a:lvl9pPr>
+          </a:lstStyle>
+          <a:p>
+            <a:r>
+              <a:rPr lang="en-US" altLang="zh-CN" sz="4400" b="1" dirty="0">
+                <a:solidFill>
+                  <a:schemeClr val="bg1"/>
+                </a:solidFill>
+                <a:effectLst/>
+                <a:latin typeface="Lucida Sans" pitchFamily="34" charset="0"/>
+                <a:ea typeface="SimSun" pitchFamily="2" charset="-122"/>
+                <a:cs typeface="Lucida Sans" pitchFamily="34" charset="0"/>
+              </a:rPr>
+              <a:t>Why Sonic Signatures?</a:t>
+            </a:r>
+            <a:endParaRPr lang="en-US" altLang="zh-CN" sz="3200" b="1" dirty="0">
+              <a:solidFill>
+                <a:schemeClr val="bg1"/>
+              </a:solidFill>
+              <a:effectLst/>
+              <a:latin typeface="Lucida Sans" pitchFamily="34" charset="0"/>
+              <a:ea typeface="SimSun" pitchFamily="2" charset="-122"/>
+              <a:cs typeface="Lucida Sans" pitchFamily="34" charset="0"/>
+            </a:endParaRPr>
+          </a:p>
+        </p:txBody>
+      </p:sp>
+      <p:sp>
+        <p:nvSpPr>
+          <p:cNvPr id="34" name="TextBox 33">
+            <a:extLst>
+              <a:ext uri="{FF2B5EF4-FFF2-40B4-BE49-F238E27FC236}">
+                <a16:creationId xmlns:a16="http://schemas.microsoft.com/office/drawing/2014/main" id="{A809847B-BDE4-4A1E-A910-07F3D6CA9ECC}"/>
+              </a:ext>
+            </a:extLst>
+          </p:cNvPr>
+          <p:cNvSpPr txBox="1"/>
+          <p:nvPr/>
+        </p:nvSpPr>
+        <p:spPr>
+          <a:xfrm>
+            <a:off x="39852600" y="9972554"/>
+            <a:ext cx="2286000" cy="246221"/>
+          </a:xfrm>
+          <a:prstGeom prst="rect">
+            <a:avLst/>
+          </a:prstGeom>
+          <a:noFill/>
+        </p:spPr>
+        <p:txBody>
+          <a:bodyPr wrap="square" rtlCol="0">
+            <a:spAutoFit/>
+          </a:bodyPr>
+          <a:lstStyle/>
+          <a:p>
+            <a:r>
+              <a:rPr lang="en-US" sz="1000" dirty="0">
+                <a:solidFill>
+                  <a:schemeClr val="tx1">
+                    <a:lumMod val="75000"/>
+                    <a:lumOff val="25000"/>
+                  </a:schemeClr>
+                </a:solidFill>
+                <a:effectLst/>
+                <a:latin typeface="Arial" panose="020B0604020202020204" pitchFamily="34" charset="0"/>
+                <a:cs typeface="Arial" panose="020B0604020202020204" pitchFamily="34" charset="0"/>
+              </a:rPr>
+              <a:t>Predicted label</a:t>
+            </a:r>
+          </a:p>
+        </p:txBody>
+      </p:sp>
+      <p:grpSp>
+        <p:nvGrpSpPr>
+          <p:cNvPr id="37" name="Group 36">
+            <a:extLst>
+              <a:ext uri="{FF2B5EF4-FFF2-40B4-BE49-F238E27FC236}">
+                <a16:creationId xmlns:a16="http://schemas.microsoft.com/office/drawing/2014/main" id="{BA3AF995-7F87-459A-9805-F84023901A2F}"/>
+              </a:ext>
+            </a:extLst>
+          </p:cNvPr>
+          <p:cNvGrpSpPr/>
+          <p:nvPr/>
+        </p:nvGrpSpPr>
+        <p:grpSpPr>
+          <a:xfrm>
+            <a:off x="32097644" y="5843593"/>
+            <a:ext cx="5638800" cy="4343024"/>
+            <a:chOff x="32097644" y="5752640"/>
+            <a:chExt cx="5638800" cy="4343024"/>
+          </a:xfrm>
+        </p:grpSpPr>
+        <p:pic>
+          <p:nvPicPr>
+            <p:cNvPr id="6" name="Picture 5"/>
+            <p:cNvPicPr>
+              <a:picLocks noChangeAspect="1"/>
+            </p:cNvPicPr>
+            <p:nvPr/>
+          </p:nvPicPr>
+          <p:blipFill rotWithShape="1">
+            <a:blip r:embed="rId14">
+              <a:extLst>
+                <a:ext uri="{28A0092B-C50C-407E-A947-70E740481C1C}">
+                  <a14:useLocalDpi xmlns:a14="http://schemas.microsoft.com/office/drawing/2010/main" val="0"/>
+                </a:ext>
+              </a:extLst>
+            </a:blip>
+            <a:srcRect b="1965"/>
+            <a:stretch/>
+          </p:blipFill>
+          <p:spPr>
+            <a:xfrm>
+              <a:off x="32097644" y="5752640"/>
+              <a:ext cx="5638800" cy="4145983"/>
+            </a:xfrm>
+            <a:prstGeom prst="rect">
+              <a:avLst/>
+            </a:prstGeom>
+          </p:spPr>
+        </p:pic>
+        <p:sp>
+          <p:nvSpPr>
+            <p:cNvPr id="87" name="TextBox 86">
+              <a:extLst>
+                <a:ext uri="{FF2B5EF4-FFF2-40B4-BE49-F238E27FC236}">
+                  <a16:creationId xmlns:a16="http://schemas.microsoft.com/office/drawing/2014/main" id="{CF65483D-538A-4C8E-AA7F-CE8E192EF8F8}"/>
+                </a:ext>
+              </a:extLst>
+            </p:cNvPr>
+            <p:cNvSpPr txBox="1"/>
+            <p:nvPr/>
+          </p:nvSpPr>
+          <p:spPr>
+            <a:xfrm>
+              <a:off x="34395661" y="9849443"/>
+              <a:ext cx="2286000" cy="246221"/>
+            </a:xfrm>
+            <a:prstGeom prst="rect">
+              <a:avLst/>
+            </a:prstGeom>
+            <a:noFill/>
+          </p:spPr>
+          <p:txBody>
+            <a:bodyPr wrap="square" rtlCol="0">
+              <a:spAutoFit/>
+            </a:bodyPr>
+            <a:lstStyle/>
+            <a:p>
+              <a:r>
+                <a:rPr lang="en-US" sz="1000" dirty="0">
+                  <a:solidFill>
+                    <a:schemeClr val="tx1">
+                      <a:lumMod val="75000"/>
+                      <a:lumOff val="25000"/>
+                    </a:schemeClr>
+                  </a:solidFill>
+                  <a:effectLst/>
+                  <a:latin typeface="Arial" panose="020B0604020202020204" pitchFamily="34" charset="0"/>
+                  <a:cs typeface="Arial" panose="020B0604020202020204" pitchFamily="34" charset="0"/>
+                </a:rPr>
+                <a:t>Predicted label</a:t>
+              </a:r>
+            </a:p>
+          </p:txBody>
+        </p:sp>
+      </p:grpSp>
     </p:spTree>
   </p:cSld>
   <p:clrMapOvr>
@@ -9746,7 +9849,7 @@
         <a:effectLst/>
         <a:extLst>
           <a:ext uri="{AF507438-7753-43e0-B8FC-AC1667EBCBE1}">
-            <a14:hiddenEffects xmlns:a14="http://schemas.microsoft.com/office/drawing/2010/main" xmlns="">
+            <a14:hiddenEffects xmlns="" xmlns:a14="http://schemas.microsoft.com/office/drawing/2010/main">
               <a:effectLst>
                 <a:outerShdw dist="35921" dir="2700000" algn="ctr" rotWithShape="0">
                   <a:schemeClr val="bg2"/>
@@ -9825,7 +9928,7 @@
         <a:effectLst/>
         <a:extLst>
           <a:ext uri="{AF507438-7753-43e0-B8FC-AC1667EBCBE1}">
-            <a14:hiddenEffects xmlns:a14="http://schemas.microsoft.com/office/drawing/2010/main" xmlns="">
+            <a14:hiddenEffects xmlns="" xmlns:a14="http://schemas.microsoft.com/office/drawing/2010/main">
               <a:effectLst>
                 <a:outerShdw dist="35921" dir="2700000" algn="ctr" rotWithShape="0">
                   <a:schemeClr val="bg2"/>

</xml_diff>